<commit_message>
Thesis defence is updated.
</commit_message>
<xml_diff>
--- a/Thesis/Thesis Defence/Erencan_Duymaz_thesis_defence.pptx
+++ b/Thesis/Thesis Defence/Erencan_Duymaz_thesis_defence.pptx
@@ -5,41 +5,44 @@
     <p:sldMasterId id="2147483662" r:id="rId1"/>
   </p:sldMasterIdLst>
   <p:notesMasterIdLst>
-    <p:notesMasterId r:id="rId31"/>
+    <p:notesMasterId r:id="rId34"/>
   </p:notesMasterIdLst>
   <p:handoutMasterIdLst>
-    <p:handoutMasterId r:id="rId32"/>
+    <p:handoutMasterId r:id="rId35"/>
   </p:handoutMasterIdLst>
   <p:sldIdLst>
     <p:sldId id="256" r:id="rId2"/>
     <p:sldId id="257" r:id="rId3"/>
     <p:sldId id="259" r:id="rId4"/>
-    <p:sldId id="273" r:id="rId5"/>
-    <p:sldId id="272" r:id="rId6"/>
-    <p:sldId id="275" r:id="rId7"/>
-    <p:sldId id="276" r:id="rId8"/>
-    <p:sldId id="260" r:id="rId9"/>
-    <p:sldId id="290" r:id="rId10"/>
-    <p:sldId id="266" r:id="rId11"/>
-    <p:sldId id="277" r:id="rId12"/>
-    <p:sldId id="283" r:id="rId13"/>
-    <p:sldId id="267" r:id="rId14"/>
-    <p:sldId id="284" r:id="rId15"/>
-    <p:sldId id="285" r:id="rId16"/>
-    <p:sldId id="289" r:id="rId17"/>
-    <p:sldId id="288" r:id="rId18"/>
-    <p:sldId id="287" r:id="rId19"/>
-    <p:sldId id="279" r:id="rId20"/>
-    <p:sldId id="280" r:id="rId21"/>
-    <p:sldId id="282" r:id="rId22"/>
-    <p:sldId id="281" r:id="rId23"/>
-    <p:sldId id="264" r:id="rId24"/>
-    <p:sldId id="278" r:id="rId25"/>
-    <p:sldId id="268" r:id="rId26"/>
-    <p:sldId id="261" r:id="rId27"/>
-    <p:sldId id="262" r:id="rId28"/>
-    <p:sldId id="286" r:id="rId29"/>
-    <p:sldId id="263" r:id="rId30"/>
+    <p:sldId id="291" r:id="rId5"/>
+    <p:sldId id="273" r:id="rId6"/>
+    <p:sldId id="272" r:id="rId7"/>
+    <p:sldId id="275" r:id="rId8"/>
+    <p:sldId id="276" r:id="rId9"/>
+    <p:sldId id="260" r:id="rId10"/>
+    <p:sldId id="290" r:id="rId11"/>
+    <p:sldId id="266" r:id="rId12"/>
+    <p:sldId id="277" r:id="rId13"/>
+    <p:sldId id="283" r:id="rId14"/>
+    <p:sldId id="267" r:id="rId15"/>
+    <p:sldId id="284" r:id="rId16"/>
+    <p:sldId id="285" r:id="rId17"/>
+    <p:sldId id="289" r:id="rId18"/>
+    <p:sldId id="293" r:id="rId19"/>
+    <p:sldId id="288" r:id="rId20"/>
+    <p:sldId id="292" r:id="rId21"/>
+    <p:sldId id="287" r:id="rId22"/>
+    <p:sldId id="279" r:id="rId23"/>
+    <p:sldId id="280" r:id="rId24"/>
+    <p:sldId id="282" r:id="rId25"/>
+    <p:sldId id="281" r:id="rId26"/>
+    <p:sldId id="264" r:id="rId27"/>
+    <p:sldId id="278" r:id="rId28"/>
+    <p:sldId id="268" r:id="rId29"/>
+    <p:sldId id="261" r:id="rId30"/>
+    <p:sldId id="262" r:id="rId31"/>
+    <p:sldId id="286" r:id="rId32"/>
+    <p:sldId id="263" r:id="rId33"/>
   </p:sldIdLst>
   <p:sldSz cx="9144000" cy="6858000" type="screen4x3"/>
   <p:notesSz cx="6746875" cy="9913938"/>
@@ -637,6 +640,14 @@
           <a:bodyPr/>
           <a:lstStyle/>
           <a:p>
+            <a:r>
+              <a:rPr lang="tr-TR" altLang="en-US" dirty="0" smtClean="0"/>
+              <a:t>Figure</a:t>
+            </a:r>
+            <a:r>
+              <a:rPr lang="tr-TR" altLang="en-US" baseline="0" dirty="0" smtClean="0"/>
+              <a:t> shows the modelling for the PMSG wind turbine that is connected to grid with FSPC. There are two converters in this type of the converter with different responsibilities. The one connected between DC-bus and grid is called Grid Side Converter and it is responsible for maintaining a constant DC-bus voltage and adjusting the reactive power that is injected to grid. The converter in between DC bus and PMSG is called Machine Side Controller. It is adjusts the generator and turbine speed to MPPT speed by controlling its output torque. When the output torque hits the limit, the speed cannot be regulated and exceeds the maximum allowable speeds. This is why Pitch angle controller is utilized. By increasing the pitch angle of the turbine, the aerodynamic power and aerodynamic torque is decreased. In this way, turbine speed is kept in the maximum in high speeds. </a:t>
+            </a:r>
             <a:endParaRPr lang="en-US" altLang="en-US" dirty="0" smtClean="0"/>
           </a:p>
         </p:txBody>
@@ -662,7 +673,7 @@
     </p:spTree>
     <p:extLst>
       <p:ext uri="{BB962C8B-B14F-4D97-AF65-F5344CB8AC3E}">
-        <p14:creationId xmlns:p14="http://schemas.microsoft.com/office/powerpoint/2010/main" val="1784535780"/>
+        <p14:creationId xmlns:p14="http://schemas.microsoft.com/office/powerpoint/2010/main" val="4238726091"/>
       </p:ext>
     </p:extLst>
   </p:cSld>
@@ -726,14 +737,6 @@
           <a:bodyPr/>
           <a:lstStyle/>
           <a:p>
-            <a:r>
-              <a:rPr lang="tr-TR" altLang="en-US" dirty="0" smtClean="0"/>
-              <a:t>In order to provide a inertial support, the wind</a:t>
-            </a:r>
-            <a:r>
-              <a:rPr lang="tr-TR" altLang="en-US" baseline="0" dirty="0" smtClean="0"/>
-              <a:t> turbine active power should be controlled. Therefore, the MPPT speed operation is leaved. The turbine torque is adjusted by controlling the q-axis current. The active power increase is either a defined percentage as in the case of fast inertial support or the active power increase according to Swing Equation.</a:t>
-            </a:r>
             <a:endParaRPr lang="en-US" altLang="en-US" dirty="0" smtClean="0"/>
           </a:p>
         </p:txBody>
@@ -759,7 +762,7 @@
     </p:spTree>
     <p:extLst>
       <p:ext uri="{BB962C8B-B14F-4D97-AF65-F5344CB8AC3E}">
-        <p14:creationId xmlns:p14="http://schemas.microsoft.com/office/powerpoint/2010/main" val="2034214963"/>
+        <p14:creationId xmlns:p14="http://schemas.microsoft.com/office/powerpoint/2010/main" val="1784535780"/>
       </p:ext>
     </p:extLst>
   </p:cSld>
@@ -823,7 +826,15 @@
           <a:bodyPr/>
           <a:lstStyle/>
           <a:p>
-            <a:endParaRPr lang="en-US" altLang="en-US" smtClean="0"/>
+            <a:r>
+              <a:rPr lang="tr-TR" altLang="en-US" dirty="0" smtClean="0"/>
+              <a:t>In order to provide a inertial support, the wind</a:t>
+            </a:r>
+            <a:r>
+              <a:rPr lang="tr-TR" altLang="en-US" baseline="0" dirty="0" smtClean="0"/>
+              <a:t> turbine active power should be controlled. Therefore, the MPPT speed operation is leaved. The turbine torque is adjusted by controlling the q-axis current. The active power increase is either a defined percentage as in the case of fast inertial support or the active power increase according to Swing Equation.</a:t>
+            </a:r>
+            <a:endParaRPr lang="en-US" altLang="en-US" dirty="0" smtClean="0"/>
           </a:p>
         </p:txBody>
       </p:sp>
@@ -848,7 +859,7 @@
     </p:spTree>
     <p:extLst>
       <p:ext uri="{BB962C8B-B14F-4D97-AF65-F5344CB8AC3E}">
-        <p14:creationId xmlns:p14="http://schemas.microsoft.com/office/powerpoint/2010/main" val="468962759"/>
+        <p14:creationId xmlns:p14="http://schemas.microsoft.com/office/powerpoint/2010/main" val="2034214963"/>
       </p:ext>
     </p:extLst>
   </p:cSld>
@@ -912,15 +923,7 @@
           <a:bodyPr/>
           <a:lstStyle/>
           <a:p>
-            <a:r>
-              <a:rPr lang="tr-TR" altLang="en-US" dirty="0" smtClean="0"/>
-              <a:t>Converter</a:t>
-            </a:r>
-            <a:r>
-              <a:rPr lang="tr-TR" altLang="en-US" baseline="0" dirty="0" smtClean="0"/>
-              <a:t> Limit</a:t>
-            </a:r>
-            <a:endParaRPr lang="en-US" altLang="en-US" dirty="0" smtClean="0"/>
+            <a:endParaRPr lang="en-US" altLang="en-US" smtClean="0"/>
           </a:p>
         </p:txBody>
       </p:sp>
@@ -945,7 +948,7 @@
     </p:spTree>
     <p:extLst>
       <p:ext uri="{BB962C8B-B14F-4D97-AF65-F5344CB8AC3E}">
-        <p14:creationId xmlns:p14="http://schemas.microsoft.com/office/powerpoint/2010/main" val="2769588"/>
+        <p14:creationId xmlns:p14="http://schemas.microsoft.com/office/powerpoint/2010/main" val="468962759"/>
       </p:ext>
     </p:extLst>
   </p:cSld>
@@ -1011,7 +1014,11 @@
           <a:p>
             <a:r>
               <a:rPr lang="tr-TR" altLang="en-US" dirty="0" smtClean="0"/>
-              <a:t>Main contribution of the wind turbine is in between the wind speed range of 3-10m/s.</a:t>
+              <a:t>Converter</a:t>
+            </a:r>
+            <a:r>
+              <a:rPr lang="tr-TR" altLang="en-US" baseline="0" dirty="0" smtClean="0"/>
+              <a:t> Limit</a:t>
             </a:r>
             <a:endParaRPr lang="en-US" altLang="en-US" dirty="0" smtClean="0"/>
           </a:p>
@@ -1038,7 +1045,7 @@
     </p:spTree>
     <p:extLst>
       <p:ext uri="{BB962C8B-B14F-4D97-AF65-F5344CB8AC3E}">
-        <p14:creationId xmlns:p14="http://schemas.microsoft.com/office/powerpoint/2010/main" val="3372365603"/>
+        <p14:creationId xmlns:p14="http://schemas.microsoft.com/office/powerpoint/2010/main" val="2769588"/>
       </p:ext>
     </p:extLst>
   </p:cSld>
@@ -1103,10 +1110,90 @@
           <a:lstStyle/>
           <a:p>
             <a:r>
+              <a:rPr lang="tr-TR" sz="1200" b="0" i="0" u="none" strike="noStrike" kern="1200" baseline="0" dirty="0" smtClean="0">
+                <a:solidFill>
+                  <a:schemeClr val="tx1"/>
+                </a:solidFill>
+                <a:latin typeface="Arial" pitchFamily="34" charset="0"/>
+                <a:ea typeface="+mn-ea"/>
+                <a:cs typeface="+mn-cs"/>
+              </a:rPr>
+              <a:t>Wind speed measurements </a:t>
+            </a:r>
+            <a:r>
+              <a:rPr lang="en-GB" sz="1200" b="0" i="0" u="none" strike="noStrike" kern="1200" baseline="0" dirty="0" smtClean="0">
+                <a:solidFill>
+                  <a:schemeClr val="tx1"/>
+                </a:solidFill>
+                <a:latin typeface="Arial" pitchFamily="34" charset="0"/>
+                <a:ea typeface="+mn-ea"/>
+                <a:cs typeface="+mn-cs"/>
+              </a:rPr>
+              <a:t>used in this thesis are taken from a real wind farm with GE 2.75-103 model</a:t>
+            </a:r>
+            <a:r>
+              <a:rPr lang="tr-TR" sz="1200" b="0" i="0" u="none" strike="noStrike" kern="1200" baseline="0" dirty="0" smtClean="0">
+                <a:solidFill>
+                  <a:schemeClr val="tx1"/>
+                </a:solidFill>
+                <a:latin typeface="Arial" pitchFamily="34" charset="0"/>
+                <a:ea typeface="+mn-ea"/>
+                <a:cs typeface="+mn-cs"/>
+              </a:rPr>
+              <a:t> </a:t>
+            </a:r>
+            <a:r>
+              <a:rPr lang="en-GB" sz="1200" b="0" i="0" u="none" strike="noStrike" kern="1200" baseline="0" dirty="0" smtClean="0">
+                <a:solidFill>
+                  <a:schemeClr val="tx1"/>
+                </a:solidFill>
+                <a:latin typeface="Arial" pitchFamily="34" charset="0"/>
+                <a:ea typeface="+mn-ea"/>
+                <a:cs typeface="+mn-cs"/>
+              </a:rPr>
+              <a:t>wind turbines between 01/01/2017 and 21/08/2017.</a:t>
+            </a:r>
+            <a:endParaRPr lang="tr-TR" sz="1200" b="0" i="0" u="none" strike="noStrike" kern="1200" baseline="0" dirty="0" smtClean="0">
+              <a:solidFill>
+                <a:schemeClr val="tx1"/>
+              </a:solidFill>
+              <a:latin typeface="Arial" pitchFamily="34" charset="0"/>
+              <a:ea typeface="+mn-ea"/>
+              <a:cs typeface="+mn-cs"/>
+            </a:endParaRPr>
+          </a:p>
+          <a:p>
+            <a:pPr marL="0" marR="0" indent="0" algn="l" defTabSz="914400" rtl="0" eaLnBrk="0" fontAlgn="base" latinLnBrk="0" hangingPunct="0">
+              <a:lnSpc>
+                <a:spcPct val="100000"/>
+              </a:lnSpc>
+              <a:spcBef>
+                <a:spcPct val="30000"/>
+              </a:spcBef>
+              <a:spcAft>
+                <a:spcPct val="0"/>
+              </a:spcAft>
+              <a:buClrTx/>
+              <a:buSzTx/>
+              <a:buFontTx/>
+              <a:buNone/>
+              <a:tabLst/>
+              <a:defRPr/>
+            </a:pPr>
+            <a:r>
               <a:rPr lang="tr-TR" altLang="en-US" dirty="0" smtClean="0"/>
-              <a:t>Main contribution of the wind turbine is in between the wind speed range of 3-10m/s.</a:t>
-            </a:r>
-            <a:endParaRPr lang="en-US" altLang="en-US" dirty="0" smtClean="0"/>
+              <a:t>Main contribution of the wind turbine is in between the wind speed range of 3-10m/s. </a:t>
+            </a:r>
+          </a:p>
+          <a:p>
+            <a:endParaRPr lang="tr-TR" altLang="en-US" sz="1200" b="0" i="0" u="none" strike="noStrike" kern="1200" baseline="0" dirty="0" smtClean="0">
+              <a:solidFill>
+                <a:schemeClr val="tx1"/>
+              </a:solidFill>
+              <a:latin typeface="Arial" pitchFamily="34" charset="0"/>
+              <a:ea typeface="+mn-ea"/>
+              <a:cs typeface="+mn-cs"/>
+            </a:endParaRPr>
           </a:p>
         </p:txBody>
       </p:sp>
@@ -1131,7 +1218,7 @@
     </p:spTree>
     <p:extLst>
       <p:ext uri="{BB962C8B-B14F-4D97-AF65-F5344CB8AC3E}">
-        <p14:creationId xmlns:p14="http://schemas.microsoft.com/office/powerpoint/2010/main" val="26789055"/>
+        <p14:creationId xmlns:p14="http://schemas.microsoft.com/office/powerpoint/2010/main" val="3372365603"/>
       </p:ext>
     </p:extLst>
   </p:cSld>
@@ -1197,7 +1284,7 @@
           <a:p>
             <a:r>
               <a:rPr lang="tr-TR" altLang="en-US" dirty="0" smtClean="0"/>
-              <a:t>Low wind scenario.</a:t>
+              <a:t>Main contribution of the wind turbine is in between the wind speed range of 3-10m/s.</a:t>
             </a:r>
             <a:endParaRPr lang="en-US" altLang="en-US" dirty="0" smtClean="0"/>
           </a:p>
@@ -1224,7 +1311,7 @@
     </p:spTree>
     <p:extLst>
       <p:ext uri="{BB962C8B-B14F-4D97-AF65-F5344CB8AC3E}">
-        <p14:creationId xmlns:p14="http://schemas.microsoft.com/office/powerpoint/2010/main" val="2507398154"/>
+        <p14:creationId xmlns:p14="http://schemas.microsoft.com/office/powerpoint/2010/main" val="26789055"/>
       </p:ext>
     </p:extLst>
   </p:cSld>
@@ -1317,7 +1404,7 @@
     </p:spTree>
     <p:extLst>
       <p:ext uri="{BB962C8B-B14F-4D97-AF65-F5344CB8AC3E}">
-        <p14:creationId xmlns:p14="http://schemas.microsoft.com/office/powerpoint/2010/main" val="882592538"/>
+        <p14:creationId xmlns:p14="http://schemas.microsoft.com/office/powerpoint/2010/main" val="1266963483"/>
       </p:ext>
     </p:extLst>
   </p:cSld>
@@ -1381,7 +1468,11 @@
           <a:bodyPr/>
           <a:lstStyle/>
           <a:p>
-            <a:endParaRPr lang="en-US" altLang="en-US" smtClean="0"/>
+            <a:r>
+              <a:rPr lang="tr-TR" altLang="en-US" dirty="0" smtClean="0"/>
+              <a:t>Low wind scenario.</a:t>
+            </a:r>
+            <a:endParaRPr lang="en-US" altLang="en-US" dirty="0" smtClean="0"/>
           </a:p>
         </p:txBody>
       </p:sp>
@@ -1406,7 +1497,7 @@
     </p:spTree>
     <p:extLst>
       <p:ext uri="{BB962C8B-B14F-4D97-AF65-F5344CB8AC3E}">
-        <p14:creationId xmlns:p14="http://schemas.microsoft.com/office/powerpoint/2010/main" val="241080979"/>
+        <p14:creationId xmlns:p14="http://schemas.microsoft.com/office/powerpoint/2010/main" val="2507398154"/>
       </p:ext>
     </p:extLst>
   </p:cSld>
@@ -1470,7 +1561,11 @@
           <a:bodyPr/>
           <a:lstStyle/>
           <a:p>
-            <a:endParaRPr lang="en-US" altLang="en-US" smtClean="0"/>
+            <a:r>
+              <a:rPr lang="tr-TR" altLang="en-US" dirty="0" smtClean="0"/>
+              <a:t>Low wind scenario.</a:t>
+            </a:r>
+            <a:endParaRPr lang="en-US" altLang="en-US" dirty="0" smtClean="0"/>
           </a:p>
         </p:txBody>
       </p:sp>
@@ -1495,7 +1590,7 @@
     </p:spTree>
     <p:extLst>
       <p:ext uri="{BB962C8B-B14F-4D97-AF65-F5344CB8AC3E}">
-        <p14:creationId xmlns:p14="http://schemas.microsoft.com/office/powerpoint/2010/main" val="1869415738"/>
+        <p14:creationId xmlns:p14="http://schemas.microsoft.com/office/powerpoint/2010/main" val="1605599515"/>
       </p:ext>
     </p:extLst>
   </p:cSld>
@@ -1648,7 +1743,11 @@
           <a:bodyPr/>
           <a:lstStyle/>
           <a:p>
-            <a:endParaRPr lang="en-US" altLang="en-US" smtClean="0"/>
+            <a:r>
+              <a:rPr lang="tr-TR" altLang="en-US" dirty="0" smtClean="0"/>
+              <a:t>High Wind Scenario.</a:t>
+            </a:r>
+            <a:endParaRPr lang="en-US" altLang="en-US" dirty="0" smtClean="0"/>
           </a:p>
         </p:txBody>
       </p:sp>
@@ -1673,7 +1772,7 @@
     </p:spTree>
     <p:extLst>
       <p:ext uri="{BB962C8B-B14F-4D97-AF65-F5344CB8AC3E}">
-        <p14:creationId xmlns:p14="http://schemas.microsoft.com/office/powerpoint/2010/main" val="1405241526"/>
+        <p14:creationId xmlns:p14="http://schemas.microsoft.com/office/powerpoint/2010/main" val="882592538"/>
       </p:ext>
     </p:extLst>
   </p:cSld>
@@ -1762,7 +1861,7 @@
     </p:spTree>
     <p:extLst>
       <p:ext uri="{BB962C8B-B14F-4D97-AF65-F5344CB8AC3E}">
-        <p14:creationId xmlns:p14="http://schemas.microsoft.com/office/powerpoint/2010/main" val="3768665643"/>
+        <p14:creationId xmlns:p14="http://schemas.microsoft.com/office/powerpoint/2010/main" val="241080979"/>
       </p:ext>
     </p:extLst>
   </p:cSld>
@@ -1826,30 +1925,7 @@
           <a:bodyPr/>
           <a:lstStyle/>
           <a:p>
-            <a:r>
-              <a:rPr lang="tr-TR" altLang="en-US" dirty="0" smtClean="0"/>
-              <a:t>In order to investigate the effect of the synthetic</a:t>
-            </a:r>
-            <a:r>
-              <a:rPr lang="tr-TR" altLang="en-US" baseline="0" dirty="0" smtClean="0"/>
-              <a:t> inertia implementation, the 2018 generation data has been used. In the figure, black line shows the variation of the generation meanwhile the red line shows the generation of wind + solar energy. The maximum generation occured in the 3th of August with a generation of 46GW. The minimum of the load has occured in  a religious holiday on the 16th of July with a generation of 18GW. </a:t>
-            </a:r>
-          </a:p>
-          <a:p>
-            <a:r>
-              <a:rPr lang="tr-TR" altLang="en-US" baseline="0" dirty="0" smtClean="0"/>
-              <a:t>The generation data can be used to roughly estimate the aggregated inertia constant in the grid.</a:t>
-            </a:r>
-          </a:p>
-          <a:p>
-            <a:endParaRPr lang="tr-TR" altLang="en-US" baseline="0" dirty="0" smtClean="0"/>
-          </a:p>
-          <a:p>
-            <a:r>
-              <a:rPr lang="tr-TR" altLang="en-US" baseline="0" dirty="0" smtClean="0"/>
-              <a:t>As stated before, the effective inertia contribution from wind and solar systems are zero. Moreover, the inertia constants of the synchronous generators vary between 2-9. By using zero inertia constant for wind and solar, H=5s for others, the effective inertia constant can be calculated.s</a:t>
-            </a:r>
-            <a:endParaRPr lang="en-US" altLang="en-US" dirty="0" smtClean="0"/>
+            <a:endParaRPr lang="en-US" altLang="en-US" smtClean="0"/>
           </a:p>
         </p:txBody>
       </p:sp>
@@ -1874,7 +1950,7 @@
     </p:spTree>
     <p:extLst>
       <p:ext uri="{BB962C8B-B14F-4D97-AF65-F5344CB8AC3E}">
-        <p14:creationId xmlns:p14="http://schemas.microsoft.com/office/powerpoint/2010/main" val="1200317172"/>
+        <p14:creationId xmlns:p14="http://schemas.microsoft.com/office/powerpoint/2010/main" val="1869415738"/>
       </p:ext>
     </p:extLst>
   </p:cSld>
@@ -1938,30 +2014,7 @@
           <a:bodyPr/>
           <a:lstStyle/>
           <a:p>
-            <a:r>
-              <a:rPr lang="tr-TR" altLang="en-US" dirty="0" smtClean="0"/>
-              <a:t>The effective</a:t>
-            </a:r>
-            <a:r>
-              <a:rPr lang="tr-TR" altLang="en-US" baseline="0" dirty="0" smtClean="0"/>
-              <a:t> aggregated inertia in the system is shown in the graph. Notice that the inertia constant decreases down to 3.97s when the 20% of the generation is supplied from wind and solar in 26/09/2019 on 3 pm. </a:t>
-            </a:r>
-          </a:p>
-          <a:p>
-            <a:endParaRPr lang="tr-TR" altLang="en-US" baseline="0" dirty="0" smtClean="0"/>
-          </a:p>
-          <a:p>
-            <a:r>
-              <a:rPr lang="tr-TR" altLang="en-US" baseline="0" dirty="0" smtClean="0"/>
-              <a:t>It is possible to improve the effective inertia constant of the grid with synthetic inertia implementation. Note that the 54% of the installed wind energy systems in Turkey has FSPC. By assuming that 54% of wind energy production is obtained from these wind turbines and implementin inertia constant of h=10s, the improvement can be calculated. </a:t>
-            </a:r>
-          </a:p>
-          <a:p>
-            <a:r>
-              <a:rPr lang="tr-TR" altLang="en-US" baseline="0" dirty="0" smtClean="0"/>
-              <a:t>When the method is implemented on the wind turbines with FSPCs, </a:t>
-            </a:r>
-            <a:endParaRPr lang="en-US" altLang="en-US" dirty="0" smtClean="0"/>
+            <a:endParaRPr lang="en-US" altLang="en-US" smtClean="0"/>
           </a:p>
         </p:txBody>
       </p:sp>
@@ -1986,7 +2039,7 @@
     </p:spTree>
     <p:extLst>
       <p:ext uri="{BB962C8B-B14F-4D97-AF65-F5344CB8AC3E}">
-        <p14:creationId xmlns:p14="http://schemas.microsoft.com/office/powerpoint/2010/main" val="2155285927"/>
+        <p14:creationId xmlns:p14="http://schemas.microsoft.com/office/powerpoint/2010/main" val="1405241526"/>
       </p:ext>
     </p:extLst>
   </p:cSld>
@@ -2050,15 +2103,7 @@
           <a:bodyPr/>
           <a:lstStyle/>
           <a:p>
-            <a:r>
-              <a:rPr lang="tr-TR" altLang="en-US" dirty="0" smtClean="0"/>
-              <a:t>The existing</a:t>
-            </a:r>
-            <a:r>
-              <a:rPr lang="tr-TR" altLang="en-US" baseline="0" dirty="0" smtClean="0"/>
-              <a:t> inertia constant and inertia constant with synthetic inertia is shown in the figure. Notice that the inertia constant is above the H=5s. That means the wind turbines can compensate the decrease in the inertia constant caused by them and also caused by solar energy. Note that the inertia constant is maximum where the existings case inertia constant is minimum. </a:t>
-            </a:r>
-            <a:endParaRPr lang="en-US" altLang="en-US" dirty="0" smtClean="0"/>
+            <a:endParaRPr lang="en-US" altLang="en-US" smtClean="0"/>
           </a:p>
         </p:txBody>
       </p:sp>
@@ -2083,7 +2128,7 @@
     </p:spTree>
     <p:extLst>
       <p:ext uri="{BB962C8B-B14F-4D97-AF65-F5344CB8AC3E}">
-        <p14:creationId xmlns:p14="http://schemas.microsoft.com/office/powerpoint/2010/main" val="1334382131"/>
+        <p14:creationId xmlns:p14="http://schemas.microsoft.com/office/powerpoint/2010/main" val="3768665643"/>
       </p:ext>
     </p:extLst>
   </p:cSld>
@@ -2147,7 +2192,30 @@
           <a:bodyPr/>
           <a:lstStyle/>
           <a:p>
-            <a:endParaRPr lang="en-US" altLang="en-US" smtClean="0"/>
+            <a:r>
+              <a:rPr lang="tr-TR" altLang="en-US" dirty="0" smtClean="0"/>
+              <a:t>In order to investigate the effect of the synthetic</a:t>
+            </a:r>
+            <a:r>
+              <a:rPr lang="tr-TR" altLang="en-US" baseline="0" dirty="0" smtClean="0"/>
+              <a:t> inertia implementation, the 2018 generation data has been used. In the figure, black line shows the variation of the generation meanwhile the red line shows the generation of wind + solar energy. The maximum generation occured in the 3th of August with a generation of 46GW. The minimum of the load has occured in  a religious holiday on the 16th of July with a generation of 18GW. </a:t>
+            </a:r>
+          </a:p>
+          <a:p>
+            <a:r>
+              <a:rPr lang="tr-TR" altLang="en-US" baseline="0" dirty="0" smtClean="0"/>
+              <a:t>The generation data can be used to roughly estimate the aggregated inertia constant in the grid.</a:t>
+            </a:r>
+          </a:p>
+          <a:p>
+            <a:endParaRPr lang="tr-TR" altLang="en-US" baseline="0" dirty="0" smtClean="0"/>
+          </a:p>
+          <a:p>
+            <a:r>
+              <a:rPr lang="tr-TR" altLang="en-US" baseline="0" dirty="0" smtClean="0"/>
+              <a:t>As stated before, the effective inertia contribution from wind and solar systems are zero. Moreover, the inertia constants of the synchronous generators vary between 2-9. By using zero inertia constant for wind and solar, H=5s for others, the effective inertia constant can be calculated.s</a:t>
+            </a:r>
+            <a:endParaRPr lang="en-US" altLang="en-US" dirty="0" smtClean="0"/>
           </a:p>
         </p:txBody>
       </p:sp>
@@ -2172,7 +2240,7 @@
     </p:spTree>
     <p:extLst>
       <p:ext uri="{BB962C8B-B14F-4D97-AF65-F5344CB8AC3E}">
-        <p14:creationId xmlns:p14="http://schemas.microsoft.com/office/powerpoint/2010/main" val="3797404516"/>
+        <p14:creationId xmlns:p14="http://schemas.microsoft.com/office/powerpoint/2010/main" val="1200317172"/>
       </p:ext>
     </p:extLst>
   </p:cSld>
@@ -2236,7 +2304,30 @@
           <a:bodyPr/>
           <a:lstStyle/>
           <a:p>
-            <a:endParaRPr lang="en-US" altLang="en-US" smtClean="0"/>
+            <a:r>
+              <a:rPr lang="tr-TR" altLang="en-US" dirty="0" smtClean="0"/>
+              <a:t>The effective</a:t>
+            </a:r>
+            <a:r>
+              <a:rPr lang="tr-TR" altLang="en-US" baseline="0" dirty="0" smtClean="0"/>
+              <a:t> aggregated inertia in the system is shown in the graph. Notice that the inertia constant decreases down to 3.97s when the 20% of the generation is supplied from wind and solar in 26/09/2019 on 3 pm. </a:t>
+            </a:r>
+          </a:p>
+          <a:p>
+            <a:endParaRPr lang="tr-TR" altLang="en-US" baseline="0" dirty="0" smtClean="0"/>
+          </a:p>
+          <a:p>
+            <a:r>
+              <a:rPr lang="tr-TR" altLang="en-US" baseline="0" dirty="0" smtClean="0"/>
+              <a:t>It is possible to improve the effective inertia constant of the grid with synthetic inertia implementation. Note that the 54% of the installed wind energy systems in Turkey has FSPC. By assuming that 54% of wind energy production is obtained from these wind turbines and implementin inertia constant of h=10s, the improvement can be calculated. </a:t>
+            </a:r>
+          </a:p>
+          <a:p>
+            <a:r>
+              <a:rPr lang="tr-TR" altLang="en-US" baseline="0" dirty="0" smtClean="0"/>
+              <a:t>When the method is implemented on the wind turbines with FSPCs, </a:t>
+            </a:r>
+            <a:endParaRPr lang="en-US" altLang="en-US" dirty="0" smtClean="0"/>
           </a:p>
         </p:txBody>
       </p:sp>
@@ -2261,7 +2352,7 @@
     </p:spTree>
     <p:extLst>
       <p:ext uri="{BB962C8B-B14F-4D97-AF65-F5344CB8AC3E}">
-        <p14:creationId xmlns:p14="http://schemas.microsoft.com/office/powerpoint/2010/main" val="1157825987"/>
+        <p14:creationId xmlns:p14="http://schemas.microsoft.com/office/powerpoint/2010/main" val="2155285927"/>
       </p:ext>
     </p:extLst>
   </p:cSld>
@@ -2325,7 +2416,15 @@
           <a:bodyPr/>
           <a:lstStyle/>
           <a:p>
-            <a:endParaRPr lang="en-US" altLang="en-US" smtClean="0"/>
+            <a:r>
+              <a:rPr lang="tr-TR" altLang="en-US" dirty="0" smtClean="0"/>
+              <a:t>The existing</a:t>
+            </a:r>
+            <a:r>
+              <a:rPr lang="tr-TR" altLang="en-US" baseline="0" dirty="0" smtClean="0"/>
+              <a:t> inertia constant and inertia constant with synthetic inertia is shown in the figure. Notice that the inertia constant is above the H=5s. That means the wind turbines can compensate the decrease in the inertia constant caused by them and also caused by solar energy. Note that the inertia constant is maximum where the existings case inertia constant is minimum. </a:t>
+            </a:r>
+            <a:endParaRPr lang="en-US" altLang="en-US" dirty="0" smtClean="0"/>
           </a:p>
         </p:txBody>
       </p:sp>
@@ -2350,7 +2449,7 @@
     </p:spTree>
     <p:extLst>
       <p:ext uri="{BB962C8B-B14F-4D97-AF65-F5344CB8AC3E}">
-        <p14:creationId xmlns:p14="http://schemas.microsoft.com/office/powerpoint/2010/main" val="3043029249"/>
+        <p14:creationId xmlns:p14="http://schemas.microsoft.com/office/powerpoint/2010/main" val="1334382131"/>
       </p:ext>
     </p:extLst>
   </p:cSld>
@@ -2439,7 +2538,96 @@
     </p:spTree>
     <p:extLst>
       <p:ext uri="{BB962C8B-B14F-4D97-AF65-F5344CB8AC3E}">
-        <p14:creationId xmlns:p14="http://schemas.microsoft.com/office/powerpoint/2010/main" val="2888767487"/>
+        <p14:creationId xmlns:p14="http://schemas.microsoft.com/office/powerpoint/2010/main" val="3797404516"/>
+      </p:ext>
+    </p:extLst>
+  </p:cSld>
+  <p:clrMapOvr>
+    <a:masterClrMapping/>
+  </p:clrMapOvr>
+</p:notes>
+</file>
+
+<file path=ppt/notesSlides/notesSlide29.xml><?xml version="1.0" encoding="utf-8"?>
+<p:notes xmlns:a="http://schemas.openxmlformats.org/drawingml/2006/main" xmlns:r="http://schemas.openxmlformats.org/officeDocument/2006/relationships" xmlns:p="http://schemas.openxmlformats.org/presentationml/2006/main">
+  <p:cSld>
+    <p:spTree>
+      <p:nvGrpSpPr>
+        <p:cNvPr id="1" name=""/>
+        <p:cNvGrpSpPr/>
+        <p:nvPr/>
+      </p:nvGrpSpPr>
+      <p:grpSpPr>
+        <a:xfrm>
+          <a:off x="0" y="0"/>
+          <a:ext cx="0" cy="0"/>
+          <a:chOff x="0" y="0"/>
+          <a:chExt cx="0" cy="0"/>
+        </a:xfrm>
+      </p:grpSpPr>
+      <p:sp>
+        <p:nvSpPr>
+          <p:cNvPr id="35842" name="Rectangle 2"/>
+          <p:cNvSpPr>
+            <a:spLocks noGrp="1" noChangeArrowheads="1"/>
+          </p:cNvSpPr>
+          <p:nvPr>
+            <p:ph type="body" idx="1"/>
+          </p:nvPr>
+        </p:nvSpPr>
+        <p:spPr>
+          <a:noFill/>
+          <a:ln w="9525"/>
+          <a:extLst>
+            <a:ext uri="{909E8E84-426E-40DD-AFC4-6F175D3DCCD1}">
+              <a14:hiddenFill xmlns:a14="http://schemas.microsoft.com/office/drawing/2010/main">
+                <a:solidFill>
+                  <a:srgbClr val="FFFFFF"/>
+                </a:solidFill>
+              </a14:hiddenFill>
+            </a:ext>
+            <a:ext uri="{91240B29-F687-4F45-9708-019B960494DF}">
+              <a14:hiddenLine xmlns:a14="http://schemas.microsoft.com/office/drawing/2010/main" w="9525">
+                <a:solidFill>
+                  <a:srgbClr val="000000"/>
+                </a:solidFill>
+                <a:miter lim="800000"/>
+                <a:headEnd/>
+                <a:tailEnd/>
+              </a14:hiddenLine>
+            </a:ext>
+          </a:extLst>
+        </p:spPr>
+        <p:txBody>
+          <a:bodyPr/>
+          <a:lstStyle/>
+          <a:p>
+            <a:endParaRPr lang="en-US" altLang="en-US" smtClean="0"/>
+          </a:p>
+        </p:txBody>
+      </p:sp>
+      <p:sp>
+        <p:nvSpPr>
+          <p:cNvPr id="35843" name="Rectangle 3"/>
+          <p:cNvSpPr>
+            <a:spLocks noGrp="1" noRot="1" noChangeAspect="1" noChangeArrowheads="1" noTextEdit="1"/>
+          </p:cNvSpPr>
+          <p:nvPr>
+            <p:ph type="sldImg"/>
+          </p:nvPr>
+        </p:nvSpPr>
+        <p:spPr>
+          <a:xfrm>
+            <a:off x="1057275" y="865188"/>
+            <a:ext cx="4632325" cy="3475037"/>
+          </a:xfrm>
+          <a:ln cap="flat"/>
+        </p:spPr>
+      </p:sp>
+    </p:spTree>
+    <p:extLst>
+      <p:ext uri="{BB962C8B-B14F-4D97-AF65-F5344CB8AC3E}">
+        <p14:creationId xmlns:p14="http://schemas.microsoft.com/office/powerpoint/2010/main" val="1157825987"/>
       </p:ext>
     </p:extLst>
   </p:cSld>
@@ -2503,20 +2691,7 @@
           <a:bodyPr/>
           <a:lstStyle/>
           <a:p>
-            <a:r>
-              <a:rPr lang="tr-TR" altLang="en-US" dirty="0" smtClean="0"/>
-              <a:t>Synchronous</a:t>
-            </a:r>
-            <a:r>
-              <a:rPr lang="tr-TR" altLang="en-US" baseline="0" dirty="0" smtClean="0"/>
-              <a:t> generators produces torque only in synchronous speed. </a:t>
-            </a:r>
-          </a:p>
-          <a:p>
-            <a:r>
-              <a:rPr lang="tr-TR" altLang="en-US" baseline="0" dirty="0" smtClean="0"/>
-              <a:t>When they are sycnhronized to grid frequency, Tm=Te</a:t>
-            </a:r>
+            <a:endParaRPr lang="en-US" altLang="en-US" smtClean="0"/>
           </a:p>
         </p:txBody>
       </p:sp>
@@ -2541,7 +2716,185 @@
     </p:spTree>
     <p:extLst>
       <p:ext uri="{BB962C8B-B14F-4D97-AF65-F5344CB8AC3E}">
-        <p14:creationId xmlns:p14="http://schemas.microsoft.com/office/powerpoint/2010/main" val="1295029688"/>
+        <p14:creationId xmlns:p14="http://schemas.microsoft.com/office/powerpoint/2010/main" val="3879353991"/>
+      </p:ext>
+    </p:extLst>
+  </p:cSld>
+  <p:clrMapOvr>
+    <a:masterClrMapping/>
+  </p:clrMapOvr>
+</p:notes>
+</file>
+
+<file path=ppt/notesSlides/notesSlide30.xml><?xml version="1.0" encoding="utf-8"?>
+<p:notes xmlns:a="http://schemas.openxmlformats.org/drawingml/2006/main" xmlns:r="http://schemas.openxmlformats.org/officeDocument/2006/relationships" xmlns:p="http://schemas.openxmlformats.org/presentationml/2006/main">
+  <p:cSld>
+    <p:spTree>
+      <p:nvGrpSpPr>
+        <p:cNvPr id="1" name=""/>
+        <p:cNvGrpSpPr/>
+        <p:nvPr/>
+      </p:nvGrpSpPr>
+      <p:grpSpPr>
+        <a:xfrm>
+          <a:off x="0" y="0"/>
+          <a:ext cx="0" cy="0"/>
+          <a:chOff x="0" y="0"/>
+          <a:chExt cx="0" cy="0"/>
+        </a:xfrm>
+      </p:grpSpPr>
+      <p:sp>
+        <p:nvSpPr>
+          <p:cNvPr id="35842" name="Rectangle 2"/>
+          <p:cNvSpPr>
+            <a:spLocks noGrp="1" noChangeArrowheads="1"/>
+          </p:cNvSpPr>
+          <p:nvPr>
+            <p:ph type="body" idx="1"/>
+          </p:nvPr>
+        </p:nvSpPr>
+        <p:spPr>
+          <a:noFill/>
+          <a:ln w="9525"/>
+          <a:extLst>
+            <a:ext uri="{909E8E84-426E-40DD-AFC4-6F175D3DCCD1}">
+              <a14:hiddenFill xmlns:a14="http://schemas.microsoft.com/office/drawing/2010/main">
+                <a:solidFill>
+                  <a:srgbClr val="FFFFFF"/>
+                </a:solidFill>
+              </a14:hiddenFill>
+            </a:ext>
+            <a:ext uri="{91240B29-F687-4F45-9708-019B960494DF}">
+              <a14:hiddenLine xmlns:a14="http://schemas.microsoft.com/office/drawing/2010/main" w="9525">
+                <a:solidFill>
+                  <a:srgbClr val="000000"/>
+                </a:solidFill>
+                <a:miter lim="800000"/>
+                <a:headEnd/>
+                <a:tailEnd/>
+              </a14:hiddenLine>
+            </a:ext>
+          </a:extLst>
+        </p:spPr>
+        <p:txBody>
+          <a:bodyPr/>
+          <a:lstStyle/>
+          <a:p>
+            <a:endParaRPr lang="en-US" altLang="en-US" smtClean="0"/>
+          </a:p>
+        </p:txBody>
+      </p:sp>
+      <p:sp>
+        <p:nvSpPr>
+          <p:cNvPr id="35843" name="Rectangle 3"/>
+          <p:cNvSpPr>
+            <a:spLocks noGrp="1" noRot="1" noChangeAspect="1" noChangeArrowheads="1" noTextEdit="1"/>
+          </p:cNvSpPr>
+          <p:nvPr>
+            <p:ph type="sldImg"/>
+          </p:nvPr>
+        </p:nvSpPr>
+        <p:spPr>
+          <a:xfrm>
+            <a:off x="1057275" y="865188"/>
+            <a:ext cx="4632325" cy="3475037"/>
+          </a:xfrm>
+          <a:ln cap="flat"/>
+        </p:spPr>
+      </p:sp>
+    </p:spTree>
+    <p:extLst>
+      <p:ext uri="{BB962C8B-B14F-4D97-AF65-F5344CB8AC3E}">
+        <p14:creationId xmlns:p14="http://schemas.microsoft.com/office/powerpoint/2010/main" val="3043029249"/>
+      </p:ext>
+    </p:extLst>
+  </p:cSld>
+  <p:clrMapOvr>
+    <a:masterClrMapping/>
+  </p:clrMapOvr>
+</p:notes>
+</file>
+
+<file path=ppt/notesSlides/notesSlide31.xml><?xml version="1.0" encoding="utf-8"?>
+<p:notes xmlns:a="http://schemas.openxmlformats.org/drawingml/2006/main" xmlns:r="http://schemas.openxmlformats.org/officeDocument/2006/relationships" xmlns:p="http://schemas.openxmlformats.org/presentationml/2006/main">
+  <p:cSld>
+    <p:spTree>
+      <p:nvGrpSpPr>
+        <p:cNvPr id="1" name=""/>
+        <p:cNvGrpSpPr/>
+        <p:nvPr/>
+      </p:nvGrpSpPr>
+      <p:grpSpPr>
+        <a:xfrm>
+          <a:off x="0" y="0"/>
+          <a:ext cx="0" cy="0"/>
+          <a:chOff x="0" y="0"/>
+          <a:chExt cx="0" cy="0"/>
+        </a:xfrm>
+      </p:grpSpPr>
+      <p:sp>
+        <p:nvSpPr>
+          <p:cNvPr id="35842" name="Rectangle 2"/>
+          <p:cNvSpPr>
+            <a:spLocks noGrp="1" noChangeArrowheads="1"/>
+          </p:cNvSpPr>
+          <p:nvPr>
+            <p:ph type="body" idx="1"/>
+          </p:nvPr>
+        </p:nvSpPr>
+        <p:spPr>
+          <a:noFill/>
+          <a:ln w="9525"/>
+          <a:extLst>
+            <a:ext uri="{909E8E84-426E-40DD-AFC4-6F175D3DCCD1}">
+              <a14:hiddenFill xmlns:a14="http://schemas.microsoft.com/office/drawing/2010/main">
+                <a:solidFill>
+                  <a:srgbClr val="FFFFFF"/>
+                </a:solidFill>
+              </a14:hiddenFill>
+            </a:ext>
+            <a:ext uri="{91240B29-F687-4F45-9708-019B960494DF}">
+              <a14:hiddenLine xmlns:a14="http://schemas.microsoft.com/office/drawing/2010/main" w="9525">
+                <a:solidFill>
+                  <a:srgbClr val="000000"/>
+                </a:solidFill>
+                <a:miter lim="800000"/>
+                <a:headEnd/>
+                <a:tailEnd/>
+              </a14:hiddenLine>
+            </a:ext>
+          </a:extLst>
+        </p:spPr>
+        <p:txBody>
+          <a:bodyPr/>
+          <a:lstStyle/>
+          <a:p>
+            <a:endParaRPr lang="en-US" altLang="en-US" smtClean="0"/>
+          </a:p>
+        </p:txBody>
+      </p:sp>
+      <p:sp>
+        <p:nvSpPr>
+          <p:cNvPr id="35843" name="Rectangle 3"/>
+          <p:cNvSpPr>
+            <a:spLocks noGrp="1" noRot="1" noChangeAspect="1" noChangeArrowheads="1" noTextEdit="1"/>
+          </p:cNvSpPr>
+          <p:nvPr>
+            <p:ph type="sldImg"/>
+          </p:nvPr>
+        </p:nvSpPr>
+        <p:spPr>
+          <a:xfrm>
+            <a:off x="1057275" y="865188"/>
+            <a:ext cx="4632325" cy="3475037"/>
+          </a:xfrm>
+          <a:ln cap="flat"/>
+        </p:spPr>
+      </p:sp>
+    </p:spTree>
+    <p:extLst>
+      <p:ext uri="{BB962C8B-B14F-4D97-AF65-F5344CB8AC3E}">
+        <p14:creationId xmlns:p14="http://schemas.microsoft.com/office/powerpoint/2010/main" val="2888767487"/>
       </p:ext>
     </p:extLst>
   </p:cSld>
@@ -2607,25 +2960,18 @@
           <a:p>
             <a:r>
               <a:rPr lang="tr-TR" altLang="en-US" dirty="0" smtClean="0"/>
-              <a:t>Swing Equation</a:t>
+              <a:t>Synchronous</a:t>
             </a:r>
             <a:r>
               <a:rPr lang="tr-TR" altLang="en-US" baseline="0" dirty="0" smtClean="0"/>
-              <a:t> is important for power system frequency stability and </a:t>
-            </a:r>
+              <a:t> generators produces torque only in synchronous speed. </a:t>
+            </a:r>
+          </a:p>
+          <a:p>
             <a:r>
               <a:rPr lang="tr-TR" altLang="en-US" baseline="0" dirty="0" smtClean="0"/>
-              <a:t>investigates </a:t>
-            </a:r>
-            <a:r>
-              <a:rPr lang="tr-TR" altLang="en-US" baseline="0" dirty="0" smtClean="0"/>
-              <a:t>the relation between speed and the power</a:t>
-            </a:r>
-            <a:r>
-              <a:rPr lang="tr-TR" altLang="en-US" baseline="0" dirty="0" smtClean="0"/>
-              <a:t>. As the frequency decreases, generator slows down and this creates an increase in the active power output.</a:t>
-            </a:r>
-            <a:endParaRPr lang="en-US" altLang="en-US" dirty="0" smtClean="0"/>
+              <a:t>When they are sycnhronized to grid frequency, Tm=Te</a:t>
+            </a:r>
           </a:p>
         </p:txBody>
       </p:sp>
@@ -2650,7 +2996,7 @@
     </p:spTree>
     <p:extLst>
       <p:ext uri="{BB962C8B-B14F-4D97-AF65-F5344CB8AC3E}">
-        <p14:creationId xmlns:p14="http://schemas.microsoft.com/office/powerpoint/2010/main" val="2535857714"/>
+        <p14:creationId xmlns:p14="http://schemas.microsoft.com/office/powerpoint/2010/main" val="1295029688"/>
       </p:ext>
     </p:extLst>
   </p:cSld>
@@ -2716,11 +3062,11 @@
           <a:p>
             <a:r>
               <a:rPr lang="tr-TR" altLang="en-US" dirty="0" smtClean="0"/>
-              <a:t>When all generators</a:t>
+              <a:t>Swing Equation</a:t>
             </a:r>
             <a:r>
               <a:rPr lang="tr-TR" altLang="en-US" baseline="0" dirty="0" smtClean="0"/>
-              <a:t> in the grid is considered as a single generator, </a:t>
+              <a:t> is important for power system frequency stability and investigates the relation between speed and the power. As the frequency decreases, generator slows down and this creates an increase in the active power output.</a:t>
             </a:r>
             <a:endParaRPr lang="en-US" altLang="en-US" dirty="0" smtClean="0"/>
           </a:p>
@@ -2747,7 +3093,7 @@
     </p:spTree>
     <p:extLst>
       <p:ext uri="{BB962C8B-B14F-4D97-AF65-F5344CB8AC3E}">
-        <p14:creationId xmlns:p14="http://schemas.microsoft.com/office/powerpoint/2010/main" val="259740434"/>
+        <p14:creationId xmlns:p14="http://schemas.microsoft.com/office/powerpoint/2010/main" val="2535857714"/>
       </p:ext>
     </p:extLst>
   </p:cSld>
@@ -2811,6 +3157,14 @@
           <a:bodyPr/>
           <a:lstStyle/>
           <a:p>
+            <a:r>
+              <a:rPr lang="tr-TR" altLang="en-US" dirty="0" smtClean="0"/>
+              <a:t>When all generators</a:t>
+            </a:r>
+            <a:r>
+              <a:rPr lang="tr-TR" altLang="en-US" baseline="0" dirty="0" smtClean="0"/>
+              <a:t> in the grid is considered as a single generator, </a:t>
+            </a:r>
             <a:endParaRPr lang="en-US" altLang="en-US" dirty="0" smtClean="0"/>
           </a:p>
         </p:txBody>
@@ -2836,7 +3190,7 @@
     </p:spTree>
     <p:extLst>
       <p:ext uri="{BB962C8B-B14F-4D97-AF65-F5344CB8AC3E}">
-        <p14:creationId xmlns:p14="http://schemas.microsoft.com/office/powerpoint/2010/main" val="1782739168"/>
+        <p14:creationId xmlns:p14="http://schemas.microsoft.com/office/powerpoint/2010/main" val="259740434"/>
       </p:ext>
     </p:extLst>
   </p:cSld>
@@ -2900,7 +3254,7 @@
           <a:bodyPr/>
           <a:lstStyle/>
           <a:p>
-            <a:endParaRPr lang="en-US" altLang="en-US" smtClean="0"/>
+            <a:endParaRPr lang="en-US" altLang="en-US" dirty="0" smtClean="0"/>
           </a:p>
         </p:txBody>
       </p:sp>
@@ -2925,7 +3279,7 @@
     </p:spTree>
     <p:extLst>
       <p:ext uri="{BB962C8B-B14F-4D97-AF65-F5344CB8AC3E}">
-        <p14:creationId xmlns:p14="http://schemas.microsoft.com/office/powerpoint/2010/main" val="4072548594"/>
+        <p14:creationId xmlns:p14="http://schemas.microsoft.com/office/powerpoint/2010/main" val="1782739168"/>
       </p:ext>
     </p:extLst>
   </p:cSld>
@@ -3014,7 +3368,7 @@
     </p:spTree>
     <p:extLst>
       <p:ext uri="{BB962C8B-B14F-4D97-AF65-F5344CB8AC3E}">
-        <p14:creationId xmlns:p14="http://schemas.microsoft.com/office/powerpoint/2010/main" val="1503054287"/>
+        <p14:creationId xmlns:p14="http://schemas.microsoft.com/office/powerpoint/2010/main" val="4072548594"/>
       </p:ext>
     </p:extLst>
   </p:cSld>
@@ -3078,15 +3432,7 @@
           <a:bodyPr/>
           <a:lstStyle/>
           <a:p>
-            <a:r>
-              <a:rPr lang="tr-TR" altLang="en-US" dirty="0" smtClean="0"/>
-              <a:t>Figure</a:t>
-            </a:r>
-            <a:r>
-              <a:rPr lang="tr-TR" altLang="en-US" baseline="0" dirty="0" smtClean="0"/>
-              <a:t> shows the modelling for the PMSG wind turbine that is connected to grid with FSPC. There are two converters in this type of the converter with different responsibilities. The one connected between DC-bus and grid is called Grid Side Converter and it is responsible for maintaining a constant DC-bus voltage and adjusting the reactive power that is injected to grid. The converter in between DC bus and PMSG is called Machine Side Controller. It is adjusts the generator and turbine speed to MPPT speed by controlling its output torque. When the output torque hits the limit, the speed cannot be regulated and exceeds the maximum allowable speeds. This is why Pitch angle controller is utilized. By increasing the pitch angle of the turbine, the aerodynamic power and aerodynamic torque is decreased. In this way, turbine speed is kept in the maximum in high speeds. </a:t>
-            </a:r>
-            <a:endParaRPr lang="en-US" altLang="en-US" dirty="0" smtClean="0"/>
+            <a:endParaRPr lang="en-US" altLang="en-US" smtClean="0"/>
           </a:p>
         </p:txBody>
       </p:sp>
@@ -3111,7 +3457,7 @@
     </p:spTree>
     <p:extLst>
       <p:ext uri="{BB962C8B-B14F-4D97-AF65-F5344CB8AC3E}">
-        <p14:creationId xmlns:p14="http://schemas.microsoft.com/office/powerpoint/2010/main" val="4238726091"/>
+        <p14:creationId xmlns:p14="http://schemas.microsoft.com/office/powerpoint/2010/main" val="1503054287"/>
       </p:ext>
     </p:extLst>
   </p:cSld>
@@ -6141,6 +6487,17 @@
               <a:rPr lang="tr-TR" dirty="0" smtClean="0"/>
               <a:t>The Degree of Master of Science</a:t>
             </a:r>
+          </a:p>
+          <a:p>
+            <a:pPr algn="ctr"/>
+            <a:r>
+              <a:rPr lang="tr-TR" dirty="0"/>
+              <a:t>i</a:t>
+            </a:r>
+            <a:r>
+              <a:rPr lang="tr-TR" dirty="0" smtClean="0"/>
+              <a:t>n Electrical and Electronics Engineering</a:t>
+            </a:r>
             <a:endParaRPr lang="tr-TR" dirty="0"/>
           </a:p>
         </p:txBody>
@@ -6201,7 +6558,7 @@
                 <a:latin typeface="Arial" panose="020B0604020202020204" pitchFamily="34" charset="0"/>
                 <a:cs typeface="Arial" panose="020B0604020202020204" pitchFamily="34" charset="0"/>
               </a:rPr>
-              <a:t>Wind Turbine Modelling</a:t>
+              <a:t>Renewable Energy Problems</a:t>
             </a:r>
             <a:endParaRPr lang="en-US" dirty="0" smtClean="0">
               <a:latin typeface="Arial" panose="020B0604020202020204" pitchFamily="34" charset="0"/>
@@ -6260,6 +6617,470 @@
                 <a:defRPr/>
               </a:pPr>
               <a:t>10</a:t>
+            </a:fld>
+            <a:endParaRPr lang="en-US" dirty="0"/>
+          </a:p>
+        </p:txBody>
+      </p:sp>
+      <p:sp>
+        <p:nvSpPr>
+          <p:cNvPr id="4" name="Content Placeholder 3"/>
+          <p:cNvSpPr>
+            <a:spLocks noGrp="1"/>
+          </p:cNvSpPr>
+          <p:nvPr>
+            <p:ph idx="1"/>
+          </p:nvPr>
+        </p:nvSpPr>
+        <p:spPr>
+          <a:xfrm>
+            <a:off x="457200" y="1430339"/>
+            <a:ext cx="8229600" cy="1782637"/>
+          </a:xfrm>
+        </p:spPr>
+        <p:txBody>
+          <a:bodyPr/>
+          <a:lstStyle/>
+          <a:p>
+            <a:r>
+              <a:rPr lang="tr-TR" dirty="0" smtClean="0">
+                <a:latin typeface="Arial" panose="020B0604020202020204" pitchFamily="34" charset="0"/>
+                <a:cs typeface="Arial" panose="020B0604020202020204" pitchFamily="34" charset="0"/>
+              </a:rPr>
+              <a:t>The synchronous generators contribute grid inertia by injecting more power in the frequency disturbances. </a:t>
+            </a:r>
+          </a:p>
+          <a:p>
+            <a:endParaRPr lang="tr-TR" dirty="0">
+              <a:latin typeface="Arial" panose="020B0604020202020204" pitchFamily="34" charset="0"/>
+              <a:cs typeface="Arial" panose="020B0604020202020204" pitchFamily="34" charset="0"/>
+            </a:endParaRPr>
+          </a:p>
+          <a:p>
+            <a:r>
+              <a:rPr lang="tr-TR" dirty="0" smtClean="0">
+                <a:latin typeface="Arial" panose="020B0604020202020204" pitchFamily="34" charset="0"/>
+                <a:cs typeface="Arial" panose="020B0604020202020204" pitchFamily="34" charset="0"/>
+              </a:rPr>
+              <a:t>The decrease in the grid inertia can be solved by emulating inertia support in the renewable energy systems. </a:t>
+            </a:r>
+          </a:p>
+        </p:txBody>
+      </p:sp>
+      <p:pic>
+        <p:nvPicPr>
+          <p:cNvPr id="7" name="Picture 6"/>
+          <p:cNvPicPr>
+            <a:picLocks noChangeAspect="1"/>
+          </p:cNvPicPr>
+          <p:nvPr/>
+        </p:nvPicPr>
+        <p:blipFill>
+          <a:blip r:embed="rId3">
+            <a:extLst>
+              <a:ext uri="{28A0092B-C50C-407E-A947-70E740481C1C}">
+                <a14:useLocalDpi xmlns:a14="http://schemas.microsoft.com/office/drawing/2010/main" val="0"/>
+              </a:ext>
+            </a:extLst>
+          </a:blip>
+          <a:stretch>
+            <a:fillRect/>
+          </a:stretch>
+        </p:blipFill>
+        <p:spPr>
+          <a:xfrm>
+            <a:off x="4788024" y="3383052"/>
+            <a:ext cx="4127644" cy="2473743"/>
+          </a:xfrm>
+          <a:prstGeom prst="rect">
+            <a:avLst/>
+          </a:prstGeom>
+        </p:spPr>
+      </p:pic>
+      <p:sp>
+        <p:nvSpPr>
+          <p:cNvPr id="10" name="Content Placeholder 3"/>
+          <p:cNvSpPr txBox="1">
+            <a:spLocks/>
+          </p:cNvSpPr>
+          <p:nvPr/>
+        </p:nvSpPr>
+        <p:spPr bwMode="auto">
+          <a:xfrm>
+            <a:off x="457199" y="3466124"/>
+            <a:ext cx="4000501" cy="1782637"/>
+          </a:xfrm>
+          <a:prstGeom prst="rect">
+            <a:avLst/>
+          </a:prstGeom>
+          <a:noFill/>
+          <a:ln>
+            <a:noFill/>
+          </a:ln>
+          <a:extLst>
+            <a:ext uri="{909E8E84-426E-40DD-AFC4-6F175D3DCCD1}">
+              <a14:hiddenFill xmlns:a14="http://schemas.microsoft.com/office/drawing/2010/main">
+                <a:solidFill>
+                  <a:srgbClr val="FFFFFF"/>
+                </a:solidFill>
+              </a14:hiddenFill>
+            </a:ext>
+            <a:ext uri="{91240B29-F687-4F45-9708-019B960494DF}">
+              <a14:hiddenLine xmlns:a14="http://schemas.microsoft.com/office/drawing/2010/main" w="9525">
+                <a:solidFill>
+                  <a:srgbClr val="000000"/>
+                </a:solidFill>
+                <a:miter lim="800000"/>
+                <a:headEnd/>
+                <a:tailEnd/>
+              </a14:hiddenLine>
+            </a:ext>
+          </a:extLst>
+        </p:spPr>
+        <p:txBody>
+          <a:bodyPr vert="horz" wrap="square" lIns="91440" tIns="45720" rIns="91440" bIns="45720" numCol="1" anchor="t" anchorCtr="0" compatLnSpc="1">
+            <a:prstTxWarp prst="textNoShape">
+              <a:avLst/>
+            </a:prstTxWarp>
+          </a:bodyPr>
+          <a:lstStyle>
+            <a:lvl1pPr marL="342900" indent="-342900" algn="l" rtl="0" eaLnBrk="1" fontAlgn="base" hangingPunct="1">
+              <a:spcBef>
+                <a:spcPct val="20000"/>
+              </a:spcBef>
+              <a:spcAft>
+                <a:spcPct val="0"/>
+              </a:spcAft>
+              <a:buClr>
+                <a:srgbClr val="C20024"/>
+              </a:buClr>
+              <a:buSzPct val="90000"/>
+              <a:buFont typeface="Arial" panose="020B0604020202020204" pitchFamily="34" charset="0"/>
+              <a:buChar char="•"/>
+              <a:defRPr sz="2000" kern="1200" baseline="0">
+                <a:solidFill>
+                  <a:schemeClr val="tx1"/>
+                </a:solidFill>
+                <a:latin typeface="Century Gothic" panose="020B0502020202020204" pitchFamily="34" charset="0"/>
+                <a:ea typeface="+mn-ea"/>
+                <a:cs typeface="Arial"/>
+              </a:defRPr>
+            </a:lvl1pPr>
+            <a:lvl2pPr marL="639763" indent="-457200" algn="l" rtl="0" eaLnBrk="1" fontAlgn="base" hangingPunct="1">
+              <a:spcBef>
+                <a:spcPts val="438"/>
+              </a:spcBef>
+              <a:spcAft>
+                <a:spcPct val="0"/>
+              </a:spcAft>
+              <a:buClr>
+                <a:srgbClr val="C00000"/>
+              </a:buClr>
+              <a:buSzPct val="80000"/>
+              <a:buFont typeface="Arial" panose="020B0604020202020204" pitchFamily="34" charset="0"/>
+              <a:buChar char="•"/>
+              <a:defRPr kern="1200">
+                <a:solidFill>
+                  <a:schemeClr val="tx1"/>
+                </a:solidFill>
+                <a:latin typeface="Century Gothic" panose="020B0502020202020204" pitchFamily="34" charset="0"/>
+                <a:ea typeface="+mn-ea"/>
+                <a:cs typeface="Arial"/>
+              </a:defRPr>
+            </a:lvl2pPr>
+            <a:lvl3pPr marL="914400" indent="-457200" algn="l" rtl="0" eaLnBrk="1" fontAlgn="base" hangingPunct="1">
+              <a:spcBef>
+                <a:spcPct val="20000"/>
+              </a:spcBef>
+              <a:spcAft>
+                <a:spcPct val="0"/>
+              </a:spcAft>
+              <a:buClr>
+                <a:schemeClr val="accent2"/>
+              </a:buClr>
+              <a:buSzPct val="70000"/>
+              <a:buFont typeface="Arial" panose="020B0604020202020204" pitchFamily="34" charset="0"/>
+              <a:buChar char="•"/>
+              <a:defRPr kern="1200">
+                <a:solidFill>
+                  <a:schemeClr val="tx1"/>
+                </a:solidFill>
+                <a:latin typeface="Century Gothic" panose="020B0502020202020204" pitchFamily="34" charset="0"/>
+                <a:ea typeface="+mn-ea"/>
+                <a:cs typeface="Arial"/>
+              </a:defRPr>
+            </a:lvl3pPr>
+            <a:lvl4pPr marL="1187450" indent="-457200" algn="l" rtl="0" eaLnBrk="1" fontAlgn="base" hangingPunct="1">
+              <a:spcBef>
+                <a:spcPct val="20000"/>
+              </a:spcBef>
+              <a:spcAft>
+                <a:spcPct val="0"/>
+              </a:spcAft>
+              <a:buClr>
+                <a:srgbClr val="C20024"/>
+              </a:buClr>
+              <a:buSzPct val="65000"/>
+              <a:buFont typeface="Arial" panose="020B0604020202020204" pitchFamily="34" charset="0"/>
+              <a:buChar char="•"/>
+              <a:defRPr kern="1200">
+                <a:solidFill>
+                  <a:schemeClr val="tx1"/>
+                </a:solidFill>
+                <a:latin typeface="Century Gothic" panose="020B0502020202020204" pitchFamily="34" charset="0"/>
+                <a:ea typeface="+mn-ea"/>
+                <a:cs typeface="Arial"/>
+              </a:defRPr>
+            </a:lvl4pPr>
+            <a:lvl5pPr marL="1004888" indent="0" algn="l" rtl="0" eaLnBrk="1" fontAlgn="base" hangingPunct="1">
+              <a:spcBef>
+                <a:spcPct val="20000"/>
+              </a:spcBef>
+              <a:spcAft>
+                <a:spcPct val="0"/>
+              </a:spcAft>
+              <a:buClr>
+                <a:srgbClr val="10CF9B"/>
+              </a:buClr>
+              <a:buSzPct val="65000"/>
+              <a:buFont typeface="Arial" panose="020B0604020202020204" pitchFamily="34" charset="0"/>
+              <a:buNone/>
+              <a:defRPr kern="1200">
+                <a:solidFill>
+                  <a:schemeClr val="tx1"/>
+                </a:solidFill>
+                <a:latin typeface="Century Gothic" panose="020B0502020202020204" pitchFamily="34" charset="0"/>
+                <a:ea typeface="+mn-ea"/>
+                <a:cs typeface="Arial"/>
+              </a:defRPr>
+            </a:lvl5pPr>
+            <a:lvl6pPr marL="1737360" indent="-210312" algn="l" rtl="0" eaLnBrk="1" latinLnBrk="0" hangingPunct="1">
+              <a:spcBef>
+                <a:spcPct val="20000"/>
+              </a:spcBef>
+              <a:buClr>
+                <a:schemeClr val="accent5"/>
+              </a:buClr>
+              <a:buSzPct val="80000"/>
+              <a:buFont typeface="Wingdings 2"/>
+              <a:buChar char=""/>
+              <a:defRPr kumimoji="0" sz="1800" kern="1200">
+                <a:solidFill>
+                  <a:schemeClr val="tx1"/>
+                </a:solidFill>
+                <a:latin typeface="+mn-lt"/>
+                <a:ea typeface="+mn-ea"/>
+                <a:cs typeface="+mn-cs"/>
+              </a:defRPr>
+            </a:lvl6pPr>
+            <a:lvl7pPr marL="1920240" indent="-182880" algn="l" rtl="0" eaLnBrk="1" latinLnBrk="0" hangingPunct="1">
+              <a:spcBef>
+                <a:spcPct val="20000"/>
+              </a:spcBef>
+              <a:buClr>
+                <a:schemeClr val="accent6"/>
+              </a:buClr>
+              <a:buSzPct val="80000"/>
+              <a:buFont typeface="Wingdings 2"/>
+              <a:buChar char=""/>
+              <a:defRPr kumimoji="0" sz="1600" kern="1200" baseline="0">
+                <a:solidFill>
+                  <a:schemeClr val="tx1"/>
+                </a:solidFill>
+                <a:latin typeface="+mn-lt"/>
+                <a:ea typeface="+mn-ea"/>
+                <a:cs typeface="+mn-cs"/>
+              </a:defRPr>
+            </a:lvl7pPr>
+            <a:lvl8pPr marL="2194560" indent="-182880" algn="l" rtl="0" eaLnBrk="1" latinLnBrk="0" hangingPunct="1">
+              <a:spcBef>
+                <a:spcPct val="20000"/>
+              </a:spcBef>
+              <a:buClr>
+                <a:schemeClr val="tx2"/>
+              </a:buClr>
+              <a:buChar char="•"/>
+              <a:defRPr kumimoji="0" sz="1600" kern="1200">
+                <a:solidFill>
+                  <a:schemeClr val="tx1"/>
+                </a:solidFill>
+                <a:latin typeface="+mn-lt"/>
+                <a:ea typeface="+mn-ea"/>
+                <a:cs typeface="+mn-cs"/>
+              </a:defRPr>
+            </a:lvl8pPr>
+            <a:lvl9pPr marL="2468880" indent="-182880" algn="l" rtl="0" eaLnBrk="1" latinLnBrk="0" hangingPunct="1">
+              <a:spcBef>
+                <a:spcPct val="20000"/>
+              </a:spcBef>
+              <a:buClr>
+                <a:schemeClr val="tx2"/>
+              </a:buClr>
+              <a:buFontTx/>
+              <a:buChar char="•"/>
+              <a:defRPr kumimoji="0" sz="1400" kern="1200" baseline="0">
+                <a:solidFill>
+                  <a:schemeClr val="tx1"/>
+                </a:solidFill>
+                <a:latin typeface="+mn-lt"/>
+                <a:ea typeface="+mn-ea"/>
+                <a:cs typeface="+mn-cs"/>
+              </a:defRPr>
+            </a:lvl9pPr>
+          </a:lstStyle>
+          <a:p>
+            <a:pPr algn="just"/>
+            <a:r>
+              <a:rPr lang="tr-TR" dirty="0" smtClean="0">
+                <a:latin typeface="Arial" panose="020B0604020202020204" pitchFamily="34" charset="0"/>
+                <a:cs typeface="Arial" panose="020B0604020202020204" pitchFamily="34" charset="0"/>
+              </a:rPr>
+              <a:t>Wind </a:t>
+            </a:r>
+            <a:r>
+              <a:rPr lang="tr-TR" dirty="0">
+                <a:latin typeface="Arial" panose="020B0604020202020204" pitchFamily="34" charset="0"/>
+                <a:cs typeface="Arial" panose="020B0604020202020204" pitchFamily="34" charset="0"/>
+              </a:rPr>
+              <a:t>turbines with FSPC are the most promising type of renewable </a:t>
+            </a:r>
+            <a:r>
+              <a:rPr lang="tr-TR" dirty="0" smtClean="0">
+                <a:latin typeface="Arial" panose="020B0604020202020204" pitchFamily="34" charset="0"/>
+                <a:cs typeface="Arial" panose="020B0604020202020204" pitchFamily="34" charset="0"/>
+              </a:rPr>
+              <a:t>energy system due </a:t>
+            </a:r>
+            <a:r>
+              <a:rPr lang="tr-TR" dirty="0">
+                <a:latin typeface="Arial" panose="020B0604020202020204" pitchFamily="34" charset="0"/>
+                <a:cs typeface="Arial" panose="020B0604020202020204" pitchFamily="34" charset="0"/>
+              </a:rPr>
+              <a:t>to its kinetic energy in the turbine inertia and the ability to control active/reactive power. </a:t>
+            </a:r>
+          </a:p>
+        </p:txBody>
+      </p:sp>
+    </p:spTree>
+    <p:extLst>
+      <p:ext uri="{BB962C8B-B14F-4D97-AF65-F5344CB8AC3E}">
+        <p14:creationId xmlns:p14="http://schemas.microsoft.com/office/powerpoint/2010/main" val="3313184192"/>
+      </p:ext>
+    </p:extLst>
+  </p:cSld>
+  <p:clrMapOvr>
+    <a:masterClrMapping/>
+  </p:clrMapOvr>
+  <p:transition/>
+  <p:timing>
+    <p:tnLst>
+      <p:par>
+        <p:cTn id="1" dur="indefinite" restart="never" nodeType="tmRoot"/>
+      </p:par>
+    </p:tnLst>
+  </p:timing>
+</p:sld>
+</file>
+
+<file path=ppt/slides/slide11.xml><?xml version="1.0" encoding="utf-8"?>
+<p:sld xmlns:a="http://schemas.openxmlformats.org/drawingml/2006/main" xmlns:r="http://schemas.openxmlformats.org/officeDocument/2006/relationships" xmlns:p="http://schemas.openxmlformats.org/presentationml/2006/main">
+  <p:cSld>
+    <p:spTree>
+      <p:nvGrpSpPr>
+        <p:cNvPr id="1" name=""/>
+        <p:cNvGrpSpPr/>
+        <p:nvPr/>
+      </p:nvGrpSpPr>
+      <p:grpSpPr>
+        <a:xfrm>
+          <a:off x="0" y="0"/>
+          <a:ext cx="0" cy="0"/>
+          <a:chOff x="0" y="0"/>
+          <a:chExt cx="0" cy="0"/>
+        </a:xfrm>
+      </p:grpSpPr>
+      <p:sp>
+        <p:nvSpPr>
+          <p:cNvPr id="5122" name="Rectangle 2"/>
+          <p:cNvSpPr>
+            <a:spLocks noGrp="1" noChangeArrowheads="1"/>
+          </p:cNvSpPr>
+          <p:nvPr>
+            <p:ph type="title"/>
+          </p:nvPr>
+        </p:nvSpPr>
+        <p:spPr/>
+        <p:txBody>
+          <a:bodyPr/>
+          <a:lstStyle/>
+          <a:p>
+            <a:pPr>
+              <a:defRPr/>
+            </a:pPr>
+            <a:r>
+              <a:rPr lang="tr-TR" dirty="0" smtClean="0">
+                <a:latin typeface="Arial" panose="020B0604020202020204" pitchFamily="34" charset="0"/>
+                <a:cs typeface="Arial" panose="020B0604020202020204" pitchFamily="34" charset="0"/>
+              </a:rPr>
+              <a:t>Wind Turbine Modelling</a:t>
+            </a:r>
+            <a:endParaRPr lang="en-US" dirty="0" smtClean="0">
+              <a:latin typeface="Arial" panose="020B0604020202020204" pitchFamily="34" charset="0"/>
+              <a:cs typeface="Arial" panose="020B0604020202020204" pitchFamily="34" charset="0"/>
+            </a:endParaRPr>
+          </a:p>
+        </p:txBody>
+      </p:sp>
+      <p:sp>
+        <p:nvSpPr>
+          <p:cNvPr id="2" name="Date Placeholder 1"/>
+          <p:cNvSpPr>
+            <a:spLocks noGrp="1"/>
+          </p:cNvSpPr>
+          <p:nvPr>
+            <p:ph type="dt" sz="half" idx="2"/>
+          </p:nvPr>
+        </p:nvSpPr>
+        <p:spPr/>
+        <p:txBody>
+          <a:bodyPr/>
+          <a:lstStyle/>
+          <a:p>
+            <a:pPr>
+              <a:defRPr/>
+            </a:pPr>
+            <a:r>
+              <a:rPr lang="tr-TR" smtClean="0"/>
+              <a:t>18.01.2019</a:t>
+            </a:r>
+            <a:endParaRPr lang="en-US" dirty="0"/>
+          </a:p>
+        </p:txBody>
+      </p:sp>
+      <p:sp>
+        <p:nvSpPr>
+          <p:cNvPr id="3" name="Slide Number Placeholder 2"/>
+          <p:cNvSpPr>
+            <a:spLocks noGrp="1"/>
+          </p:cNvSpPr>
+          <p:nvPr>
+            <p:ph type="sldNum" sz="quarter" idx="12"/>
+          </p:nvPr>
+        </p:nvSpPr>
+        <p:spPr/>
+        <p:txBody>
+          <a:bodyPr/>
+          <a:lstStyle/>
+          <a:p>
+            <a:pPr>
+              <a:defRPr/>
+            </a:pPr>
+            <a:fld id="{C878F797-6006-4DDA-AFE9-456F280FE6C5}" type="slidenum">
+              <a:rPr lang="en-US" smtClean="0"/>
+              <a:pPr>
+                <a:defRPr/>
+              </a:pPr>
+              <a:t>11</a:t>
             </a:fld>
             <a:endParaRPr lang="en-US" dirty="0"/>
           </a:p>
@@ -6315,7 +7136,7 @@
 </p:sld>
 </file>
 
-<file path=ppt/slides/slide11.xml><?xml version="1.0" encoding="utf-8"?>
+<file path=ppt/slides/slide12.xml><?xml version="1.0" encoding="utf-8"?>
 <p:sld xmlns:a="http://schemas.openxmlformats.org/drawingml/2006/main" xmlns:r="http://schemas.openxmlformats.org/officeDocument/2006/relationships" xmlns:p="http://schemas.openxmlformats.org/presentationml/2006/main">
   <p:cSld>
     <p:spTree>
@@ -6413,7 +7234,7 @@
               <a:pPr>
                 <a:defRPr/>
               </a:pPr>
-              <a:t>11</a:t>
+              <a:t>12</a:t>
             </a:fld>
             <a:endParaRPr lang="en-US" dirty="0"/>
           </a:p>
@@ -6469,7 +7290,7 @@
 </p:sld>
 </file>
 
-<file path=ppt/slides/slide12.xml><?xml version="1.0" encoding="utf-8"?>
+<file path=ppt/slides/slide13.xml><?xml version="1.0" encoding="utf-8"?>
 <p:sld xmlns:a="http://schemas.openxmlformats.org/drawingml/2006/main" xmlns:r="http://schemas.openxmlformats.org/officeDocument/2006/relationships" xmlns:p="http://schemas.openxmlformats.org/presentationml/2006/main">
   <p:cSld>
     <p:spTree>
@@ -6567,7 +7388,7 @@
               <a:pPr>
                 <a:defRPr/>
               </a:pPr>
-              <a:t>12</a:t>
+              <a:t>13</a:t>
             </a:fld>
             <a:endParaRPr lang="en-US" dirty="0"/>
           </a:p>
@@ -6623,7 +7444,7 @@
 </p:sld>
 </file>
 
-<file path=ppt/slides/slide13.xml><?xml version="1.0" encoding="utf-8"?>
+<file path=ppt/slides/slide14.xml><?xml version="1.0" encoding="utf-8"?>
 <p:sld xmlns:a="http://schemas.openxmlformats.org/drawingml/2006/main" xmlns:r="http://schemas.openxmlformats.org/officeDocument/2006/relationships" xmlns:p="http://schemas.openxmlformats.org/presentationml/2006/main">
   <p:cSld>
     <p:spTree>
@@ -6721,7 +7542,7 @@
               <a:pPr>
                 <a:defRPr/>
               </a:pPr>
-              <a:t>13</a:t>
+              <a:t>14</a:t>
             </a:fld>
             <a:endParaRPr lang="en-US" dirty="0"/>
           </a:p>
@@ -7278,7 +8099,7 @@
 </p:sld>
 </file>
 
-<file path=ppt/slides/slide14.xml><?xml version="1.0" encoding="utf-8"?>
+<file path=ppt/slides/slide15.xml><?xml version="1.0" encoding="utf-8"?>
 <p:sld xmlns:a="http://schemas.openxmlformats.org/drawingml/2006/main" xmlns:r="http://schemas.openxmlformats.org/officeDocument/2006/relationships" xmlns:p="http://schemas.openxmlformats.org/presentationml/2006/main">
   <p:cSld>
     <p:spTree>
@@ -7376,513 +8197,12 @@
               <a:pPr>
                 <a:defRPr/>
               </a:pPr>
-              <a:t>14</a:t>
+              <a:t>15</a:t>
             </a:fld>
             <a:endParaRPr lang="en-US" dirty="0"/>
           </a:p>
         </p:txBody>
       </p:sp>
-      <mc:AlternateContent xmlns:mc="http://schemas.openxmlformats.org/markup-compatibility/2006" xmlns:a14="http://schemas.microsoft.com/office/drawing/2010/main">
-        <mc:Choice Requires="a14">
-          <p:sp>
-            <p:nvSpPr>
-              <p:cNvPr id="6" name="Rectangle 5"/>
-              <p:cNvSpPr/>
-              <p:nvPr/>
-            </p:nvSpPr>
-            <p:spPr>
-              <a:xfrm>
-                <a:off x="3556332" y="4445912"/>
-                <a:ext cx="2031325" cy="491738"/>
-              </a:xfrm>
-              <a:prstGeom prst="rect">
-                <a:avLst/>
-              </a:prstGeom>
-            </p:spPr>
-            <p:txBody>
-              <a:bodyPr wrap="none">
-                <a:spAutoFit/>
-              </a:bodyPr>
-              <a:lstStyle/>
-              <a:p>
-                <a14:m>
-                  <m:oMath xmlns:m="http://schemas.openxmlformats.org/officeDocument/2006/math">
-                    <m:sSub>
-                      <m:sSubPr>
-                        <m:ctrlPr>
-                          <a:rPr lang="tr-TR" i="1" smtClean="0">
-                            <a:latin typeface="Cambria Math" panose="02040503050406030204" pitchFamily="18" charset="0"/>
-                          </a:rPr>
-                        </m:ctrlPr>
-                      </m:sSubPr>
-                      <m:e>
-                        <m:r>
-                          <a:rPr lang="tr-TR" b="0" i="1" smtClean="0">
-                            <a:latin typeface="Cambria Math" panose="02040503050406030204" pitchFamily="18" charset="0"/>
-                          </a:rPr>
-                          <m:t>𝑃</m:t>
-                        </m:r>
-                      </m:e>
-                      <m:sub>
-                        <m:r>
-                          <a:rPr lang="tr-TR" b="0" i="1" smtClean="0">
-                            <a:latin typeface="Cambria Math" panose="02040503050406030204" pitchFamily="18" charset="0"/>
-                          </a:rPr>
-                          <m:t>𝑔𝑒𝑛</m:t>
-                        </m:r>
-                      </m:sub>
-                    </m:sSub>
-                  </m:oMath>
-                </a14:m>
-                <a:r>
-                  <a:rPr lang="tr-TR" dirty="0" smtClean="0"/>
-                  <a:t>=</a:t>
-                </a:r>
-                <a14:m>
-                  <m:oMath xmlns:m="http://schemas.openxmlformats.org/officeDocument/2006/math">
-                    <m:sSub>
-                      <m:sSubPr>
-                        <m:ctrlPr>
-                          <a:rPr lang="tr-TR" i="1">
-                            <a:latin typeface="Cambria Math" panose="02040503050406030204" pitchFamily="18" charset="0"/>
-                          </a:rPr>
-                        </m:ctrlPr>
-                      </m:sSubPr>
-                      <m:e>
-                        <m:r>
-                          <a:rPr lang="tr-TR" b="0" i="1" smtClean="0">
-                            <a:latin typeface="Cambria Math" panose="02040503050406030204" pitchFamily="18" charset="0"/>
-                          </a:rPr>
-                          <m:t>𝑇</m:t>
-                        </m:r>
-                      </m:e>
-                      <m:sub>
-                        <m:r>
-                          <a:rPr lang="tr-TR" b="0" i="1" smtClean="0">
-                            <a:latin typeface="Cambria Math" panose="02040503050406030204" pitchFamily="18" charset="0"/>
-                          </a:rPr>
-                          <m:t>𝑒</m:t>
-                        </m:r>
-                      </m:sub>
-                    </m:sSub>
-                    <m:sSub>
-                      <m:sSubPr>
-                        <m:ctrlPr>
-                          <a:rPr lang="tr-TR" i="1">
-                            <a:latin typeface="Cambria Math" panose="02040503050406030204" pitchFamily="18" charset="0"/>
-                          </a:rPr>
-                        </m:ctrlPr>
-                      </m:sSubPr>
-                      <m:e>
-                        <m:r>
-                          <m:rPr>
-                            <m:nor/>
-                          </m:rPr>
-                          <a:rPr lang="el-GR" dirty="0"/>
-                          <m:t>ω</m:t>
-                        </m:r>
-                      </m:e>
-                      <m:sub>
-                        <m:r>
-                          <a:rPr lang="tr-TR" b="0" i="1" smtClean="0">
-                            <a:latin typeface="Cambria Math" panose="02040503050406030204" pitchFamily="18" charset="0"/>
-                          </a:rPr>
-                          <m:t>𝑚</m:t>
-                        </m:r>
-                      </m:sub>
-                    </m:sSub>
-                  </m:oMath>
-                </a14:m>
-                <a:r>
-                  <a:rPr lang="tr-TR" dirty="0" smtClean="0"/>
-                  <a:t>	</a:t>
-                </a:r>
-                <a:endParaRPr lang="tr-TR" dirty="0"/>
-              </a:p>
-            </p:txBody>
-          </p:sp>
-        </mc:Choice>
-        <mc:Fallback xmlns="">
-          <p:sp>
-            <p:nvSpPr>
-              <p:cNvPr id="6" name="Rectangle 5"/>
-              <p:cNvSpPr>
-                <a:spLocks noRot="1" noChangeAspect="1" noMove="1" noResize="1" noEditPoints="1" noAdjustHandles="1" noChangeArrowheads="1" noChangeShapeType="1" noTextEdit="1"/>
-              </p:cNvSpPr>
-              <p:nvPr/>
-            </p:nvSpPr>
-            <p:spPr>
-              <a:xfrm>
-                <a:off x="3556332" y="4445912"/>
-                <a:ext cx="2031325" cy="491738"/>
-              </a:xfrm>
-              <a:prstGeom prst="rect">
-                <a:avLst/>
-              </a:prstGeom>
-              <a:blipFill>
-                <a:blip r:embed="rId3"/>
-                <a:stretch>
-                  <a:fillRect l="-599" t="-9877" b="-20988"/>
-                </a:stretch>
-              </a:blipFill>
-            </p:spPr>
-            <p:txBody>
-              <a:bodyPr/>
-              <a:lstStyle/>
-              <a:p>
-                <a:r>
-                  <a:rPr lang="tr-TR">
-                    <a:noFill/>
-                  </a:rPr>
-                  <a:t> </a:t>
-                </a:r>
-              </a:p>
-            </p:txBody>
-          </p:sp>
-        </mc:Fallback>
-      </mc:AlternateContent>
-      <mc:AlternateContent xmlns:mc="http://schemas.openxmlformats.org/markup-compatibility/2006" xmlns:a14="http://schemas.microsoft.com/office/drawing/2010/main">
-        <mc:Choice Requires="a14">
-          <p:sp>
-            <p:nvSpPr>
-              <p:cNvPr id="9" name="Rectangle 8"/>
-              <p:cNvSpPr/>
-              <p:nvPr/>
-            </p:nvSpPr>
-            <p:spPr>
-              <a:xfrm>
-                <a:off x="3094666" y="4937650"/>
-                <a:ext cx="2954655" cy="461665"/>
-              </a:xfrm>
-              <a:prstGeom prst="rect">
-                <a:avLst/>
-              </a:prstGeom>
-            </p:spPr>
-            <p:txBody>
-              <a:bodyPr wrap="none">
-                <a:spAutoFit/>
-              </a:bodyPr>
-              <a:lstStyle/>
-              <a:p>
-                <a14:m>
-                  <m:oMath xmlns:m="http://schemas.openxmlformats.org/officeDocument/2006/math">
-                    <m:sSub>
-                      <m:sSubPr>
-                        <m:ctrlPr>
-                          <a:rPr lang="tr-TR" i="1" smtClean="0">
-                            <a:latin typeface="Cambria Math" panose="02040503050406030204" pitchFamily="18" charset="0"/>
-                          </a:rPr>
-                        </m:ctrlPr>
-                      </m:sSubPr>
-                      <m:e>
-                        <m:r>
-                          <a:rPr lang="tr-TR" b="0" i="1" smtClean="0">
-                            <a:latin typeface="Cambria Math" panose="02040503050406030204" pitchFamily="18" charset="0"/>
-                          </a:rPr>
-                          <m:t>𝑃</m:t>
-                        </m:r>
-                      </m:e>
-                      <m:sub>
-                        <m:r>
-                          <a:rPr lang="tr-TR" b="0" i="1" smtClean="0">
-                            <a:latin typeface="Cambria Math" panose="02040503050406030204" pitchFamily="18" charset="0"/>
-                          </a:rPr>
-                          <m:t>𝑟𝑎𝑡𝑒𝑑</m:t>
-                        </m:r>
-                      </m:sub>
-                    </m:sSub>
-                  </m:oMath>
-                </a14:m>
-                <a:r>
-                  <a:rPr lang="tr-TR" dirty="0" smtClean="0"/>
-                  <a:t>=</a:t>
-                </a:r>
-                <a14:m>
-                  <m:oMath xmlns:m="http://schemas.openxmlformats.org/officeDocument/2006/math">
-                    <m:sSub>
-                      <m:sSubPr>
-                        <m:ctrlPr>
-                          <a:rPr lang="tr-TR" i="1">
-                            <a:latin typeface="Cambria Math" panose="02040503050406030204" pitchFamily="18" charset="0"/>
-                          </a:rPr>
-                        </m:ctrlPr>
-                      </m:sSubPr>
-                      <m:e>
-                        <m:r>
-                          <a:rPr lang="tr-TR" b="0" i="1" smtClean="0">
-                            <a:latin typeface="Cambria Math" panose="02040503050406030204" pitchFamily="18" charset="0"/>
-                          </a:rPr>
-                          <m:t>𝑇</m:t>
-                        </m:r>
-                      </m:e>
-                      <m:sub>
-                        <m:r>
-                          <a:rPr lang="tr-TR" b="0" i="1" smtClean="0">
-                            <a:latin typeface="Cambria Math" panose="02040503050406030204" pitchFamily="18" charset="0"/>
-                          </a:rPr>
-                          <m:t>𝑃</m:t>
-                        </m:r>
-                        <m:r>
-                          <a:rPr lang="tr-TR" b="0" i="1" smtClean="0">
-                            <a:latin typeface="Cambria Math" panose="02040503050406030204" pitchFamily="18" charset="0"/>
-                          </a:rPr>
-                          <m:t>−</m:t>
-                        </m:r>
-                        <m:r>
-                          <a:rPr lang="tr-TR" b="0" i="1" smtClean="0">
-                            <a:latin typeface="Cambria Math" panose="02040503050406030204" pitchFamily="18" charset="0"/>
-                          </a:rPr>
-                          <m:t>𝑙𝑖𝑚</m:t>
-                        </m:r>
-                      </m:sub>
-                    </m:sSub>
-                    <m:sSub>
-                      <m:sSubPr>
-                        <m:ctrlPr>
-                          <a:rPr lang="tr-TR" i="1">
-                            <a:latin typeface="Cambria Math" panose="02040503050406030204" pitchFamily="18" charset="0"/>
-                          </a:rPr>
-                        </m:ctrlPr>
-                      </m:sSubPr>
-                      <m:e>
-                        <m:r>
-                          <m:rPr>
-                            <m:nor/>
-                          </m:rPr>
-                          <a:rPr lang="el-GR" dirty="0"/>
-                          <m:t>ω</m:t>
-                        </m:r>
-                      </m:e>
-                      <m:sub>
-                        <m:r>
-                          <a:rPr lang="tr-TR" b="0" i="1" smtClean="0">
-                            <a:latin typeface="Cambria Math" panose="02040503050406030204" pitchFamily="18" charset="0"/>
-                          </a:rPr>
-                          <m:t>𝑚𝑎𝑥</m:t>
-                        </m:r>
-                      </m:sub>
-                    </m:sSub>
-                  </m:oMath>
-                </a14:m>
-                <a:r>
-                  <a:rPr lang="tr-TR" dirty="0" smtClean="0"/>
-                  <a:t>	</a:t>
-                </a:r>
-                <a:endParaRPr lang="tr-TR" dirty="0"/>
-              </a:p>
-            </p:txBody>
-          </p:sp>
-        </mc:Choice>
-        <mc:Fallback xmlns="">
-          <p:sp>
-            <p:nvSpPr>
-              <p:cNvPr id="9" name="Rectangle 8"/>
-              <p:cNvSpPr>
-                <a:spLocks noRot="1" noChangeAspect="1" noMove="1" noResize="1" noEditPoints="1" noAdjustHandles="1" noChangeArrowheads="1" noChangeShapeType="1" noTextEdit="1"/>
-              </p:cNvSpPr>
-              <p:nvPr/>
-            </p:nvSpPr>
-            <p:spPr>
-              <a:xfrm>
-                <a:off x="3094666" y="4937650"/>
-                <a:ext cx="2954655" cy="461665"/>
-              </a:xfrm>
-              <a:prstGeom prst="rect">
-                <a:avLst/>
-              </a:prstGeom>
-              <a:blipFill>
-                <a:blip r:embed="rId4"/>
-                <a:stretch>
-                  <a:fillRect l="-620" t="-9211" b="-30263"/>
-                </a:stretch>
-              </a:blipFill>
-            </p:spPr>
-            <p:txBody>
-              <a:bodyPr/>
-              <a:lstStyle/>
-              <a:p>
-                <a:r>
-                  <a:rPr lang="tr-TR">
-                    <a:noFill/>
-                  </a:rPr>
-                  <a:t> </a:t>
-                </a:r>
-              </a:p>
-            </p:txBody>
-          </p:sp>
-        </mc:Fallback>
-      </mc:AlternateContent>
-      <mc:AlternateContent xmlns:mc="http://schemas.openxmlformats.org/markup-compatibility/2006" xmlns:a14="http://schemas.microsoft.com/office/drawing/2010/main">
-        <mc:Choice Requires="a14">
-          <p:sp>
-            <p:nvSpPr>
-              <p:cNvPr id="10" name="Rectangle 9"/>
-              <p:cNvSpPr/>
-              <p:nvPr/>
-            </p:nvSpPr>
-            <p:spPr>
-              <a:xfrm>
-                <a:off x="3098982" y="5499511"/>
-                <a:ext cx="2954655" cy="461665"/>
-              </a:xfrm>
-              <a:prstGeom prst="rect">
-                <a:avLst/>
-              </a:prstGeom>
-            </p:spPr>
-            <p:txBody>
-              <a:bodyPr wrap="none">
-                <a:spAutoFit/>
-              </a:bodyPr>
-              <a:lstStyle/>
-              <a:p>
-                <a14:m>
-                  <m:oMath xmlns:m="http://schemas.openxmlformats.org/officeDocument/2006/math">
-                    <m:sSub>
-                      <m:sSubPr>
-                        <m:ctrlPr>
-                          <a:rPr lang="tr-TR" i="1" smtClean="0">
-                            <a:latin typeface="Cambria Math" panose="02040503050406030204" pitchFamily="18" charset="0"/>
-                          </a:rPr>
-                        </m:ctrlPr>
-                      </m:sSubPr>
-                      <m:e>
-                        <m:r>
-                          <a:rPr lang="tr-TR" b="0" i="1" smtClean="0">
-                            <a:latin typeface="Cambria Math" panose="02040503050406030204" pitchFamily="18" charset="0"/>
-                          </a:rPr>
-                          <m:t>𝑃</m:t>
-                        </m:r>
-                      </m:e>
-                      <m:sub>
-                        <m:r>
-                          <a:rPr lang="tr-TR" b="0" i="1" smtClean="0">
-                            <a:latin typeface="Cambria Math" panose="02040503050406030204" pitchFamily="18" charset="0"/>
-                          </a:rPr>
-                          <m:t>𝑚𝑎𝑥</m:t>
-                        </m:r>
-                      </m:sub>
-                    </m:sSub>
-                  </m:oMath>
-                </a14:m>
-                <a:r>
-                  <a:rPr lang="tr-TR" dirty="0" smtClean="0"/>
-                  <a:t>=</a:t>
-                </a:r>
-                <a14:m>
-                  <m:oMath xmlns:m="http://schemas.openxmlformats.org/officeDocument/2006/math">
-                    <m:sSub>
-                      <m:sSubPr>
-                        <m:ctrlPr>
-                          <a:rPr lang="tr-TR" i="1">
-                            <a:latin typeface="Cambria Math" panose="02040503050406030204" pitchFamily="18" charset="0"/>
-                          </a:rPr>
-                        </m:ctrlPr>
-                      </m:sSubPr>
-                      <m:e>
-                        <m:r>
-                          <a:rPr lang="tr-TR" b="0" i="1" smtClean="0">
-                            <a:latin typeface="Cambria Math" panose="02040503050406030204" pitchFamily="18" charset="0"/>
-                          </a:rPr>
-                          <m:t>𝑇</m:t>
-                        </m:r>
-                      </m:e>
-                      <m:sub>
-                        <m:r>
-                          <a:rPr lang="tr-TR" b="0" i="1" smtClean="0">
-                            <a:latin typeface="Cambria Math" panose="02040503050406030204" pitchFamily="18" charset="0"/>
-                          </a:rPr>
-                          <m:t>𝑆</m:t>
-                        </m:r>
-                        <m:r>
-                          <a:rPr lang="tr-TR" b="0" i="1" smtClean="0">
-                            <a:latin typeface="Cambria Math" panose="02040503050406030204" pitchFamily="18" charset="0"/>
-                          </a:rPr>
-                          <m:t>−</m:t>
-                        </m:r>
-                        <m:r>
-                          <a:rPr lang="tr-TR" b="0" i="1" smtClean="0">
-                            <a:latin typeface="Cambria Math" panose="02040503050406030204" pitchFamily="18" charset="0"/>
-                          </a:rPr>
-                          <m:t>𝑙𝑖𝑚</m:t>
-                        </m:r>
-                      </m:sub>
-                    </m:sSub>
-                    <m:sSub>
-                      <m:sSubPr>
-                        <m:ctrlPr>
-                          <a:rPr lang="tr-TR" i="1">
-                            <a:latin typeface="Cambria Math" panose="02040503050406030204" pitchFamily="18" charset="0"/>
-                          </a:rPr>
-                        </m:ctrlPr>
-                      </m:sSubPr>
-                      <m:e>
-                        <m:r>
-                          <m:rPr>
-                            <m:nor/>
-                          </m:rPr>
-                          <a:rPr lang="el-GR" dirty="0"/>
-                          <m:t>ω</m:t>
-                        </m:r>
-                      </m:e>
-                      <m:sub>
-                        <m:r>
-                          <a:rPr lang="tr-TR" b="0" i="1" smtClean="0">
-                            <a:latin typeface="Cambria Math" panose="02040503050406030204" pitchFamily="18" charset="0"/>
-                          </a:rPr>
-                          <m:t>𝑚𝑎𝑥</m:t>
-                        </m:r>
-                      </m:sub>
-                    </m:sSub>
-                  </m:oMath>
-                </a14:m>
-                <a:r>
-                  <a:rPr lang="tr-TR" dirty="0" smtClean="0"/>
-                  <a:t>	</a:t>
-                </a:r>
-                <a:endParaRPr lang="tr-TR" dirty="0"/>
-              </a:p>
-            </p:txBody>
-          </p:sp>
-        </mc:Choice>
-        <mc:Fallback xmlns="">
-          <p:sp>
-            <p:nvSpPr>
-              <p:cNvPr id="10" name="Rectangle 9"/>
-              <p:cNvSpPr>
-                <a:spLocks noRot="1" noChangeAspect="1" noMove="1" noResize="1" noEditPoints="1" noAdjustHandles="1" noChangeArrowheads="1" noChangeShapeType="1" noTextEdit="1"/>
-              </p:cNvSpPr>
-              <p:nvPr/>
-            </p:nvSpPr>
-            <p:spPr>
-              <a:xfrm>
-                <a:off x="3098982" y="5499511"/>
-                <a:ext cx="2954655" cy="461665"/>
-              </a:xfrm>
-              <a:prstGeom prst="rect">
-                <a:avLst/>
-              </a:prstGeom>
-              <a:blipFill>
-                <a:blip r:embed="rId5"/>
-                <a:stretch>
-                  <a:fillRect l="-412" t="-9211" b="-30263"/>
-                </a:stretch>
-              </a:blipFill>
-            </p:spPr>
-            <p:txBody>
-              <a:bodyPr/>
-              <a:lstStyle/>
-              <a:p>
-                <a:r>
-                  <a:rPr lang="tr-TR">
-                    <a:noFill/>
-                  </a:rPr>
-                  <a:t> </a:t>
-                </a:r>
-              </a:p>
-            </p:txBody>
-          </p:sp>
-        </mc:Fallback>
-      </mc:AlternateContent>
       <p:pic>
         <p:nvPicPr>
           <p:cNvPr id="7" name="Content Placeholder 6"/>
@@ -7894,7 +8214,7 @@
           </p:nvPr>
         </p:nvPicPr>
         <p:blipFill>
-          <a:blip r:embed="rId6" cstate="print">
+          <a:blip r:embed="rId3" cstate="print">
             <a:extLst>
               <a:ext uri="{28A0092B-C50C-407E-A947-70E740481C1C}">
                 <a14:useLocalDpi xmlns:a14="http://schemas.microsoft.com/office/drawing/2010/main" val="0"/>
@@ -7907,8 +8227,8 @@
         </p:blipFill>
         <p:spPr>
           <a:xfrm>
-            <a:off x="1259632" y="1376735"/>
-            <a:ext cx="6645042" cy="4987925"/>
+            <a:off x="1691680" y="1363663"/>
+            <a:ext cx="5760640" cy="4324072"/>
           </a:xfrm>
         </p:spPr>
       </p:pic>
@@ -7933,7 +8253,7 @@
 </p:sld>
 </file>
 
-<file path=ppt/slides/slide15.xml><?xml version="1.0" encoding="utf-8"?>
+<file path=ppt/slides/slide16.xml><?xml version="1.0" encoding="utf-8"?>
 <p:sld xmlns:a="http://schemas.openxmlformats.org/drawingml/2006/main" xmlns:r="http://schemas.openxmlformats.org/officeDocument/2006/relationships" xmlns:p="http://schemas.openxmlformats.org/presentationml/2006/main">
   <p:cSld>
     <p:spTree>
@@ -8031,7 +8351,7 @@
               <a:pPr>
                 <a:defRPr/>
               </a:pPr>
-              <a:t>15</a:t>
+              <a:t>16</a:t>
             </a:fld>
             <a:endParaRPr lang="en-US" dirty="0"/>
           </a:p>
@@ -8118,7 +8438,7 @@
 </p:sld>
 </file>
 
-<file path=ppt/slides/slide16.xml><?xml version="1.0" encoding="utf-8"?>
+<file path=ppt/slides/slide17.xml><?xml version="1.0" encoding="utf-8"?>
 <p:sld xmlns:a="http://schemas.openxmlformats.org/drawingml/2006/main" xmlns:r="http://schemas.openxmlformats.org/officeDocument/2006/relationships" xmlns:p="http://schemas.openxmlformats.org/presentationml/2006/main">
   <p:cSld>
     <p:spTree>
@@ -8297,7 +8617,7 @@
                 <a:tabLst/>
                 <a:defRPr/>
               </a:pPr>
-              <a:t>16</a:t>
+              <a:t>17</a:t>
             </a:fld>
             <a:endParaRPr kumimoji="0" lang="en-US" sz="1200" b="0" i="0" u="none" strike="noStrike" kern="1200" cap="none" spc="0" normalizeH="0" baseline="0" noProof="0" dirty="0">
               <a:ln>
@@ -8397,7 +8717,7 @@
 </p:sld>
 </file>
 
-<file path=ppt/slides/slide17.xml><?xml version="1.0" encoding="utf-8"?>
+<file path=ppt/slides/slide18.xml><?xml version="1.0" encoding="utf-8"?>
 <p:sld xmlns:a="http://schemas.openxmlformats.org/drawingml/2006/main" xmlns:r="http://schemas.openxmlformats.org/officeDocument/2006/relationships" xmlns:p="http://schemas.openxmlformats.org/presentationml/2006/main">
   <p:cSld>
     <p:spTree>
@@ -8495,7 +8815,226 @@
               <a:pPr>
                 <a:defRPr/>
               </a:pPr>
-              <a:t>17</a:t>
+              <a:t>18</a:t>
+            </a:fld>
+            <a:endParaRPr lang="en-US" dirty="0"/>
+          </a:p>
+        </p:txBody>
+      </p:sp>
+      <p:pic>
+        <p:nvPicPr>
+          <p:cNvPr id="6" name="Picture 5"/>
+          <p:cNvPicPr>
+            <a:picLocks noChangeAspect="1"/>
+          </p:cNvPicPr>
+          <p:nvPr/>
+        </p:nvPicPr>
+        <p:blipFill>
+          <a:blip r:embed="rId3" cstate="print">
+            <a:extLst>
+              <a:ext uri="{28A0092B-C50C-407E-A947-70E740481C1C}">
+                <a14:useLocalDpi xmlns:a14="http://schemas.microsoft.com/office/drawing/2010/main" val="0"/>
+              </a:ext>
+            </a:extLst>
+          </a:blip>
+          <a:stretch>
+            <a:fillRect/>
+          </a:stretch>
+        </p:blipFill>
+        <p:spPr>
+          <a:xfrm>
+            <a:off x="35496" y="3717032"/>
+            <a:ext cx="5544616" cy="2642419"/>
+          </a:xfrm>
+          <a:prstGeom prst="rect">
+            <a:avLst/>
+          </a:prstGeom>
+        </p:spPr>
+      </p:pic>
+      <p:pic>
+        <p:nvPicPr>
+          <p:cNvPr id="4" name="Picture 3"/>
+          <p:cNvPicPr>
+            <a:picLocks noChangeAspect="1"/>
+          </p:cNvPicPr>
+          <p:nvPr/>
+        </p:nvPicPr>
+        <p:blipFill>
+          <a:blip r:embed="rId4" cstate="print">
+            <a:extLst>
+              <a:ext uri="{28A0092B-C50C-407E-A947-70E740481C1C}">
+                <a14:useLocalDpi xmlns:a14="http://schemas.microsoft.com/office/drawing/2010/main" val="0"/>
+              </a:ext>
+            </a:extLst>
+          </a:blip>
+          <a:stretch>
+            <a:fillRect/>
+          </a:stretch>
+        </p:blipFill>
+        <p:spPr>
+          <a:xfrm>
+            <a:off x="138296" y="1363663"/>
+            <a:ext cx="5297800" cy="2524793"/>
+          </a:xfrm>
+          <a:prstGeom prst="rect">
+            <a:avLst/>
+          </a:prstGeom>
+        </p:spPr>
+      </p:pic>
+      <p:sp>
+        <p:nvSpPr>
+          <p:cNvPr id="7" name="TextBox 6"/>
+          <p:cNvSpPr txBox="1"/>
+          <p:nvPr/>
+        </p:nvSpPr>
+        <p:spPr>
+          <a:xfrm>
+            <a:off x="5580112" y="1506428"/>
+            <a:ext cx="2880320" cy="830997"/>
+          </a:xfrm>
+          <a:prstGeom prst="rect">
+            <a:avLst/>
+          </a:prstGeom>
+          <a:noFill/>
+        </p:spPr>
+        <p:txBody>
+          <a:bodyPr wrap="square" rtlCol="0">
+            <a:spAutoFit/>
+          </a:bodyPr>
+          <a:lstStyle/>
+          <a:p>
+            <a:pPr marL="342900" indent="-342900">
+              <a:buFont typeface="Arial" panose="020B0604020202020204" pitchFamily="34" charset="0"/>
+              <a:buChar char="•"/>
+            </a:pPr>
+            <a:r>
+              <a:rPr lang="tr-TR" dirty="0" smtClean="0"/>
+              <a:t>High Wind Speed Scenario</a:t>
+            </a:r>
+            <a:endParaRPr lang="tr-TR" dirty="0"/>
+          </a:p>
+        </p:txBody>
+      </p:sp>
+    </p:spTree>
+    <p:extLst>
+      <p:ext uri="{BB962C8B-B14F-4D97-AF65-F5344CB8AC3E}">
+        <p14:creationId xmlns:p14="http://schemas.microsoft.com/office/powerpoint/2010/main" val="836894847"/>
+      </p:ext>
+    </p:extLst>
+  </p:cSld>
+  <p:clrMapOvr>
+    <a:masterClrMapping/>
+  </p:clrMapOvr>
+  <p:transition/>
+  <p:timing>
+    <p:tnLst>
+      <p:par>
+        <p:cTn id="1" dur="indefinite" restart="never" nodeType="tmRoot"/>
+      </p:par>
+    </p:tnLst>
+  </p:timing>
+</p:sld>
+</file>
+
+<file path=ppt/slides/slide19.xml><?xml version="1.0" encoding="utf-8"?>
+<p:sld xmlns:a="http://schemas.openxmlformats.org/drawingml/2006/main" xmlns:r="http://schemas.openxmlformats.org/officeDocument/2006/relationships" xmlns:p="http://schemas.openxmlformats.org/presentationml/2006/main">
+  <p:cSld>
+    <p:spTree>
+      <p:nvGrpSpPr>
+        <p:cNvPr id="1" name=""/>
+        <p:cNvGrpSpPr/>
+        <p:nvPr/>
+      </p:nvGrpSpPr>
+      <p:grpSpPr>
+        <a:xfrm>
+          <a:off x="0" y="0"/>
+          <a:ext cx="0" cy="0"/>
+          <a:chOff x="0" y="0"/>
+          <a:chExt cx="0" cy="0"/>
+        </a:xfrm>
+      </p:grpSpPr>
+      <p:sp>
+        <p:nvSpPr>
+          <p:cNvPr id="5122" name="Rectangle 2"/>
+          <p:cNvSpPr>
+            <a:spLocks noGrp="1" noChangeArrowheads="1"/>
+          </p:cNvSpPr>
+          <p:nvPr>
+            <p:ph type="title"/>
+          </p:nvPr>
+        </p:nvSpPr>
+        <p:spPr/>
+        <p:txBody>
+          <a:bodyPr/>
+          <a:lstStyle/>
+          <a:p>
+            <a:pPr>
+              <a:defRPr/>
+            </a:pPr>
+            <a:r>
+              <a:rPr lang="tr-TR" dirty="0" smtClean="0">
+                <a:latin typeface="Arial" panose="020B0604020202020204" pitchFamily="34" charset="0"/>
+                <a:cs typeface="Arial" panose="020B0604020202020204" pitchFamily="34" charset="0"/>
+              </a:rPr>
+              <a:t>Fast Inertia Support</a:t>
+            </a:r>
+            <a:endParaRPr lang="en-US" dirty="0" smtClean="0">
+              <a:latin typeface="Arial" panose="020B0604020202020204" pitchFamily="34" charset="0"/>
+              <a:cs typeface="Arial" panose="020B0604020202020204" pitchFamily="34" charset="0"/>
+            </a:endParaRPr>
+          </a:p>
+        </p:txBody>
+      </p:sp>
+      <p:sp>
+        <p:nvSpPr>
+          <p:cNvPr id="2" name="Date Placeholder 1"/>
+          <p:cNvSpPr>
+            <a:spLocks noGrp="1"/>
+          </p:cNvSpPr>
+          <p:nvPr>
+            <p:ph type="dt" sz="half" idx="2"/>
+          </p:nvPr>
+        </p:nvSpPr>
+        <p:spPr/>
+        <p:txBody>
+          <a:bodyPr/>
+          <a:lstStyle/>
+          <a:p>
+            <a:pPr>
+              <a:defRPr/>
+            </a:pPr>
+            <a:r>
+              <a:rPr lang="tr-TR" dirty="0" smtClean="0"/>
+              <a:t>18.01.2019</a:t>
+            </a:r>
+            <a:endParaRPr lang="en-US" dirty="0"/>
+          </a:p>
+        </p:txBody>
+      </p:sp>
+      <p:sp>
+        <p:nvSpPr>
+          <p:cNvPr id="3" name="Slide Number Placeholder 2"/>
+          <p:cNvSpPr>
+            <a:spLocks noGrp="1"/>
+          </p:cNvSpPr>
+          <p:nvPr>
+            <p:ph type="sldNum" sz="quarter" idx="12"/>
+          </p:nvPr>
+        </p:nvSpPr>
+        <p:spPr/>
+        <p:txBody>
+          <a:bodyPr/>
+          <a:lstStyle/>
+          <a:p>
+            <a:pPr>
+              <a:defRPr/>
+            </a:pPr>
+            <a:fld id="{C878F797-6006-4DDA-AFE9-456F280FE6C5}" type="slidenum">
+              <a:rPr lang="en-US" smtClean="0"/>
+              <a:pPr>
+                <a:defRPr/>
+              </a:pPr>
+              <a:t>19</a:t>
             </a:fld>
             <a:endParaRPr lang="en-US" dirty="0"/>
           </a:p>
@@ -8561,6 +9100,40 @@
           </a:prstGeom>
         </p:spPr>
       </p:pic>
+      <p:sp>
+        <p:nvSpPr>
+          <p:cNvPr id="4" name="TextBox 3"/>
+          <p:cNvSpPr txBox="1"/>
+          <p:nvPr/>
+        </p:nvSpPr>
+        <p:spPr>
+          <a:xfrm>
+            <a:off x="5580112" y="1506428"/>
+            <a:ext cx="2880320" cy="1200329"/>
+          </a:xfrm>
+          <a:prstGeom prst="rect">
+            <a:avLst/>
+          </a:prstGeom>
+          <a:noFill/>
+        </p:spPr>
+        <p:txBody>
+          <a:bodyPr wrap="square" rtlCol="0">
+            <a:spAutoFit/>
+          </a:bodyPr>
+          <a:lstStyle/>
+          <a:p>
+            <a:pPr marL="342900" indent="-342900">
+              <a:buFont typeface="Arial" panose="020B0604020202020204" pitchFamily="34" charset="0"/>
+              <a:buChar char="•"/>
+            </a:pPr>
+            <a:r>
+              <a:rPr lang="tr-TR" dirty="0" smtClean="0"/>
+              <a:t>Low Wind Speed Scenario Moderate Case</a:t>
+            </a:r>
+            <a:endParaRPr lang="tr-TR" dirty="0"/>
+          </a:p>
+        </p:txBody>
+      </p:sp>
     </p:spTree>
     <p:extLst>
       <p:ext uri="{BB962C8B-B14F-4D97-AF65-F5344CB8AC3E}">
@@ -8582,7 +9155,7 @@
 </p:sld>
 </file>
 
-<file path=ppt/slides/slide18.xml><?xml version="1.0" encoding="utf-8"?>
+<file path=ppt/slides/slide2.xml><?xml version="1.0" encoding="utf-8"?>
 <p:sld xmlns:a="http://schemas.openxmlformats.org/drawingml/2006/main" xmlns:r="http://schemas.openxmlformats.org/officeDocument/2006/relationships" xmlns:p="http://schemas.openxmlformats.org/presentationml/2006/main">
   <p:cSld>
     <p:spTree>
@@ -8622,9 +9195,130 @@
                 <a:latin typeface="Arial" panose="020B0604020202020204" pitchFamily="34" charset="0"/>
                 <a:cs typeface="Arial" panose="020B0604020202020204" pitchFamily="34" charset="0"/>
               </a:rPr>
-              <a:t>Fast Inertia Support</a:t>
+              <a:t>Agenda</a:t>
             </a:r>
             <a:endParaRPr lang="en-US" dirty="0" smtClean="0">
+              <a:latin typeface="Arial" panose="020B0604020202020204" pitchFamily="34" charset="0"/>
+              <a:cs typeface="Arial" panose="020B0604020202020204" pitchFamily="34" charset="0"/>
+            </a:endParaRPr>
+          </a:p>
+        </p:txBody>
+      </p:sp>
+      <p:sp>
+        <p:nvSpPr>
+          <p:cNvPr id="5123" name="Rectangle 3"/>
+          <p:cNvSpPr>
+            <a:spLocks noGrp="1" noChangeArrowheads="1"/>
+          </p:cNvSpPr>
+          <p:nvPr>
+            <p:ph idx="1"/>
+          </p:nvPr>
+        </p:nvSpPr>
+        <p:spPr>
+          <a:xfrm>
+            <a:off x="457198" y="1700808"/>
+            <a:ext cx="8229601" cy="4114800"/>
+          </a:xfrm>
+        </p:spPr>
+        <p:txBody>
+          <a:bodyPr/>
+          <a:lstStyle/>
+          <a:p>
+            <a:pPr lvl="1">
+              <a:defRPr/>
+            </a:pPr>
+            <a:r>
+              <a:rPr lang="tr-TR" sz="2400" dirty="0" smtClean="0">
+                <a:latin typeface="Arial" panose="020B0604020202020204" pitchFamily="34" charset="0"/>
+                <a:cs typeface="Arial" panose="020B0604020202020204" pitchFamily="34" charset="0"/>
+              </a:rPr>
+              <a:t>Renewable Energy Status and Problems</a:t>
+            </a:r>
+          </a:p>
+          <a:p>
+            <a:pPr lvl="1">
+              <a:defRPr/>
+            </a:pPr>
+            <a:r>
+              <a:rPr lang="tr-TR" sz="2400" dirty="0" smtClean="0">
+                <a:latin typeface="Arial" panose="020B0604020202020204" pitchFamily="34" charset="0"/>
+                <a:cs typeface="Arial" panose="020B0604020202020204" pitchFamily="34" charset="0"/>
+              </a:rPr>
+              <a:t>Inertia, Frequency and Inertial Support in the Grid</a:t>
+            </a:r>
+          </a:p>
+          <a:p>
+            <a:pPr lvl="1">
+              <a:defRPr/>
+            </a:pPr>
+            <a:r>
+              <a:rPr lang="tr-TR" sz="2400" dirty="0" smtClean="0">
+                <a:latin typeface="Arial" panose="020B0604020202020204" pitchFamily="34" charset="0"/>
+                <a:cs typeface="Arial" panose="020B0604020202020204" pitchFamily="34" charset="0"/>
+              </a:rPr>
+              <a:t>Wind Turbine Modelling</a:t>
+            </a:r>
+          </a:p>
+          <a:p>
+            <a:pPr lvl="1">
+              <a:defRPr/>
+            </a:pPr>
+            <a:r>
+              <a:rPr lang="tr-TR" sz="2400" dirty="0" smtClean="0">
+                <a:latin typeface="Arial" panose="020B0604020202020204" pitchFamily="34" charset="0"/>
+                <a:cs typeface="Arial" panose="020B0604020202020204" pitchFamily="34" charset="0"/>
+              </a:rPr>
+              <a:t>Fast Inertial Support</a:t>
+            </a:r>
+          </a:p>
+          <a:p>
+            <a:pPr lvl="1">
+              <a:defRPr/>
+            </a:pPr>
+            <a:r>
+              <a:rPr lang="tr-TR" sz="2400" dirty="0" smtClean="0">
+                <a:latin typeface="Arial" panose="020B0604020202020204" pitchFamily="34" charset="0"/>
+                <a:cs typeface="Arial" panose="020B0604020202020204" pitchFamily="34" charset="0"/>
+              </a:rPr>
+              <a:t>Synthetic Inertia Support</a:t>
+            </a:r>
+          </a:p>
+          <a:p>
+            <a:pPr lvl="1">
+              <a:defRPr/>
+            </a:pPr>
+            <a:r>
+              <a:rPr lang="tr-TR" sz="2400" dirty="0" smtClean="0">
+                <a:latin typeface="Arial" panose="020B0604020202020204" pitchFamily="34" charset="0"/>
+                <a:cs typeface="Arial" panose="020B0604020202020204" pitchFamily="34" charset="0"/>
+              </a:rPr>
+              <a:t>Effects on Turkish Electricity System</a:t>
+            </a:r>
+          </a:p>
+          <a:p>
+            <a:pPr lvl="1">
+              <a:defRPr/>
+            </a:pPr>
+            <a:r>
+              <a:rPr lang="tr-TR" sz="2400" dirty="0" smtClean="0">
+                <a:latin typeface="Arial" panose="020B0604020202020204" pitchFamily="34" charset="0"/>
+                <a:cs typeface="Arial" panose="020B0604020202020204" pitchFamily="34" charset="0"/>
+              </a:rPr>
+              <a:t>Economical Perspective</a:t>
+            </a:r>
+          </a:p>
+          <a:p>
+            <a:pPr lvl="1">
+              <a:defRPr/>
+            </a:pPr>
+            <a:r>
+              <a:rPr lang="tr-TR" sz="2400" dirty="0" smtClean="0">
+                <a:latin typeface="Arial" panose="020B0604020202020204" pitchFamily="34" charset="0"/>
+                <a:cs typeface="Arial" panose="020B0604020202020204" pitchFamily="34" charset="0"/>
+              </a:rPr>
+              <a:t>Conclusion</a:t>
+            </a:r>
+            <a:endParaRPr lang="en-US" sz="2400" dirty="0" smtClean="0">
               <a:latin typeface="Arial" panose="020B0604020202020204" pitchFamily="34" charset="0"/>
               <a:cs typeface="Arial" panose="020B0604020202020204" pitchFamily="34" charset="0"/>
             </a:endParaRPr>
@@ -8680,7 +9374,316 @@
               <a:pPr>
                 <a:defRPr/>
               </a:pPr>
-              <a:t>18</a:t>
+              <a:t>2</a:t>
+            </a:fld>
+            <a:endParaRPr lang="en-US" dirty="0"/>
+          </a:p>
+        </p:txBody>
+      </p:sp>
+    </p:spTree>
+  </p:cSld>
+  <p:clrMapOvr>
+    <a:masterClrMapping/>
+  </p:clrMapOvr>
+  <p:transition/>
+  <p:timing>
+    <p:tnLst>
+      <p:par>
+        <p:cTn id="1" dur="indefinite" restart="never" nodeType="tmRoot"/>
+      </p:par>
+    </p:tnLst>
+  </p:timing>
+</p:sld>
+</file>
+
+<file path=ppt/slides/slide20.xml><?xml version="1.0" encoding="utf-8"?>
+<p:sld xmlns:a="http://schemas.openxmlformats.org/drawingml/2006/main" xmlns:r="http://schemas.openxmlformats.org/officeDocument/2006/relationships" xmlns:p="http://schemas.openxmlformats.org/presentationml/2006/main">
+  <p:cSld>
+    <p:spTree>
+      <p:nvGrpSpPr>
+        <p:cNvPr id="1" name=""/>
+        <p:cNvGrpSpPr/>
+        <p:nvPr/>
+      </p:nvGrpSpPr>
+      <p:grpSpPr>
+        <a:xfrm>
+          <a:off x="0" y="0"/>
+          <a:ext cx="0" cy="0"/>
+          <a:chOff x="0" y="0"/>
+          <a:chExt cx="0" cy="0"/>
+        </a:xfrm>
+      </p:grpSpPr>
+      <p:sp>
+        <p:nvSpPr>
+          <p:cNvPr id="5122" name="Rectangle 2"/>
+          <p:cNvSpPr>
+            <a:spLocks noGrp="1" noChangeArrowheads="1"/>
+          </p:cNvSpPr>
+          <p:nvPr>
+            <p:ph type="title"/>
+          </p:nvPr>
+        </p:nvSpPr>
+        <p:spPr/>
+        <p:txBody>
+          <a:bodyPr/>
+          <a:lstStyle/>
+          <a:p>
+            <a:pPr>
+              <a:defRPr/>
+            </a:pPr>
+            <a:r>
+              <a:rPr lang="tr-TR" dirty="0" smtClean="0">
+                <a:latin typeface="Arial" panose="020B0604020202020204" pitchFamily="34" charset="0"/>
+                <a:cs typeface="Arial" panose="020B0604020202020204" pitchFamily="34" charset="0"/>
+              </a:rPr>
+              <a:t>Fast Inertia Support</a:t>
+            </a:r>
+            <a:endParaRPr lang="en-US" dirty="0" smtClean="0">
+              <a:latin typeface="Arial" panose="020B0604020202020204" pitchFamily="34" charset="0"/>
+              <a:cs typeface="Arial" panose="020B0604020202020204" pitchFamily="34" charset="0"/>
+            </a:endParaRPr>
+          </a:p>
+        </p:txBody>
+      </p:sp>
+      <p:sp>
+        <p:nvSpPr>
+          <p:cNvPr id="2" name="Date Placeholder 1"/>
+          <p:cNvSpPr>
+            <a:spLocks noGrp="1"/>
+          </p:cNvSpPr>
+          <p:nvPr>
+            <p:ph type="dt" sz="half" idx="2"/>
+          </p:nvPr>
+        </p:nvSpPr>
+        <p:spPr/>
+        <p:txBody>
+          <a:bodyPr/>
+          <a:lstStyle/>
+          <a:p>
+            <a:pPr>
+              <a:defRPr/>
+            </a:pPr>
+            <a:r>
+              <a:rPr lang="tr-TR" dirty="0" smtClean="0"/>
+              <a:t>18.01.2019</a:t>
+            </a:r>
+            <a:endParaRPr lang="en-US" dirty="0"/>
+          </a:p>
+        </p:txBody>
+      </p:sp>
+      <p:sp>
+        <p:nvSpPr>
+          <p:cNvPr id="3" name="Slide Number Placeholder 2"/>
+          <p:cNvSpPr>
+            <a:spLocks noGrp="1"/>
+          </p:cNvSpPr>
+          <p:nvPr>
+            <p:ph type="sldNum" sz="quarter" idx="12"/>
+          </p:nvPr>
+        </p:nvSpPr>
+        <p:spPr/>
+        <p:txBody>
+          <a:bodyPr/>
+          <a:lstStyle/>
+          <a:p>
+            <a:pPr>
+              <a:defRPr/>
+            </a:pPr>
+            <a:fld id="{C878F797-6006-4DDA-AFE9-456F280FE6C5}" type="slidenum">
+              <a:rPr lang="en-US" smtClean="0"/>
+              <a:pPr>
+                <a:defRPr/>
+              </a:pPr>
+              <a:t>20</a:t>
+            </a:fld>
+            <a:endParaRPr lang="en-US" dirty="0"/>
+          </a:p>
+        </p:txBody>
+      </p:sp>
+      <p:sp>
+        <p:nvSpPr>
+          <p:cNvPr id="4" name="TextBox 3"/>
+          <p:cNvSpPr txBox="1"/>
+          <p:nvPr/>
+        </p:nvSpPr>
+        <p:spPr>
+          <a:xfrm>
+            <a:off x="1037320" y="5517232"/>
+            <a:ext cx="6840760" cy="461665"/>
+          </a:xfrm>
+          <a:prstGeom prst="rect">
+            <a:avLst/>
+          </a:prstGeom>
+          <a:noFill/>
+        </p:spPr>
+        <p:txBody>
+          <a:bodyPr wrap="square" rtlCol="0">
+            <a:spAutoFit/>
+          </a:bodyPr>
+          <a:lstStyle/>
+          <a:p>
+            <a:pPr marL="342900" indent="-342900">
+              <a:buFont typeface="Arial" panose="020B0604020202020204" pitchFamily="34" charset="0"/>
+              <a:buChar char="•"/>
+            </a:pPr>
+            <a:r>
+              <a:rPr lang="tr-TR" dirty="0" smtClean="0"/>
+              <a:t>Low Wind Speed Scenario Limit Case Case</a:t>
+            </a:r>
+            <a:endParaRPr lang="tr-TR" dirty="0"/>
+          </a:p>
+        </p:txBody>
+      </p:sp>
+      <p:pic>
+        <p:nvPicPr>
+          <p:cNvPr id="6" name="Picture 5"/>
+          <p:cNvPicPr>
+            <a:picLocks noChangeAspect="1"/>
+          </p:cNvPicPr>
+          <p:nvPr/>
+        </p:nvPicPr>
+        <p:blipFill>
+          <a:blip r:embed="rId3">
+            <a:extLst>
+              <a:ext uri="{28A0092B-C50C-407E-A947-70E740481C1C}">
+                <a14:useLocalDpi xmlns:a14="http://schemas.microsoft.com/office/drawing/2010/main" val="0"/>
+              </a:ext>
+            </a:extLst>
+          </a:blip>
+          <a:stretch>
+            <a:fillRect/>
+          </a:stretch>
+        </p:blipFill>
+        <p:spPr>
+          <a:xfrm>
+            <a:off x="402431" y="1377895"/>
+            <a:ext cx="8110538" cy="3865271"/>
+          </a:xfrm>
+          <a:prstGeom prst="rect">
+            <a:avLst/>
+          </a:prstGeom>
+        </p:spPr>
+      </p:pic>
+    </p:spTree>
+    <p:extLst>
+      <p:ext uri="{BB962C8B-B14F-4D97-AF65-F5344CB8AC3E}">
+        <p14:creationId xmlns:p14="http://schemas.microsoft.com/office/powerpoint/2010/main" val="4138885392"/>
+      </p:ext>
+    </p:extLst>
+  </p:cSld>
+  <p:clrMapOvr>
+    <a:masterClrMapping/>
+  </p:clrMapOvr>
+  <p:transition/>
+  <p:timing>
+    <p:tnLst>
+      <p:par>
+        <p:cTn id="1" dur="indefinite" restart="never" nodeType="tmRoot"/>
+      </p:par>
+    </p:tnLst>
+  </p:timing>
+</p:sld>
+</file>
+
+<file path=ppt/slides/slide21.xml><?xml version="1.0" encoding="utf-8"?>
+<p:sld xmlns:a="http://schemas.openxmlformats.org/drawingml/2006/main" xmlns:r="http://schemas.openxmlformats.org/officeDocument/2006/relationships" xmlns:p="http://schemas.openxmlformats.org/presentationml/2006/main">
+  <p:cSld>
+    <p:spTree>
+      <p:nvGrpSpPr>
+        <p:cNvPr id="1" name=""/>
+        <p:cNvGrpSpPr/>
+        <p:nvPr/>
+      </p:nvGrpSpPr>
+      <p:grpSpPr>
+        <a:xfrm>
+          <a:off x="0" y="0"/>
+          <a:ext cx="0" cy="0"/>
+          <a:chOff x="0" y="0"/>
+          <a:chExt cx="0" cy="0"/>
+        </a:xfrm>
+      </p:grpSpPr>
+      <p:sp>
+        <p:nvSpPr>
+          <p:cNvPr id="5122" name="Rectangle 2"/>
+          <p:cNvSpPr>
+            <a:spLocks noGrp="1" noChangeArrowheads="1"/>
+          </p:cNvSpPr>
+          <p:nvPr>
+            <p:ph type="title"/>
+          </p:nvPr>
+        </p:nvSpPr>
+        <p:spPr/>
+        <p:txBody>
+          <a:bodyPr/>
+          <a:lstStyle/>
+          <a:p>
+            <a:pPr>
+              <a:defRPr/>
+            </a:pPr>
+            <a:r>
+              <a:rPr lang="tr-TR" dirty="0" smtClean="0">
+                <a:latin typeface="Arial" panose="020B0604020202020204" pitchFamily="34" charset="0"/>
+                <a:cs typeface="Arial" panose="020B0604020202020204" pitchFamily="34" charset="0"/>
+              </a:rPr>
+              <a:t>Fast Inertia Support</a:t>
+            </a:r>
+            <a:endParaRPr lang="en-US" dirty="0" smtClean="0">
+              <a:latin typeface="Arial" panose="020B0604020202020204" pitchFamily="34" charset="0"/>
+              <a:cs typeface="Arial" panose="020B0604020202020204" pitchFamily="34" charset="0"/>
+            </a:endParaRPr>
+          </a:p>
+        </p:txBody>
+      </p:sp>
+      <p:sp>
+        <p:nvSpPr>
+          <p:cNvPr id="2" name="Date Placeholder 1"/>
+          <p:cNvSpPr>
+            <a:spLocks noGrp="1"/>
+          </p:cNvSpPr>
+          <p:nvPr>
+            <p:ph type="dt" sz="half" idx="2"/>
+          </p:nvPr>
+        </p:nvSpPr>
+        <p:spPr/>
+        <p:txBody>
+          <a:bodyPr/>
+          <a:lstStyle/>
+          <a:p>
+            <a:pPr>
+              <a:defRPr/>
+            </a:pPr>
+            <a:r>
+              <a:rPr lang="tr-TR" dirty="0" smtClean="0"/>
+              <a:t>18.01.2019</a:t>
+            </a:r>
+            <a:endParaRPr lang="en-US" dirty="0"/>
+          </a:p>
+        </p:txBody>
+      </p:sp>
+      <p:sp>
+        <p:nvSpPr>
+          <p:cNvPr id="3" name="Slide Number Placeholder 2"/>
+          <p:cNvSpPr>
+            <a:spLocks noGrp="1"/>
+          </p:cNvSpPr>
+          <p:nvPr>
+            <p:ph type="sldNum" sz="quarter" idx="12"/>
+          </p:nvPr>
+        </p:nvSpPr>
+        <p:spPr/>
+        <p:txBody>
+          <a:bodyPr/>
+          <a:lstStyle/>
+          <a:p>
+            <a:pPr>
+              <a:defRPr/>
+            </a:pPr>
+            <a:fld id="{C878F797-6006-4DDA-AFE9-456F280FE6C5}" type="slidenum">
+              <a:rPr lang="en-US" smtClean="0"/>
+              <a:pPr>
+                <a:defRPr/>
+              </a:pPr>
+              <a:t>21</a:t>
             </a:fld>
             <a:endParaRPr lang="en-US" dirty="0"/>
           </a:p>
@@ -8746,6 +9749,40 @@
           </a:prstGeom>
         </p:spPr>
       </p:pic>
+      <p:sp>
+        <p:nvSpPr>
+          <p:cNvPr id="7" name="TextBox 6"/>
+          <p:cNvSpPr txBox="1"/>
+          <p:nvPr/>
+        </p:nvSpPr>
+        <p:spPr>
+          <a:xfrm>
+            <a:off x="5580112" y="1506428"/>
+            <a:ext cx="2880320" cy="830997"/>
+          </a:xfrm>
+          <a:prstGeom prst="rect">
+            <a:avLst/>
+          </a:prstGeom>
+          <a:noFill/>
+        </p:spPr>
+        <p:txBody>
+          <a:bodyPr wrap="square" rtlCol="0">
+            <a:spAutoFit/>
+          </a:bodyPr>
+          <a:lstStyle/>
+          <a:p>
+            <a:pPr marL="342900" indent="-342900">
+              <a:buFont typeface="Arial" panose="020B0604020202020204" pitchFamily="34" charset="0"/>
+              <a:buChar char="•"/>
+            </a:pPr>
+            <a:r>
+              <a:rPr lang="tr-TR" dirty="0" smtClean="0"/>
+              <a:t>High Wind Speed Scenario</a:t>
+            </a:r>
+            <a:endParaRPr lang="tr-TR" dirty="0"/>
+          </a:p>
+        </p:txBody>
+      </p:sp>
     </p:spTree>
     <p:extLst>
       <p:ext uri="{BB962C8B-B14F-4D97-AF65-F5344CB8AC3E}">
@@ -8767,7 +9804,7 @@
 </p:sld>
 </file>
 
-<file path=ppt/slides/slide19.xml><?xml version="1.0" encoding="utf-8"?>
+<file path=ppt/slides/slide22.xml><?xml version="1.0" encoding="utf-8"?>
 <p:sld xmlns:a="http://schemas.openxmlformats.org/drawingml/2006/main" xmlns:r="http://schemas.openxmlformats.org/officeDocument/2006/relationships" xmlns:p="http://schemas.openxmlformats.org/presentationml/2006/main">
   <p:cSld>
     <p:spTree>
@@ -8865,7 +9902,7 @@
               <a:pPr>
                 <a:defRPr/>
               </a:pPr>
-              <a:t>19</a:t>
+              <a:t>22</a:t>
             </a:fld>
             <a:endParaRPr lang="en-US" dirty="0"/>
           </a:p>
@@ -8982,7 +10019,7 @@
 </p:sld>
 </file>
 
-<file path=ppt/slides/slide2.xml><?xml version="1.0" encoding="utf-8"?>
+<file path=ppt/slides/slide23.xml><?xml version="1.0" encoding="utf-8"?>
 <p:sld xmlns:a="http://schemas.openxmlformats.org/drawingml/2006/main" xmlns:r="http://schemas.openxmlformats.org/officeDocument/2006/relationships" xmlns:p="http://schemas.openxmlformats.org/presentationml/2006/main">
   <p:cSld>
     <p:spTree>
@@ -9022,132 +10059,9 @@
                 <a:latin typeface="Arial" panose="020B0604020202020204" pitchFamily="34" charset="0"/>
                 <a:cs typeface="Arial" panose="020B0604020202020204" pitchFamily="34" charset="0"/>
               </a:rPr>
-              <a:t>Agenda</a:t>
+              <a:t>Implementation on a Test Case</a:t>
             </a:r>
             <a:endParaRPr lang="en-US" dirty="0" smtClean="0">
-              <a:latin typeface="Arial" panose="020B0604020202020204" pitchFamily="34" charset="0"/>
-              <a:cs typeface="Arial" panose="020B0604020202020204" pitchFamily="34" charset="0"/>
-            </a:endParaRPr>
-          </a:p>
-        </p:txBody>
-      </p:sp>
-      <p:sp>
-        <p:nvSpPr>
-          <p:cNvPr id="5123" name="Rectangle 3"/>
-          <p:cNvSpPr>
-            <a:spLocks noGrp="1" noChangeArrowheads="1"/>
-          </p:cNvSpPr>
-          <p:nvPr>
-            <p:ph idx="1"/>
-          </p:nvPr>
-        </p:nvSpPr>
-        <p:spPr>
-          <a:xfrm>
-            <a:off x="457198" y="1700808"/>
-            <a:ext cx="8229601" cy="4114800"/>
-          </a:xfrm>
-        </p:spPr>
-        <p:txBody>
-          <a:bodyPr/>
-          <a:lstStyle/>
-          <a:p>
-            <a:pPr lvl="1">
-              <a:defRPr/>
-            </a:pPr>
-            <a:r>
-              <a:rPr lang="tr-TR" sz="2400" dirty="0" smtClean="0">
-                <a:latin typeface="Arial" panose="020B0604020202020204" pitchFamily="34" charset="0"/>
-                <a:cs typeface="Arial" panose="020B0604020202020204" pitchFamily="34" charset="0"/>
-              </a:rPr>
-              <a:t>Renewable </a:t>
-            </a:r>
-            <a:r>
-              <a:rPr lang="tr-TR" sz="2400" dirty="0" smtClean="0">
-                <a:latin typeface="Arial" panose="020B0604020202020204" pitchFamily="34" charset="0"/>
-                <a:cs typeface="Arial" panose="020B0604020202020204" pitchFamily="34" charset="0"/>
-              </a:rPr>
-              <a:t>Energy Problems</a:t>
-            </a:r>
-          </a:p>
-          <a:p>
-            <a:pPr lvl="1">
-              <a:defRPr/>
-            </a:pPr>
-            <a:r>
-              <a:rPr lang="tr-TR" sz="2400" dirty="0" smtClean="0">
-                <a:latin typeface="Arial" panose="020B0604020202020204" pitchFamily="34" charset="0"/>
-                <a:cs typeface="Arial" panose="020B0604020202020204" pitchFamily="34" charset="0"/>
-              </a:rPr>
-              <a:t>Grid Inertia, Frequency and Inertial Support</a:t>
-            </a:r>
-          </a:p>
-          <a:p>
-            <a:pPr lvl="1">
-              <a:defRPr/>
-            </a:pPr>
-            <a:r>
-              <a:rPr lang="tr-TR" sz="2400" dirty="0" smtClean="0">
-                <a:latin typeface="Arial" panose="020B0604020202020204" pitchFamily="34" charset="0"/>
-                <a:cs typeface="Arial" panose="020B0604020202020204" pitchFamily="34" charset="0"/>
-              </a:rPr>
-              <a:t>Wind Turbine Modelling</a:t>
-            </a:r>
-          </a:p>
-          <a:p>
-            <a:pPr lvl="1">
-              <a:defRPr/>
-            </a:pPr>
-            <a:r>
-              <a:rPr lang="tr-TR" sz="2400" dirty="0" smtClean="0">
-                <a:latin typeface="Arial" panose="020B0604020202020204" pitchFamily="34" charset="0"/>
-                <a:cs typeface="Arial" panose="020B0604020202020204" pitchFamily="34" charset="0"/>
-              </a:rPr>
-              <a:t>Fast Inertial Support</a:t>
-            </a:r>
-          </a:p>
-          <a:p>
-            <a:pPr lvl="1">
-              <a:defRPr/>
-            </a:pPr>
-            <a:r>
-              <a:rPr lang="tr-TR" sz="2400" dirty="0" smtClean="0">
-                <a:latin typeface="Arial" panose="020B0604020202020204" pitchFamily="34" charset="0"/>
-                <a:cs typeface="Arial" panose="020B0604020202020204" pitchFamily="34" charset="0"/>
-              </a:rPr>
-              <a:t>Synthetic Inertia Support</a:t>
-            </a:r>
-          </a:p>
-          <a:p>
-            <a:pPr lvl="1">
-              <a:defRPr/>
-            </a:pPr>
-            <a:r>
-              <a:rPr lang="tr-TR" sz="2400" dirty="0" smtClean="0">
-                <a:latin typeface="Arial" panose="020B0604020202020204" pitchFamily="34" charset="0"/>
-                <a:cs typeface="Arial" panose="020B0604020202020204" pitchFamily="34" charset="0"/>
-              </a:rPr>
-              <a:t>Economical </a:t>
-            </a:r>
-            <a:r>
-              <a:rPr lang="tr-TR" sz="2400" dirty="0" smtClean="0">
-                <a:latin typeface="Arial" panose="020B0604020202020204" pitchFamily="34" charset="0"/>
-                <a:cs typeface="Arial" panose="020B0604020202020204" pitchFamily="34" charset="0"/>
-              </a:rPr>
-              <a:t>Perspective</a:t>
-            </a:r>
-          </a:p>
-          <a:p>
-            <a:pPr lvl="1">
-              <a:defRPr/>
-            </a:pPr>
-            <a:r>
-              <a:rPr lang="tr-TR" sz="2400" dirty="0" smtClean="0">
-                <a:latin typeface="Arial" panose="020B0604020202020204" pitchFamily="34" charset="0"/>
-                <a:cs typeface="Arial" panose="020B0604020202020204" pitchFamily="34" charset="0"/>
-              </a:rPr>
-              <a:t>Conclusion</a:t>
-            </a:r>
-            <a:endParaRPr lang="en-US" sz="2400" dirty="0" smtClean="0">
               <a:latin typeface="Arial" panose="020B0604020202020204" pitchFamily="34" charset="0"/>
               <a:cs typeface="Arial" panose="020B0604020202020204" pitchFamily="34" charset="0"/>
             </a:endParaRPr>
@@ -9203,127 +10117,7 @@
               <a:pPr>
                 <a:defRPr/>
               </a:pPr>
-              <a:t>2</a:t>
-            </a:fld>
-            <a:endParaRPr lang="en-US" dirty="0"/>
-          </a:p>
-        </p:txBody>
-      </p:sp>
-    </p:spTree>
-  </p:cSld>
-  <p:clrMapOvr>
-    <a:masterClrMapping/>
-  </p:clrMapOvr>
-  <p:transition/>
-  <p:timing>
-    <p:tnLst>
-      <p:par>
-        <p:cTn id="1" dur="indefinite" restart="never" nodeType="tmRoot"/>
-      </p:par>
-    </p:tnLst>
-  </p:timing>
-</p:sld>
-</file>
-
-<file path=ppt/slides/slide20.xml><?xml version="1.0" encoding="utf-8"?>
-<p:sld xmlns:a="http://schemas.openxmlformats.org/drawingml/2006/main" xmlns:r="http://schemas.openxmlformats.org/officeDocument/2006/relationships" xmlns:p="http://schemas.openxmlformats.org/presentationml/2006/main">
-  <p:cSld>
-    <p:spTree>
-      <p:nvGrpSpPr>
-        <p:cNvPr id="1" name=""/>
-        <p:cNvGrpSpPr/>
-        <p:nvPr/>
-      </p:nvGrpSpPr>
-      <p:grpSpPr>
-        <a:xfrm>
-          <a:off x="0" y="0"/>
-          <a:ext cx="0" cy="0"/>
-          <a:chOff x="0" y="0"/>
-          <a:chExt cx="0" cy="0"/>
-        </a:xfrm>
-      </p:grpSpPr>
-      <p:sp>
-        <p:nvSpPr>
-          <p:cNvPr id="5122" name="Rectangle 2"/>
-          <p:cNvSpPr>
-            <a:spLocks noGrp="1" noChangeArrowheads="1"/>
-          </p:cNvSpPr>
-          <p:nvPr>
-            <p:ph type="title"/>
-          </p:nvPr>
-        </p:nvSpPr>
-        <p:spPr/>
-        <p:txBody>
-          <a:bodyPr/>
-          <a:lstStyle/>
-          <a:p>
-            <a:pPr>
-              <a:defRPr/>
-            </a:pPr>
-            <a:r>
-              <a:rPr lang="tr-TR" dirty="0" smtClean="0">
-                <a:latin typeface="Arial" panose="020B0604020202020204" pitchFamily="34" charset="0"/>
-                <a:cs typeface="Arial" panose="020B0604020202020204" pitchFamily="34" charset="0"/>
-              </a:rPr>
-              <a:t>Implementation on a Test Case</a:t>
-            </a:r>
-            <a:endParaRPr lang="en-US" dirty="0" smtClean="0">
-              <a:latin typeface="Arial" panose="020B0604020202020204" pitchFamily="34" charset="0"/>
-              <a:cs typeface="Arial" panose="020B0604020202020204" pitchFamily="34" charset="0"/>
-            </a:endParaRPr>
-          </a:p>
-        </p:txBody>
-      </p:sp>
-      <p:sp>
-        <p:nvSpPr>
-          <p:cNvPr id="2" name="Date Placeholder 1"/>
-          <p:cNvSpPr>
-            <a:spLocks noGrp="1"/>
-          </p:cNvSpPr>
-          <p:nvPr>
-            <p:ph type="dt" sz="half" idx="2"/>
-          </p:nvPr>
-        </p:nvSpPr>
-        <p:spPr/>
-        <p:txBody>
-          <a:bodyPr/>
-          <a:lstStyle/>
-          <a:p>
-            <a:pPr>
-              <a:defRPr/>
-            </a:pPr>
-            <a:r>
-              <a:rPr lang="tr-TR" smtClean="0"/>
-              <a:t>18.01.2019</a:t>
-            </a:r>
-            <a:endParaRPr lang="en-US" dirty="0"/>
-          </a:p>
-        </p:txBody>
-      </p:sp>
-      <p:sp>
-        <p:nvSpPr>
-          <p:cNvPr id="3" name="Slide Number Placeholder 2"/>
-          <p:cNvSpPr>
-            <a:spLocks noGrp="1"/>
-          </p:cNvSpPr>
-          <p:nvPr>
-            <p:ph type="sldNum" sz="quarter" idx="12"/>
-          </p:nvPr>
-        </p:nvSpPr>
-        <p:spPr/>
-        <p:txBody>
-          <a:bodyPr/>
-          <a:lstStyle/>
-          <a:p>
-            <a:pPr>
-              <a:defRPr/>
-            </a:pPr>
-            <a:fld id="{C878F797-6006-4DDA-AFE9-456F280FE6C5}" type="slidenum">
-              <a:rPr lang="en-US" smtClean="0"/>
-              <a:pPr>
-                <a:defRPr/>
-              </a:pPr>
-              <a:t>20</a:t>
+              <a:t>23</a:t>
             </a:fld>
             <a:endParaRPr lang="en-US" dirty="0"/>
           </a:p>
@@ -9409,7 +10203,7 @@
 </p:sld>
 </file>
 
-<file path=ppt/slides/slide21.xml><?xml version="1.0" encoding="utf-8"?>
+<file path=ppt/slides/slide24.xml><?xml version="1.0" encoding="utf-8"?>
 <p:sld xmlns:a="http://schemas.openxmlformats.org/drawingml/2006/main" xmlns:r="http://schemas.openxmlformats.org/officeDocument/2006/relationships" xmlns:p="http://schemas.openxmlformats.org/presentationml/2006/main">
   <p:cSld>
     <p:spTree>
@@ -9507,7 +10301,7 @@
               <a:pPr>
                 <a:defRPr/>
               </a:pPr>
-              <a:t>21</a:t>
+              <a:t>24</a:t>
             </a:fld>
             <a:endParaRPr lang="en-US" dirty="0"/>
           </a:p>
@@ -10521,7 +11315,7 @@
 </p:sld>
 </file>
 
-<file path=ppt/slides/slide22.xml><?xml version="1.0" encoding="utf-8"?>
+<file path=ppt/slides/slide25.xml><?xml version="1.0" encoding="utf-8"?>
 <p:sld xmlns:a="http://schemas.openxmlformats.org/drawingml/2006/main" xmlns:r="http://schemas.openxmlformats.org/officeDocument/2006/relationships" xmlns:p="http://schemas.openxmlformats.org/presentationml/2006/main">
   <p:cSld>
     <p:spTree>
@@ -10619,7 +11413,7 @@
               <a:pPr>
                 <a:defRPr/>
               </a:pPr>
-              <a:t>22</a:t>
+              <a:t>25</a:t>
             </a:fld>
             <a:endParaRPr lang="en-US" dirty="0"/>
           </a:p>
@@ -10765,7 +11559,7 @@
 </p:sld>
 </file>
 
-<file path=ppt/slides/slide23.xml><?xml version="1.0" encoding="utf-8"?>
+<file path=ppt/slides/slide26.xml><?xml version="1.0" encoding="utf-8"?>
 <p:sld xmlns:a="http://schemas.openxmlformats.org/drawingml/2006/main" xmlns:r="http://schemas.openxmlformats.org/officeDocument/2006/relationships" xmlns:p="http://schemas.openxmlformats.org/presentationml/2006/main">
   <p:cSld>
     <p:spTree>
@@ -10863,7 +11657,7 @@
               <a:pPr>
                 <a:defRPr/>
               </a:pPr>
-              <a:t>23</a:t>
+              <a:t>26</a:t>
             </a:fld>
             <a:endParaRPr lang="en-US" dirty="0"/>
           </a:p>
@@ -10919,7 +11713,7 @@
 </p:sld>
 </file>
 
-<file path=ppt/slides/slide24.xml><?xml version="1.0" encoding="utf-8"?>
+<file path=ppt/slides/slide27.xml><?xml version="1.0" encoding="utf-8"?>
 <p:sld xmlns:a="http://schemas.openxmlformats.org/drawingml/2006/main" xmlns:r="http://schemas.openxmlformats.org/officeDocument/2006/relationships" xmlns:p="http://schemas.openxmlformats.org/presentationml/2006/main">
   <p:cSld>
     <p:spTree>
@@ -11017,7 +11811,7 @@
               <a:pPr>
                 <a:defRPr/>
               </a:pPr>
-              <a:t>24</a:t>
+              <a:t>27</a:t>
             </a:fld>
             <a:endParaRPr lang="en-US" dirty="0"/>
           </a:p>
@@ -11103,7 +11897,7 @@
 </p:sld>
 </file>
 
-<file path=ppt/slides/slide25.xml><?xml version="1.0" encoding="utf-8"?>
+<file path=ppt/slides/slide28.xml><?xml version="1.0" encoding="utf-8"?>
 <p:sld xmlns:a="http://schemas.openxmlformats.org/drawingml/2006/main" xmlns:r="http://schemas.openxmlformats.org/officeDocument/2006/relationships" xmlns:p="http://schemas.openxmlformats.org/presentationml/2006/main">
   <p:cSld>
     <p:spTree>
@@ -11201,7 +11995,7 @@
               <a:pPr>
                 <a:defRPr/>
               </a:pPr>
-              <a:t>25</a:t>
+              <a:t>28</a:t>
             </a:fld>
             <a:endParaRPr lang="en-US" dirty="0"/>
           </a:p>
@@ -11839,7 +12633,7 @@
 </p:sld>
 </file>
 
-<file path=ppt/slides/slide26.xml><?xml version="1.0" encoding="utf-8"?>
+<file path=ppt/slides/slide29.xml><?xml version="1.0" encoding="utf-8"?>
 <p:sld xmlns:a="http://schemas.openxmlformats.org/drawingml/2006/main" xmlns:r="http://schemas.openxmlformats.org/officeDocument/2006/relationships" xmlns:p="http://schemas.openxmlformats.org/presentationml/2006/main">
   <p:cSld>
     <p:spTree>
@@ -11937,7 +12731,7 @@
               <a:pPr>
                 <a:defRPr/>
               </a:pPr>
-              <a:t>26</a:t>
+              <a:t>29</a:t>
             </a:fld>
             <a:endParaRPr lang="en-US" dirty="0"/>
           </a:p>
@@ -11993,7 +12787,7 @@
 </p:sld>
 </file>
 
-<file path=ppt/slides/slide27.xml><?xml version="1.0" encoding="utf-8"?>
+<file path=ppt/slides/slide3.xml><?xml version="1.0" encoding="utf-8"?>
 <p:sld xmlns:a="http://schemas.openxmlformats.org/drawingml/2006/main" xmlns:r="http://schemas.openxmlformats.org/officeDocument/2006/relationships" xmlns:p="http://schemas.openxmlformats.org/presentationml/2006/main">
   <p:cSld>
     <p:spTree>
@@ -12033,7 +12827,7 @@
                 <a:latin typeface="Arial" panose="020B0604020202020204" pitchFamily="34" charset="0"/>
                 <a:cs typeface="Arial" panose="020B0604020202020204" pitchFamily="34" charset="0"/>
               </a:rPr>
-              <a:t>Economical Perspective</a:t>
+              <a:t>Renewable Energy Problems</a:t>
             </a:r>
             <a:endParaRPr lang="en-US" dirty="0" smtClean="0">
               <a:latin typeface="Arial" panose="020B0604020202020204" pitchFamily="34" charset="0"/>
@@ -12061,7 +12855,7 @@
               <a:defRPr/>
             </a:pPr>
             <a:r>
-              <a:rPr lang="tr-TR" smtClean="0"/>
+              <a:rPr lang="tr-TR" dirty="0" smtClean="0"/>
               <a:t>18.01.2019</a:t>
             </a:r>
             <a:endParaRPr lang="en-US" dirty="0"/>
@@ -12091,7 +12885,181 @@
               <a:pPr>
                 <a:defRPr/>
               </a:pPr>
-              <a:t>27</a:t>
+              <a:t>3</a:t>
+            </a:fld>
+            <a:endParaRPr lang="en-US" dirty="0"/>
+          </a:p>
+        </p:txBody>
+      </p:sp>
+      <p:sp>
+        <p:nvSpPr>
+          <p:cNvPr id="4" name="Content Placeholder 3"/>
+          <p:cNvSpPr>
+            <a:spLocks noGrp="1"/>
+          </p:cNvSpPr>
+          <p:nvPr>
+            <p:ph idx="1"/>
+          </p:nvPr>
+        </p:nvSpPr>
+        <p:spPr/>
+        <p:txBody>
+          <a:bodyPr/>
+          <a:lstStyle/>
+          <a:p>
+            <a:endParaRPr lang="tr-TR"/>
+          </a:p>
+        </p:txBody>
+      </p:sp>
+      <p:pic>
+        <p:nvPicPr>
+          <p:cNvPr id="7" name="Picture 6"/>
+          <p:cNvPicPr>
+            <a:picLocks noChangeAspect="1"/>
+          </p:cNvPicPr>
+          <p:nvPr/>
+        </p:nvPicPr>
+        <p:blipFill>
+          <a:blip r:embed="rId3">
+            <a:extLst>
+              <a:ext uri="{28A0092B-C50C-407E-A947-70E740481C1C}">
+                <a14:useLocalDpi xmlns:a14="http://schemas.microsoft.com/office/drawing/2010/main" val="0"/>
+              </a:ext>
+            </a:extLst>
+          </a:blip>
+          <a:stretch>
+            <a:fillRect/>
+          </a:stretch>
+        </p:blipFill>
+        <p:spPr>
+          <a:xfrm>
+            <a:off x="282351" y="1473795"/>
+            <a:ext cx="8579297" cy="4303053"/>
+          </a:xfrm>
+          <a:prstGeom prst="rect">
+            <a:avLst/>
+          </a:prstGeom>
+        </p:spPr>
+      </p:pic>
+    </p:spTree>
+    <p:extLst>
+      <p:ext uri="{BB962C8B-B14F-4D97-AF65-F5344CB8AC3E}">
+        <p14:creationId xmlns:p14="http://schemas.microsoft.com/office/powerpoint/2010/main" val="2211895997"/>
+      </p:ext>
+    </p:extLst>
+  </p:cSld>
+  <p:clrMapOvr>
+    <a:masterClrMapping/>
+  </p:clrMapOvr>
+  <p:transition/>
+  <p:timing>
+    <p:tnLst>
+      <p:par>
+        <p:cTn id="1" dur="indefinite" restart="never" nodeType="tmRoot"/>
+      </p:par>
+    </p:tnLst>
+  </p:timing>
+</p:sld>
+</file>
+
+<file path=ppt/slides/slide30.xml><?xml version="1.0" encoding="utf-8"?>
+<p:sld xmlns:a="http://schemas.openxmlformats.org/drawingml/2006/main" xmlns:r="http://schemas.openxmlformats.org/officeDocument/2006/relationships" xmlns:p="http://schemas.openxmlformats.org/presentationml/2006/main">
+  <p:cSld>
+    <p:spTree>
+      <p:nvGrpSpPr>
+        <p:cNvPr id="1" name=""/>
+        <p:cNvGrpSpPr/>
+        <p:nvPr/>
+      </p:nvGrpSpPr>
+      <p:grpSpPr>
+        <a:xfrm>
+          <a:off x="0" y="0"/>
+          <a:ext cx="0" cy="0"/>
+          <a:chOff x="0" y="0"/>
+          <a:chExt cx="0" cy="0"/>
+        </a:xfrm>
+      </p:grpSpPr>
+      <p:sp>
+        <p:nvSpPr>
+          <p:cNvPr id="5122" name="Rectangle 2"/>
+          <p:cNvSpPr>
+            <a:spLocks noGrp="1" noChangeArrowheads="1"/>
+          </p:cNvSpPr>
+          <p:nvPr>
+            <p:ph type="title"/>
+          </p:nvPr>
+        </p:nvSpPr>
+        <p:spPr/>
+        <p:txBody>
+          <a:bodyPr/>
+          <a:lstStyle/>
+          <a:p>
+            <a:pPr>
+              <a:defRPr/>
+            </a:pPr>
+            <a:r>
+              <a:rPr lang="tr-TR" dirty="0" smtClean="0">
+                <a:latin typeface="Arial" panose="020B0604020202020204" pitchFamily="34" charset="0"/>
+                <a:cs typeface="Arial" panose="020B0604020202020204" pitchFamily="34" charset="0"/>
+              </a:rPr>
+              <a:t>Economical Perspective</a:t>
+            </a:r>
+            <a:endParaRPr lang="en-US" dirty="0" smtClean="0">
+              <a:latin typeface="Arial" panose="020B0604020202020204" pitchFamily="34" charset="0"/>
+              <a:cs typeface="Arial" panose="020B0604020202020204" pitchFamily="34" charset="0"/>
+            </a:endParaRPr>
+          </a:p>
+        </p:txBody>
+      </p:sp>
+      <p:sp>
+        <p:nvSpPr>
+          <p:cNvPr id="2" name="Date Placeholder 1"/>
+          <p:cNvSpPr>
+            <a:spLocks noGrp="1"/>
+          </p:cNvSpPr>
+          <p:nvPr>
+            <p:ph type="dt" sz="half" idx="2"/>
+          </p:nvPr>
+        </p:nvSpPr>
+        <p:spPr/>
+        <p:txBody>
+          <a:bodyPr/>
+          <a:lstStyle/>
+          <a:p>
+            <a:pPr>
+              <a:defRPr/>
+            </a:pPr>
+            <a:r>
+              <a:rPr lang="tr-TR" smtClean="0"/>
+              <a:t>18.01.2019</a:t>
+            </a:r>
+            <a:endParaRPr lang="en-US" dirty="0"/>
+          </a:p>
+        </p:txBody>
+      </p:sp>
+      <p:sp>
+        <p:nvSpPr>
+          <p:cNvPr id="3" name="Slide Number Placeholder 2"/>
+          <p:cNvSpPr>
+            <a:spLocks noGrp="1"/>
+          </p:cNvSpPr>
+          <p:nvPr>
+            <p:ph type="sldNum" sz="quarter" idx="12"/>
+          </p:nvPr>
+        </p:nvSpPr>
+        <p:spPr/>
+        <p:txBody>
+          <a:bodyPr/>
+          <a:lstStyle/>
+          <a:p>
+            <a:pPr>
+              <a:defRPr/>
+            </a:pPr>
+            <a:fld id="{C878F797-6006-4DDA-AFE9-456F280FE6C5}" type="slidenum">
+              <a:rPr lang="en-US" smtClean="0"/>
+              <a:pPr>
+                <a:defRPr/>
+              </a:pPr>
+              <a:t>30</a:t>
             </a:fld>
             <a:endParaRPr lang="en-US" dirty="0"/>
           </a:p>
@@ -12132,21 +13100,7 @@
                 <a:latin typeface="Arial" panose="020B0604020202020204" pitchFamily="34" charset="0"/>
                 <a:cs typeface="Arial" panose="020B0604020202020204" pitchFamily="34" charset="0"/>
               </a:rPr>
-              <a:t>Let us only pay for </a:t>
-            </a:r>
-            <a:r>
-              <a:rPr lang="tr-TR" dirty="0" smtClean="0">
-                <a:latin typeface="Arial" panose="020B0604020202020204" pitchFamily="34" charset="0"/>
-                <a:cs typeface="Arial" panose="020B0604020202020204" pitchFamily="34" charset="0"/>
-              </a:rPr>
-              <a:t>the increased </a:t>
-            </a:r>
-            <a:r>
-              <a:rPr lang="tr-TR" dirty="0" smtClean="0">
-                <a:latin typeface="Arial" panose="020B0604020202020204" pitchFamily="34" charset="0"/>
-                <a:cs typeface="Arial" panose="020B0604020202020204" pitchFamily="34" charset="0"/>
-              </a:rPr>
-              <a:t>period (neglect the decrease):</a:t>
+              <a:t>Let us only pay for the increased period (neglect the decrease):</a:t>
             </a:r>
           </a:p>
           <a:p>
@@ -12190,10 +13144,6 @@
               </a:rPr>
               <a:t>Incentives might convince the energy provider since it creates a significant rise on the profit (8.2% increase with 0.3¢/kWh).</a:t>
             </a:r>
-            <a:endParaRPr lang="tr-TR" dirty="0" smtClean="0">
-              <a:latin typeface="Arial" panose="020B0604020202020204" pitchFamily="34" charset="0"/>
-              <a:cs typeface="Arial" panose="020B0604020202020204" pitchFamily="34" charset="0"/>
-            </a:endParaRPr>
           </a:p>
           <a:p>
             <a:endParaRPr lang="tr-TR" dirty="0">
@@ -12233,7 +13183,7 @@
 </p:sld>
 </file>
 
-<file path=ppt/slides/slide28.xml><?xml version="1.0" encoding="utf-8"?>
+<file path=ppt/slides/slide31.xml><?xml version="1.0" encoding="utf-8"?>
 <p:sld xmlns:a="http://schemas.openxmlformats.org/drawingml/2006/main" xmlns:r="http://schemas.openxmlformats.org/officeDocument/2006/relationships" xmlns:p="http://schemas.openxmlformats.org/presentationml/2006/main">
   <p:cSld>
     <p:spTree>
@@ -12331,7 +13281,7 @@
               <a:pPr>
                 <a:defRPr/>
               </a:pPr>
-              <a:t>28</a:t>
+              <a:t>31</a:t>
             </a:fld>
             <a:endParaRPr lang="en-US" dirty="0"/>
           </a:p>
@@ -12373,14 +13323,7 @@
                 <a:latin typeface="Arial" panose="020B0604020202020204" pitchFamily="34" charset="0"/>
                 <a:cs typeface="Arial" panose="020B0604020202020204" pitchFamily="34" charset="0"/>
               </a:rPr>
-              <a:t>Inertial support capability of wind turbines with FSPC </a:t>
-            </a:r>
-            <a:r>
-              <a:rPr lang="en-GB" dirty="0" smtClean="0">
-                <a:latin typeface="Arial" panose="020B0604020202020204" pitchFamily="34" charset="0"/>
-                <a:cs typeface="Arial" panose="020B0604020202020204" pitchFamily="34" charset="0"/>
-              </a:rPr>
-              <a:t>is limited with 10% in high wind speeds. Maximum increase occurs in 6.5m/s with 48% increase. Average contribution is 30%.</a:t>
+              <a:t>Inertial support capability of wind turbines with FSPC is limited with 10% in high wind speeds. Maximum increase occurs in 6.5m/s with 48% increase. Average contribution is 30%.</a:t>
             </a:r>
           </a:p>
           <a:p>
@@ -12396,7 +13339,7 @@
                 <a:latin typeface="Arial" panose="020B0604020202020204" pitchFamily="34" charset="0"/>
                 <a:cs typeface="Arial" panose="020B0604020202020204" pitchFamily="34" charset="0"/>
               </a:rPr>
-              <a:t>Wind turbine can emulate the inertia constant H=10m/s for the whole speed range. </a:t>
+              <a:t>Wind turbine can emulate the inertia constant H=10s for the whole speed range. </a:t>
             </a:r>
           </a:p>
           <a:p>
@@ -12789,7 +13732,7 @@
 </p:sld>
 </file>
 
-<file path=ppt/slides/slide29.xml><?xml version="1.0" encoding="utf-8"?>
+<file path=ppt/slides/slide32.xml><?xml version="1.0" encoding="utf-8"?>
 <p:sld xmlns:a="http://schemas.openxmlformats.org/drawingml/2006/main" xmlns:r="http://schemas.openxmlformats.org/officeDocument/2006/relationships" xmlns:p="http://schemas.openxmlformats.org/presentationml/2006/main">
   <p:cSld>
     <p:spTree>
@@ -12887,7 +13830,7 @@
               <a:pPr>
                 <a:defRPr/>
               </a:pPr>
-              <a:t>29</a:t>
+              <a:t>32</a:t>
             </a:fld>
             <a:endParaRPr lang="en-US" dirty="0"/>
           </a:p>
@@ -12936,7 +13879,7 @@
 </p:sld>
 </file>
 
-<file path=ppt/slides/slide3.xml><?xml version="1.0" encoding="utf-8"?>
+<file path=ppt/slides/slide4.xml><?xml version="1.0" encoding="utf-8"?>
 <p:sld xmlns:a="http://schemas.openxmlformats.org/drawingml/2006/main" xmlns:r="http://schemas.openxmlformats.org/officeDocument/2006/relationships" xmlns:p="http://schemas.openxmlformats.org/presentationml/2006/main">
   <p:cSld>
     <p:spTree>
@@ -13091,14 +14034,7 @@
                 <a:latin typeface="Arial" panose="020B0604020202020204" pitchFamily="34" charset="0"/>
                 <a:cs typeface="Arial" panose="020B0604020202020204" pitchFamily="34" charset="0"/>
               </a:rPr>
-              <a:t>Operational </a:t>
-            </a:r>
-            <a:r>
-              <a:rPr lang="tr-TR" sz="2000" dirty="0" smtClean="0">
-                <a:latin typeface="Arial" panose="020B0604020202020204" pitchFamily="34" charset="0"/>
-                <a:cs typeface="Arial" panose="020B0604020202020204" pitchFamily="34" charset="0"/>
-              </a:rPr>
-              <a:t>Problems</a:t>
+              <a:t>Operational Problems</a:t>
             </a:r>
           </a:p>
           <a:p>
@@ -13154,10 +14090,6 @@
               </a:rPr>
               <a:t>existing control structure of the wind turbines</a:t>
             </a:r>
-            <a:endParaRPr lang="tr-TR" sz="2000" dirty="0" smtClean="0">
-              <a:latin typeface="Arial" panose="020B0604020202020204" pitchFamily="34" charset="0"/>
-              <a:cs typeface="Arial" panose="020B0604020202020204" pitchFamily="34" charset="0"/>
-            </a:endParaRPr>
           </a:p>
         </p:txBody>
       </p:sp>
@@ -13210,7 +14142,7 @@
               <a:pPr>
                 <a:defRPr/>
               </a:pPr>
-              <a:t>3</a:t>
+              <a:t>4</a:t>
             </a:fld>
             <a:endParaRPr lang="en-US" dirty="0"/>
           </a:p>
@@ -13219,7 +14151,7 @@
     </p:spTree>
     <p:extLst>
       <p:ext uri="{BB962C8B-B14F-4D97-AF65-F5344CB8AC3E}">
-        <p14:creationId xmlns:p14="http://schemas.microsoft.com/office/powerpoint/2010/main" val="2211895997"/>
+        <p14:creationId xmlns:p14="http://schemas.microsoft.com/office/powerpoint/2010/main" val="3637430949"/>
       </p:ext>
     </p:extLst>
   </p:cSld>
@@ -13694,7 +14626,7 @@
 </p:sld>
 </file>
 
-<file path=ppt/slides/slide4.xml><?xml version="1.0" encoding="utf-8"?>
+<file path=ppt/slides/slide5.xml><?xml version="1.0" encoding="utf-8"?>
 <p:sld xmlns:a="http://schemas.openxmlformats.org/drawingml/2006/main" xmlns:r="http://schemas.openxmlformats.org/officeDocument/2006/relationships" xmlns:p="http://schemas.openxmlformats.org/presentationml/2006/main">
   <p:cSld>
     <p:spTree>
@@ -13792,7 +14724,7 @@
               <a:pPr>
                 <a:defRPr/>
               </a:pPr>
-              <a:t>4</a:t>
+              <a:t>5</a:t>
             </a:fld>
             <a:endParaRPr lang="en-US" dirty="0"/>
           </a:p>
@@ -14147,8 +15079,8 @@
           </p:sp>
         </mc:Fallback>
       </mc:AlternateContent>
-      <mc:AlternateContent xmlns:mc="http://schemas.openxmlformats.org/markup-compatibility/2006">
-        <mc:Choice xmlns:a14="http://schemas.microsoft.com/office/drawing/2010/main" Requires="a14">
+      <mc:AlternateContent xmlns:mc="http://schemas.openxmlformats.org/markup-compatibility/2006" xmlns:a14="http://schemas.microsoft.com/office/drawing/2010/main">
+        <mc:Choice Requires="a14">
           <p:sp>
             <p:nvSpPr>
               <p:cNvPr id="4" name="Rectangle 3"/>
@@ -14201,13 +15133,8 @@
                 </a14:m>
                 <a:r>
                   <a:rPr lang="tr-TR" sz="2000" dirty="0" smtClean="0"/>
-                  <a:t>: Mechanical Input </a:t>
+                  <a:t>: Mechanical Input Torque (water flow)</a:t>
                 </a:r>
-                <a:r>
-                  <a:rPr lang="tr-TR" sz="2000" dirty="0" smtClean="0"/>
-                  <a:t>Torque (water flow)</a:t>
-                </a:r>
-                <a:endParaRPr lang="tr-TR" sz="2000" dirty="0" smtClean="0"/>
               </a:p>
               <a:p>
                 <a14:m>
@@ -14248,7 +15175,7 @@
             </p:txBody>
           </p:sp>
         </mc:Choice>
-        <mc:Fallback>
+        <mc:Fallback xmlns="">
           <p:sp>
             <p:nvSpPr>
               <p:cNvPr id="4" name="Rectangle 3"/>
@@ -14308,7 +15235,7 @@
 </p:sld>
 </file>
 
-<file path=ppt/slides/slide5.xml><?xml version="1.0" encoding="utf-8"?>
+<file path=ppt/slides/slide6.xml><?xml version="1.0" encoding="utf-8"?>
 <p:sld xmlns:a="http://schemas.openxmlformats.org/drawingml/2006/main" xmlns:r="http://schemas.openxmlformats.org/officeDocument/2006/relationships" xmlns:p="http://schemas.openxmlformats.org/presentationml/2006/main">
   <p:cSld>
     <p:spTree>
@@ -14406,7 +15333,7 @@
               <a:pPr>
                 <a:defRPr/>
               </a:pPr>
-              <a:t>5</a:t>
+              <a:t>6</a:t>
             </a:fld>
             <a:endParaRPr lang="en-US" dirty="0"/>
           </a:p>
@@ -15013,7 +15940,7 @@
 </p:sld>
 </file>
 
-<file path=ppt/slides/slide6.xml><?xml version="1.0" encoding="utf-8"?>
+<file path=ppt/slides/slide7.xml><?xml version="1.0" encoding="utf-8"?>
 <p:sld xmlns:a="http://schemas.openxmlformats.org/drawingml/2006/main" xmlns:r="http://schemas.openxmlformats.org/officeDocument/2006/relationships" xmlns:p="http://schemas.openxmlformats.org/presentationml/2006/main">
   <p:cSld>
     <p:spTree>
@@ -15140,7 +16067,7 @@
               <a:pPr>
                 <a:defRPr/>
               </a:pPr>
-              <a:t>6</a:t>
+              <a:t>7</a:t>
             </a:fld>
             <a:endParaRPr lang="en-US" dirty="0"/>
           </a:p>
@@ -15513,13 +16440,8 @@
             </a:pPr>
             <a:r>
               <a:rPr lang="tr-TR" dirty="0" smtClean="0"/>
-              <a:t>Primary Frequency </a:t>
-            </a:r>
-            <a:r>
-              <a:rPr lang="tr-TR" dirty="0" smtClean="0"/>
-              <a:t>Control (no longer than 15s)</a:t>
-            </a:r>
-            <a:endParaRPr lang="tr-TR" dirty="0" smtClean="0"/>
+              <a:t>Primary Frequency Control (no longer than 15s)</a:t>
+            </a:r>
           </a:p>
           <a:p>
             <a:pPr marL="342900" indent="-342900">
@@ -15562,324 +16484,6 @@
     <p:extLst>
       <p:ext uri="{BB962C8B-B14F-4D97-AF65-F5344CB8AC3E}">
         <p14:creationId xmlns:p14="http://schemas.microsoft.com/office/powerpoint/2010/main" val="3720787453"/>
-      </p:ext>
-    </p:extLst>
-  </p:cSld>
-  <p:clrMapOvr>
-    <a:masterClrMapping/>
-  </p:clrMapOvr>
-  <p:transition/>
-  <p:timing>
-    <p:tnLst>
-      <p:par>
-        <p:cTn id="1" dur="indefinite" restart="never" nodeType="tmRoot"/>
-      </p:par>
-    </p:tnLst>
-  </p:timing>
-</p:sld>
-</file>
-
-<file path=ppt/slides/slide7.xml><?xml version="1.0" encoding="utf-8"?>
-<p:sld xmlns:a="http://schemas.openxmlformats.org/drawingml/2006/main" xmlns:r="http://schemas.openxmlformats.org/officeDocument/2006/relationships" xmlns:p="http://schemas.openxmlformats.org/presentationml/2006/main">
-  <p:cSld>
-    <p:spTree>
-      <p:nvGrpSpPr>
-        <p:cNvPr id="1" name=""/>
-        <p:cNvGrpSpPr/>
-        <p:nvPr/>
-      </p:nvGrpSpPr>
-      <p:grpSpPr>
-        <a:xfrm>
-          <a:off x="0" y="0"/>
-          <a:ext cx="0" cy="0"/>
-          <a:chOff x="0" y="0"/>
-          <a:chExt cx="0" cy="0"/>
-        </a:xfrm>
-      </p:grpSpPr>
-      <p:sp>
-        <p:nvSpPr>
-          <p:cNvPr id="5122" name="Rectangle 2"/>
-          <p:cNvSpPr>
-            <a:spLocks noGrp="1" noChangeArrowheads="1"/>
-          </p:cNvSpPr>
-          <p:nvPr>
-            <p:ph type="title"/>
-          </p:nvPr>
-        </p:nvSpPr>
-        <p:spPr/>
-        <p:txBody>
-          <a:bodyPr/>
-          <a:lstStyle/>
-          <a:p>
-            <a:pPr>
-              <a:defRPr/>
-            </a:pPr>
-            <a:r>
-              <a:rPr lang="tr-TR" dirty="0" smtClean="0">
-                <a:latin typeface="Arial" panose="020B0604020202020204" pitchFamily="34" charset="0"/>
-                <a:cs typeface="Arial" panose="020B0604020202020204" pitchFamily="34" charset="0"/>
-              </a:rPr>
-              <a:t>Frequeny Disturbance</a:t>
-            </a:r>
-            <a:endParaRPr lang="en-US" dirty="0" smtClean="0">
-              <a:latin typeface="Arial" panose="020B0604020202020204" pitchFamily="34" charset="0"/>
-              <a:cs typeface="Arial" panose="020B0604020202020204" pitchFamily="34" charset="0"/>
-            </a:endParaRPr>
-          </a:p>
-        </p:txBody>
-      </p:sp>
-      <p:sp>
-        <p:nvSpPr>
-          <p:cNvPr id="2" name="Date Placeholder 1"/>
-          <p:cNvSpPr>
-            <a:spLocks noGrp="1"/>
-          </p:cNvSpPr>
-          <p:nvPr>
-            <p:ph type="dt" sz="half" idx="2"/>
-          </p:nvPr>
-        </p:nvSpPr>
-        <p:spPr/>
-        <p:txBody>
-          <a:bodyPr/>
-          <a:lstStyle/>
-          <a:p>
-            <a:pPr>
-              <a:defRPr/>
-            </a:pPr>
-            <a:r>
-              <a:rPr lang="tr-TR" smtClean="0"/>
-              <a:t>18.01.2019</a:t>
-            </a:r>
-            <a:endParaRPr lang="en-US" dirty="0"/>
-          </a:p>
-        </p:txBody>
-      </p:sp>
-      <p:sp>
-        <p:nvSpPr>
-          <p:cNvPr id="3" name="Slide Number Placeholder 2"/>
-          <p:cNvSpPr>
-            <a:spLocks noGrp="1"/>
-          </p:cNvSpPr>
-          <p:nvPr>
-            <p:ph type="sldNum" sz="quarter" idx="12"/>
-          </p:nvPr>
-        </p:nvSpPr>
-        <p:spPr/>
-        <p:txBody>
-          <a:bodyPr/>
-          <a:lstStyle/>
-          <a:p>
-            <a:pPr>
-              <a:defRPr/>
-            </a:pPr>
-            <a:fld id="{C878F797-6006-4DDA-AFE9-456F280FE6C5}" type="slidenum">
-              <a:rPr lang="en-US" smtClean="0"/>
-              <a:pPr>
-                <a:defRPr/>
-              </a:pPr>
-              <a:t>7</a:t>
-            </a:fld>
-            <a:endParaRPr lang="en-US" dirty="0"/>
-          </a:p>
-        </p:txBody>
-      </p:sp>
-      <p:pic>
-        <p:nvPicPr>
-          <p:cNvPr id="5" name="Content Placeholder 4"/>
-          <p:cNvPicPr>
-            <a:picLocks noGrp="1" noChangeAspect="1"/>
-          </p:cNvPicPr>
-          <p:nvPr>
-            <p:ph idx="1"/>
-          </p:nvPr>
-        </p:nvPicPr>
-        <p:blipFill>
-          <a:blip r:embed="rId3">
-            <a:extLst>
-              <a:ext uri="{28A0092B-C50C-407E-A947-70E740481C1C}">
-                <a14:useLocalDpi xmlns:a14="http://schemas.microsoft.com/office/drawing/2010/main" val="0"/>
-              </a:ext>
-            </a:extLst>
-          </a:blip>
-          <a:stretch>
-            <a:fillRect/>
-          </a:stretch>
-        </p:blipFill>
-        <p:spPr>
-          <a:xfrm>
-            <a:off x="4320336" y="1522369"/>
-            <a:ext cx="4762872" cy="3283681"/>
-          </a:xfrm>
-        </p:spPr>
-      </p:pic>
-      <p:sp>
-        <p:nvSpPr>
-          <p:cNvPr id="9" name="Left Arrow 8"/>
-          <p:cNvSpPr/>
-          <p:nvPr/>
-        </p:nvSpPr>
-        <p:spPr>
-          <a:xfrm rot="8090536">
-            <a:off x="5306102" y="1757171"/>
-            <a:ext cx="1259776" cy="360290"/>
-          </a:xfrm>
-          <a:prstGeom prst="leftArrow">
-            <a:avLst/>
-          </a:prstGeom>
-          <a:noFill/>
-          <a:ln w="19050">
-            <a:solidFill>
-              <a:schemeClr val="tx1"/>
-            </a:solidFill>
-          </a:ln>
-          <a:effectLst/>
-        </p:spPr>
-        <p:style>
-          <a:lnRef idx="1">
-            <a:schemeClr val="accent1"/>
-          </a:lnRef>
-          <a:fillRef idx="3">
-            <a:schemeClr val="accent1"/>
-          </a:fillRef>
-          <a:effectRef idx="2">
-            <a:schemeClr val="accent1"/>
-          </a:effectRef>
-          <a:fontRef idx="minor">
-            <a:schemeClr val="lt1"/>
-          </a:fontRef>
-        </p:style>
-        <p:txBody>
-          <a:bodyPr rtlCol="0" anchor="ctr"/>
-          <a:lstStyle/>
-          <a:p>
-            <a:pPr algn="ctr"/>
-            <a:endParaRPr lang="tr-TR"/>
-          </a:p>
-        </p:txBody>
-      </p:sp>
-      <p:sp>
-        <p:nvSpPr>
-          <p:cNvPr id="10" name="TextBox 9"/>
-          <p:cNvSpPr txBox="1"/>
-          <p:nvPr/>
-        </p:nvSpPr>
-        <p:spPr>
-          <a:xfrm>
-            <a:off x="6507893" y="975661"/>
-            <a:ext cx="1512168" cy="830997"/>
-          </a:xfrm>
-          <a:prstGeom prst="rect">
-            <a:avLst/>
-          </a:prstGeom>
-          <a:noFill/>
-        </p:spPr>
-        <p:txBody>
-          <a:bodyPr wrap="square" rtlCol="0">
-            <a:spAutoFit/>
-          </a:bodyPr>
-          <a:lstStyle/>
-          <a:p>
-            <a:r>
-              <a:rPr lang="tr-TR" dirty="0" smtClean="0"/>
-              <a:t>Inertial Support</a:t>
-            </a:r>
-            <a:endParaRPr lang="tr-TR" dirty="0"/>
-          </a:p>
-        </p:txBody>
-      </p:sp>
-      <p:sp>
-        <p:nvSpPr>
-          <p:cNvPr id="11" name="TextBox 10"/>
-          <p:cNvSpPr txBox="1"/>
-          <p:nvPr/>
-        </p:nvSpPr>
-        <p:spPr>
-          <a:xfrm>
-            <a:off x="1369401" y="5433711"/>
-            <a:ext cx="6405197" cy="461665"/>
-          </a:xfrm>
-          <a:prstGeom prst="rect">
-            <a:avLst/>
-          </a:prstGeom>
-          <a:noFill/>
-        </p:spPr>
-        <p:txBody>
-          <a:bodyPr wrap="square" rtlCol="0">
-            <a:spAutoFit/>
-          </a:bodyPr>
-          <a:lstStyle/>
-          <a:p>
-            <a:r>
-              <a:rPr lang="tr-TR" dirty="0" smtClean="0"/>
-              <a:t>Higher Grid Inertia </a:t>
-            </a:r>
-            <a:r>
-              <a:rPr lang="tr-TR" dirty="0" smtClean="0">
-                <a:sym typeface="Wingdings" panose="05000000000000000000" pitchFamily="2" charset="2"/>
-              </a:rPr>
-              <a:t> Lower RoCoF</a:t>
-            </a:r>
-            <a:endParaRPr lang="tr-TR" dirty="0"/>
-          </a:p>
-        </p:txBody>
-      </p:sp>
-      <p:sp>
-        <p:nvSpPr>
-          <p:cNvPr id="12" name="TextBox 11"/>
-          <p:cNvSpPr txBox="1"/>
-          <p:nvPr/>
-        </p:nvSpPr>
-        <p:spPr>
-          <a:xfrm>
-            <a:off x="748924" y="1660847"/>
-            <a:ext cx="3708776" cy="3416320"/>
-          </a:xfrm>
-          <a:prstGeom prst="rect">
-            <a:avLst/>
-          </a:prstGeom>
-          <a:noFill/>
-        </p:spPr>
-        <p:txBody>
-          <a:bodyPr wrap="square" rtlCol="0">
-            <a:spAutoFit/>
-          </a:bodyPr>
-          <a:lstStyle/>
-          <a:p>
-            <a:pPr marL="342900" indent="-342900">
-              <a:buFont typeface="Arial" panose="020B0604020202020204" pitchFamily="34" charset="0"/>
-              <a:buChar char="•"/>
-            </a:pPr>
-            <a:r>
-              <a:rPr lang="tr-TR" dirty="0" smtClean="0"/>
-              <a:t>Until the primary controller action, the frequency falls. </a:t>
-            </a:r>
-          </a:p>
-          <a:p>
-            <a:pPr marL="800100" lvl="1" indent="-342900">
-              <a:buFont typeface="Arial" panose="020B0604020202020204" pitchFamily="34" charset="0"/>
-              <a:buChar char="•"/>
-            </a:pPr>
-            <a:endParaRPr lang="tr-TR" dirty="0"/>
-          </a:p>
-          <a:p>
-            <a:pPr marL="342900" indent="-342900">
-              <a:buFont typeface="Arial" panose="020B0604020202020204" pitchFamily="34" charset="0"/>
-              <a:buChar char="•"/>
-            </a:pPr>
-            <a:r>
-              <a:rPr lang="tr-TR" dirty="0"/>
-              <a:t>Frequency decline is arrested by Inertial Support and Primary Frequency Controllers</a:t>
-            </a:r>
-          </a:p>
-          <a:p>
-            <a:endParaRPr lang="tr-TR" dirty="0"/>
-          </a:p>
-        </p:txBody>
-      </p:sp>
-    </p:spTree>
-    <p:extLst>
-      <p:ext uri="{BB962C8B-B14F-4D97-AF65-F5344CB8AC3E}">
-        <p14:creationId xmlns:p14="http://schemas.microsoft.com/office/powerpoint/2010/main" val="3028529927"/>
       </p:ext>
     </p:extLst>
   </p:cSld>
@@ -15937,7 +16541,7 @@
                 <a:latin typeface="Arial" panose="020B0604020202020204" pitchFamily="34" charset="0"/>
                 <a:cs typeface="Arial" panose="020B0604020202020204" pitchFamily="34" charset="0"/>
               </a:rPr>
-              <a:t>Renewable Energy Problems</a:t>
+              <a:t>Frequeny Disturbance</a:t>
             </a:r>
             <a:endParaRPr lang="en-US" dirty="0" smtClean="0">
               <a:latin typeface="Arial" panose="020B0604020202020204" pitchFamily="34" charset="0"/>
@@ -16025,21 +16629,66 @@
         </p:blipFill>
         <p:spPr>
           <a:xfrm>
-            <a:off x="448509" y="1351087"/>
-            <a:ext cx="3842939" cy="4987925"/>
+            <a:off x="4320336" y="1522369"/>
+            <a:ext cx="4762872" cy="3283681"/>
           </a:xfrm>
         </p:spPr>
       </p:pic>
       <p:sp>
         <p:nvSpPr>
-          <p:cNvPr id="6" name="TextBox 5"/>
+          <p:cNvPr id="9" name="Left Arrow 8"/>
+          <p:cNvSpPr/>
+          <p:nvPr/>
+        </p:nvSpPr>
+        <p:spPr>
+          <a:xfrm rot="8090536">
+            <a:off x="5306102" y="1757171"/>
+            <a:ext cx="1259776" cy="360290"/>
+          </a:xfrm>
+          <a:prstGeom prst="leftArrow">
+            <a:avLst/>
+          </a:prstGeom>
+          <a:noFill/>
+          <a:ln w="19050">
+            <a:solidFill>
+              <a:schemeClr val="tx1"/>
+            </a:solidFill>
+          </a:ln>
+          <a:effectLst/>
+        </p:spPr>
+        <p:style>
+          <a:lnRef idx="1">
+            <a:schemeClr val="accent1"/>
+          </a:lnRef>
+          <a:fillRef idx="3">
+            <a:schemeClr val="accent1"/>
+          </a:fillRef>
+          <a:effectRef idx="2">
+            <a:schemeClr val="accent1"/>
+          </a:effectRef>
+          <a:fontRef idx="minor">
+            <a:schemeClr val="lt1"/>
+          </a:fontRef>
+        </p:style>
+        <p:txBody>
+          <a:bodyPr rtlCol="0" anchor="ctr"/>
+          <a:lstStyle/>
+          <a:p>
+            <a:pPr algn="ctr"/>
+            <a:endParaRPr lang="tr-TR"/>
+          </a:p>
+        </p:txBody>
+      </p:sp>
+      <p:sp>
+        <p:nvSpPr>
+          <p:cNvPr id="10" name="TextBox 9"/>
           <p:cNvSpPr txBox="1"/>
           <p:nvPr/>
         </p:nvSpPr>
         <p:spPr>
           <a:xfrm>
-            <a:off x="4860032" y="1700808"/>
-            <a:ext cx="3960440" cy="3785652"/>
+            <a:off x="6507893" y="975661"/>
+            <a:ext cx="1512168" cy="830997"/>
           </a:xfrm>
           <a:prstGeom prst="rect">
             <a:avLst/>
@@ -16052,48 +16701,99 @@
           </a:bodyPr>
           <a:lstStyle/>
           <a:p>
+            <a:r>
+              <a:rPr lang="tr-TR" dirty="0" smtClean="0"/>
+              <a:t>Inertial Support</a:t>
+            </a:r>
+            <a:endParaRPr lang="tr-TR" dirty="0"/>
+          </a:p>
+        </p:txBody>
+      </p:sp>
+      <p:sp>
+        <p:nvSpPr>
+          <p:cNvPr id="11" name="TextBox 10"/>
+          <p:cNvSpPr txBox="1"/>
+          <p:nvPr/>
+        </p:nvSpPr>
+        <p:spPr>
+          <a:xfrm>
+            <a:off x="1369401" y="5433711"/>
+            <a:ext cx="6405197" cy="461665"/>
+          </a:xfrm>
+          <a:prstGeom prst="rect">
+            <a:avLst/>
+          </a:prstGeom>
+          <a:noFill/>
+        </p:spPr>
+        <p:txBody>
+          <a:bodyPr wrap="square" rtlCol="0">
+            <a:spAutoFit/>
+          </a:bodyPr>
+          <a:lstStyle/>
+          <a:p>
+            <a:r>
+              <a:rPr lang="tr-TR" dirty="0" smtClean="0"/>
+              <a:t>Higher Grid Inertia </a:t>
+            </a:r>
+            <a:r>
+              <a:rPr lang="tr-TR" dirty="0" smtClean="0">
+                <a:sym typeface="Wingdings" panose="05000000000000000000" pitchFamily="2" charset="2"/>
+              </a:rPr>
+              <a:t> Lower RoCoF</a:t>
+            </a:r>
+            <a:endParaRPr lang="tr-TR" dirty="0"/>
+          </a:p>
+        </p:txBody>
+      </p:sp>
+      <p:sp>
+        <p:nvSpPr>
+          <p:cNvPr id="12" name="TextBox 11"/>
+          <p:cNvSpPr txBox="1"/>
+          <p:nvPr/>
+        </p:nvSpPr>
+        <p:spPr>
+          <a:xfrm>
+            <a:off x="748924" y="1660847"/>
+            <a:ext cx="3708776" cy="3416320"/>
+          </a:xfrm>
+          <a:prstGeom prst="rect">
+            <a:avLst/>
+          </a:prstGeom>
+          <a:noFill/>
+        </p:spPr>
+        <p:txBody>
+          <a:bodyPr wrap="square" rtlCol="0">
+            <a:spAutoFit/>
+          </a:bodyPr>
+          <a:lstStyle/>
+          <a:p>
             <a:pPr marL="342900" indent="-342900">
               <a:buFont typeface="Arial" panose="020B0604020202020204" pitchFamily="34" charset="0"/>
               <a:buChar char="•"/>
             </a:pPr>
             <a:r>
               <a:rPr lang="tr-TR" dirty="0" smtClean="0"/>
-              <a:t>The inertia in the wind turbine is not reflected to grid.</a:t>
-            </a:r>
+              <a:t>Until the primary controller action, the frequency falls. </a:t>
+            </a:r>
+          </a:p>
+          <a:p>
+            <a:pPr marL="800100" lvl="1" indent="-342900">
+              <a:buFont typeface="Arial" panose="020B0604020202020204" pitchFamily="34" charset="0"/>
+              <a:buChar char="•"/>
+            </a:pPr>
+            <a:endParaRPr lang="tr-TR" dirty="0"/>
           </a:p>
           <a:p>
             <a:pPr marL="342900" indent="-342900">
               <a:buFont typeface="Arial" panose="020B0604020202020204" pitchFamily="34" charset="0"/>
               <a:buChar char="•"/>
             </a:pPr>
-            <a:endParaRPr lang="tr-TR" dirty="0" smtClean="0"/>
-          </a:p>
-          <a:p>
-            <a:pPr marL="342900" indent="-342900">
-              <a:buFont typeface="Arial" panose="020B0604020202020204" pitchFamily="34" charset="0"/>
-              <a:buChar char="•"/>
-            </a:pPr>
-            <a:r>
-              <a:rPr lang="tr-TR" dirty="0" smtClean="0"/>
-              <a:t>The increase in the share of RE causes the risk of frequency stability.</a:t>
-            </a:r>
-          </a:p>
-          <a:p>
-            <a:pPr marL="342900" indent="-342900">
-              <a:buFont typeface="Arial" panose="020B0604020202020204" pitchFamily="34" charset="0"/>
-              <a:buChar char="•"/>
-            </a:pPr>
-            <a:endParaRPr lang="tr-TR" dirty="0"/>
-          </a:p>
-          <a:p>
-            <a:pPr marL="342900" indent="-342900">
-              <a:buFont typeface="Arial" panose="020B0604020202020204" pitchFamily="34" charset="0"/>
-              <a:buChar char="•"/>
-            </a:pPr>
-            <a:r>
-              <a:rPr lang="tr-TR" dirty="0" smtClean="0"/>
-              <a:t>Existing structure decreases grid inertia!</a:t>
-            </a:r>
+            <a:r>
+              <a:rPr lang="tr-TR" dirty="0"/>
+              <a:t>Frequency decline is arrested by Inertial Support and Primary Frequency Controllers</a:t>
+            </a:r>
+          </a:p>
+          <a:p>
             <a:endParaRPr lang="tr-TR" dirty="0"/>
           </a:p>
         </p:txBody>
@@ -16101,7 +16801,7 @@
     </p:spTree>
     <p:extLst>
       <p:ext uri="{BB962C8B-B14F-4D97-AF65-F5344CB8AC3E}">
-        <p14:creationId xmlns:p14="http://schemas.microsoft.com/office/powerpoint/2010/main" val="3933851754"/>
+        <p14:creationId xmlns:p14="http://schemas.microsoft.com/office/powerpoint/2010/main" val="3028529927"/>
       </p:ext>
     </p:extLst>
   </p:cSld>
@@ -16223,58 +16923,15 @@
           </a:p>
         </p:txBody>
       </p:sp>
-      <p:sp>
-        <p:nvSpPr>
-          <p:cNvPr id="4" name="Content Placeholder 3"/>
-          <p:cNvSpPr>
-            <a:spLocks noGrp="1"/>
-          </p:cNvSpPr>
-          <p:nvPr>
-            <p:ph idx="1"/>
-          </p:nvPr>
-        </p:nvSpPr>
-        <p:spPr>
-          <a:xfrm>
-            <a:off x="457200" y="1430339"/>
-            <a:ext cx="8229600" cy="1782637"/>
-          </a:xfrm>
-        </p:spPr>
-        <p:txBody>
-          <a:bodyPr/>
-          <a:lstStyle/>
-          <a:p>
-            <a:r>
-              <a:rPr lang="tr-TR" dirty="0" smtClean="0">
-                <a:latin typeface="Arial" panose="020B0604020202020204" pitchFamily="34" charset="0"/>
-                <a:cs typeface="Arial" panose="020B0604020202020204" pitchFamily="34" charset="0"/>
-              </a:rPr>
-              <a:t>The synchronous generators contribute grid inertia by injecting more power in the frequency disturbances. </a:t>
-            </a:r>
-          </a:p>
-          <a:p>
-            <a:endParaRPr lang="tr-TR" dirty="0">
-              <a:latin typeface="Arial" panose="020B0604020202020204" pitchFamily="34" charset="0"/>
-              <a:cs typeface="Arial" panose="020B0604020202020204" pitchFamily="34" charset="0"/>
-            </a:endParaRPr>
-          </a:p>
-          <a:p>
-            <a:r>
-              <a:rPr lang="tr-TR" dirty="0" smtClean="0">
-                <a:latin typeface="Arial" panose="020B0604020202020204" pitchFamily="34" charset="0"/>
-                <a:cs typeface="Arial" panose="020B0604020202020204" pitchFamily="34" charset="0"/>
-              </a:rPr>
-              <a:t>The decrease in the grid inertia can be solved by emulating inertia support in the renewable energy systems. </a:t>
-            </a:r>
-          </a:p>
-        </p:txBody>
-      </p:sp>
       <p:pic>
         <p:nvPicPr>
-          <p:cNvPr id="7" name="Picture 6"/>
+          <p:cNvPr id="5" name="Content Placeholder 4"/>
           <p:cNvPicPr>
-            <a:picLocks noChangeAspect="1"/>
+            <a:picLocks noGrp="1" noChangeAspect="1"/>
           </p:cNvPicPr>
-          <p:nvPr/>
+          <p:nvPr>
+            <p:ph idx="1"/>
+          </p:nvPr>
         </p:nvPicPr>
         <p:blipFill>
           <a:blip r:embed="rId3">
@@ -16290,269 +16947,83 @@
         </p:blipFill>
         <p:spPr>
           <a:xfrm>
-            <a:off x="4788024" y="3383052"/>
-            <a:ext cx="4127644" cy="2473743"/>
+            <a:off x="448509" y="1351087"/>
+            <a:ext cx="3842939" cy="4987925"/>
           </a:xfrm>
-          <a:prstGeom prst="rect">
-            <a:avLst/>
-          </a:prstGeom>
         </p:spPr>
       </p:pic>
       <p:sp>
         <p:nvSpPr>
-          <p:cNvPr id="10" name="Content Placeholder 3"/>
-          <p:cNvSpPr txBox="1">
-            <a:spLocks/>
-          </p:cNvSpPr>
+          <p:cNvPr id="6" name="TextBox 5"/>
+          <p:cNvSpPr txBox="1"/>
           <p:nvPr/>
         </p:nvSpPr>
-        <p:spPr bwMode="auto">
+        <p:spPr>
           <a:xfrm>
-            <a:off x="457199" y="3466124"/>
-            <a:ext cx="4000501" cy="1782637"/>
+            <a:off x="4860032" y="1700808"/>
+            <a:ext cx="3960440" cy="3785652"/>
           </a:xfrm>
           <a:prstGeom prst="rect">
             <a:avLst/>
           </a:prstGeom>
           <a:noFill/>
-          <a:ln>
-            <a:noFill/>
-          </a:ln>
-          <a:extLst>
-            <a:ext uri="{909E8E84-426E-40DD-AFC4-6F175D3DCCD1}">
-              <a14:hiddenFill xmlns:a14="http://schemas.microsoft.com/office/drawing/2010/main">
-                <a:solidFill>
-                  <a:srgbClr val="FFFFFF"/>
-                </a:solidFill>
-              </a14:hiddenFill>
-            </a:ext>
-            <a:ext uri="{91240B29-F687-4F45-9708-019B960494DF}">
-              <a14:hiddenLine xmlns:a14="http://schemas.microsoft.com/office/drawing/2010/main" w="9525">
-                <a:solidFill>
-                  <a:srgbClr val="000000"/>
-                </a:solidFill>
-                <a:miter lim="800000"/>
-                <a:headEnd/>
-                <a:tailEnd/>
-              </a14:hiddenLine>
-            </a:ext>
-          </a:extLst>
         </p:spPr>
         <p:txBody>
-          <a:bodyPr vert="horz" wrap="square" lIns="91440" tIns="45720" rIns="91440" bIns="45720" numCol="1" anchor="t" anchorCtr="0" compatLnSpc="1">
-            <a:prstTxWarp prst="textNoShape">
-              <a:avLst/>
-            </a:prstTxWarp>
+          <a:bodyPr wrap="square" rtlCol="0">
+            <a:spAutoFit/>
           </a:bodyPr>
-          <a:lstStyle>
-            <a:lvl1pPr marL="342900" indent="-342900" algn="l" rtl="0" eaLnBrk="1" fontAlgn="base" hangingPunct="1">
-              <a:spcBef>
-                <a:spcPct val="20000"/>
-              </a:spcBef>
-              <a:spcAft>
-                <a:spcPct val="0"/>
-              </a:spcAft>
-              <a:buClr>
-                <a:srgbClr val="C20024"/>
-              </a:buClr>
-              <a:buSzPct val="90000"/>
+          <a:lstStyle/>
+          <a:p>
+            <a:pPr marL="342900" indent="-342900">
               <a:buFont typeface="Arial" panose="020B0604020202020204" pitchFamily="34" charset="0"/>
               <a:buChar char="•"/>
-              <a:defRPr sz="2000" kern="1200" baseline="0">
-                <a:solidFill>
-                  <a:schemeClr val="tx1"/>
-                </a:solidFill>
-                <a:latin typeface="Century Gothic" panose="020B0502020202020204" pitchFamily="34" charset="0"/>
-                <a:ea typeface="+mn-ea"/>
-                <a:cs typeface="Arial"/>
-              </a:defRPr>
-            </a:lvl1pPr>
-            <a:lvl2pPr marL="639763" indent="-457200" algn="l" rtl="0" eaLnBrk="1" fontAlgn="base" hangingPunct="1">
-              <a:spcBef>
-                <a:spcPts val="438"/>
-              </a:spcBef>
-              <a:spcAft>
-                <a:spcPct val="0"/>
-              </a:spcAft>
-              <a:buClr>
-                <a:srgbClr val="C00000"/>
-              </a:buClr>
-              <a:buSzPct val="80000"/>
+            </a:pPr>
+            <a:r>
+              <a:rPr lang="tr-TR" dirty="0" smtClean="0"/>
+              <a:t>The inertia in the wind turbine is not reflected to grid.</a:t>
+            </a:r>
+          </a:p>
+          <a:p>
+            <a:pPr marL="342900" indent="-342900">
               <a:buFont typeface="Arial" panose="020B0604020202020204" pitchFamily="34" charset="0"/>
               <a:buChar char="•"/>
-              <a:defRPr kern="1200">
-                <a:solidFill>
-                  <a:schemeClr val="tx1"/>
-                </a:solidFill>
-                <a:latin typeface="Century Gothic" panose="020B0502020202020204" pitchFamily="34" charset="0"/>
-                <a:ea typeface="+mn-ea"/>
-                <a:cs typeface="Arial"/>
-              </a:defRPr>
-            </a:lvl2pPr>
-            <a:lvl3pPr marL="914400" indent="-457200" algn="l" rtl="0" eaLnBrk="1" fontAlgn="base" hangingPunct="1">
-              <a:spcBef>
-                <a:spcPct val="20000"/>
-              </a:spcBef>
-              <a:spcAft>
-                <a:spcPct val="0"/>
-              </a:spcAft>
-              <a:buClr>
-                <a:schemeClr val="accent2"/>
-              </a:buClr>
-              <a:buSzPct val="70000"/>
+            </a:pPr>
+            <a:endParaRPr lang="tr-TR" dirty="0" smtClean="0"/>
+          </a:p>
+          <a:p>
+            <a:pPr marL="342900" indent="-342900">
               <a:buFont typeface="Arial" panose="020B0604020202020204" pitchFamily="34" charset="0"/>
               <a:buChar char="•"/>
-              <a:defRPr kern="1200">
-                <a:solidFill>
-                  <a:schemeClr val="tx1"/>
-                </a:solidFill>
-                <a:latin typeface="Century Gothic" panose="020B0502020202020204" pitchFamily="34" charset="0"/>
-                <a:ea typeface="+mn-ea"/>
-                <a:cs typeface="Arial"/>
-              </a:defRPr>
-            </a:lvl3pPr>
-            <a:lvl4pPr marL="1187450" indent="-457200" algn="l" rtl="0" eaLnBrk="1" fontAlgn="base" hangingPunct="1">
-              <a:spcBef>
-                <a:spcPct val="20000"/>
-              </a:spcBef>
-              <a:spcAft>
-                <a:spcPct val="0"/>
-              </a:spcAft>
-              <a:buClr>
-                <a:srgbClr val="C20024"/>
-              </a:buClr>
-              <a:buSzPct val="65000"/>
+            </a:pPr>
+            <a:r>
+              <a:rPr lang="tr-TR" dirty="0" smtClean="0"/>
+              <a:t>The increase in the share of RE causes the risk of frequency stability.</a:t>
+            </a:r>
+          </a:p>
+          <a:p>
+            <a:pPr marL="342900" indent="-342900">
               <a:buFont typeface="Arial" panose="020B0604020202020204" pitchFamily="34" charset="0"/>
               <a:buChar char="•"/>
-              <a:defRPr kern="1200">
-                <a:solidFill>
-                  <a:schemeClr val="tx1"/>
-                </a:solidFill>
-                <a:latin typeface="Century Gothic" panose="020B0502020202020204" pitchFamily="34" charset="0"/>
-                <a:ea typeface="+mn-ea"/>
-                <a:cs typeface="Arial"/>
-              </a:defRPr>
-            </a:lvl4pPr>
-            <a:lvl5pPr marL="1004888" indent="0" algn="l" rtl="0" eaLnBrk="1" fontAlgn="base" hangingPunct="1">
-              <a:spcBef>
-                <a:spcPct val="20000"/>
-              </a:spcBef>
-              <a:spcAft>
-                <a:spcPct val="0"/>
-              </a:spcAft>
-              <a:buClr>
-                <a:srgbClr val="10CF9B"/>
-              </a:buClr>
-              <a:buSzPct val="65000"/>
+            </a:pPr>
+            <a:endParaRPr lang="tr-TR" dirty="0"/>
+          </a:p>
+          <a:p>
+            <a:pPr marL="342900" indent="-342900">
               <a:buFont typeface="Arial" panose="020B0604020202020204" pitchFamily="34" charset="0"/>
-              <a:buNone/>
-              <a:defRPr kern="1200">
-                <a:solidFill>
-                  <a:schemeClr val="tx1"/>
-                </a:solidFill>
-                <a:latin typeface="Century Gothic" panose="020B0502020202020204" pitchFamily="34" charset="0"/>
-                <a:ea typeface="+mn-ea"/>
-                <a:cs typeface="Arial"/>
-              </a:defRPr>
-            </a:lvl5pPr>
-            <a:lvl6pPr marL="1737360" indent="-210312" algn="l" rtl="0" eaLnBrk="1" latinLnBrk="0" hangingPunct="1">
-              <a:spcBef>
-                <a:spcPct val="20000"/>
-              </a:spcBef>
-              <a:buClr>
-                <a:schemeClr val="accent5"/>
-              </a:buClr>
-              <a:buSzPct val="80000"/>
-              <a:buFont typeface="Wingdings 2"/>
-              <a:buChar char=""/>
-              <a:defRPr kumimoji="0" sz="1800" kern="1200">
-                <a:solidFill>
-                  <a:schemeClr val="tx1"/>
-                </a:solidFill>
-                <a:latin typeface="+mn-lt"/>
-                <a:ea typeface="+mn-ea"/>
-                <a:cs typeface="+mn-cs"/>
-              </a:defRPr>
-            </a:lvl6pPr>
-            <a:lvl7pPr marL="1920240" indent="-182880" algn="l" rtl="0" eaLnBrk="1" latinLnBrk="0" hangingPunct="1">
-              <a:spcBef>
-                <a:spcPct val="20000"/>
-              </a:spcBef>
-              <a:buClr>
-                <a:schemeClr val="accent6"/>
-              </a:buClr>
-              <a:buSzPct val="80000"/>
-              <a:buFont typeface="Wingdings 2"/>
-              <a:buChar char=""/>
-              <a:defRPr kumimoji="0" sz="1600" kern="1200" baseline="0">
-                <a:solidFill>
-                  <a:schemeClr val="tx1"/>
-                </a:solidFill>
-                <a:latin typeface="+mn-lt"/>
-                <a:ea typeface="+mn-ea"/>
-                <a:cs typeface="+mn-cs"/>
-              </a:defRPr>
-            </a:lvl7pPr>
-            <a:lvl8pPr marL="2194560" indent="-182880" algn="l" rtl="0" eaLnBrk="1" latinLnBrk="0" hangingPunct="1">
-              <a:spcBef>
-                <a:spcPct val="20000"/>
-              </a:spcBef>
-              <a:buClr>
-                <a:schemeClr val="tx2"/>
-              </a:buClr>
               <a:buChar char="•"/>
-              <a:defRPr kumimoji="0" sz="1600" kern="1200">
-                <a:solidFill>
-                  <a:schemeClr val="tx1"/>
-                </a:solidFill>
-                <a:latin typeface="+mn-lt"/>
-                <a:ea typeface="+mn-ea"/>
-                <a:cs typeface="+mn-cs"/>
-              </a:defRPr>
-            </a:lvl8pPr>
-            <a:lvl9pPr marL="2468880" indent="-182880" algn="l" rtl="0" eaLnBrk="1" latinLnBrk="0" hangingPunct="1">
-              <a:spcBef>
-                <a:spcPct val="20000"/>
-              </a:spcBef>
-              <a:buClr>
-                <a:schemeClr val="tx2"/>
-              </a:buClr>
-              <a:buFontTx/>
-              <a:buChar char="•"/>
-              <a:defRPr kumimoji="0" sz="1400" kern="1200" baseline="0">
-                <a:solidFill>
-                  <a:schemeClr val="tx1"/>
-                </a:solidFill>
-                <a:latin typeface="+mn-lt"/>
-                <a:ea typeface="+mn-ea"/>
-                <a:cs typeface="+mn-cs"/>
-              </a:defRPr>
-            </a:lvl9pPr>
-          </a:lstStyle>
-          <a:p>
-            <a:pPr algn="just"/>
-            <a:r>
-              <a:rPr lang="tr-TR" dirty="0" smtClean="0">
-                <a:cs typeface="Arial" panose="020B0604020202020204" pitchFamily="34" charset="0"/>
-              </a:rPr>
-              <a:t>Wind </a:t>
-            </a:r>
-            <a:r>
-              <a:rPr lang="tr-TR" dirty="0">
-                <a:cs typeface="Arial" panose="020B0604020202020204" pitchFamily="34" charset="0"/>
-              </a:rPr>
-              <a:t>turbines with FSPC are the most promising type of renewable due to its kinetic energy in the turbine inertia and the ability to control active/reactive power. </a:t>
-            </a:r>
-            <a:endParaRPr lang="tr-TR" dirty="0">
-              <a:cs typeface="Arial" panose="020B0604020202020204" pitchFamily="34" charset="0"/>
-            </a:endParaRPr>
+            </a:pPr>
+            <a:r>
+              <a:rPr lang="tr-TR" dirty="0" smtClean="0"/>
+              <a:t>Existing structure decreases grid inertia!</a:t>
+            </a:r>
+            <a:endParaRPr lang="tr-TR" dirty="0"/>
           </a:p>
         </p:txBody>
       </p:sp>
     </p:spTree>
     <p:extLst>
       <p:ext uri="{BB962C8B-B14F-4D97-AF65-F5344CB8AC3E}">
-        <p14:creationId xmlns:p14="http://schemas.microsoft.com/office/powerpoint/2010/main" val="3313184192"/>
+        <p14:creationId xmlns:p14="http://schemas.microsoft.com/office/powerpoint/2010/main" val="3933851754"/>
       </p:ext>
     </p:extLst>
   </p:cSld>

</xml_diff>